<commit_message>
updated chapter 1 notes
</commit_message>
<xml_diff>
--- a/lecture_notes/chapter1/chapter1.pptx
+++ b/lecture_notes/chapter1/chapter1.pptx
@@ -7,19 +7,20 @@
   <p:sldIdLst>
     <p:sldId id="256" r:id="rId2"/>
     <p:sldId id="257" r:id="rId3"/>
-    <p:sldId id="258" r:id="rId4"/>
-    <p:sldId id="259" r:id="rId5"/>
-    <p:sldId id="269" r:id="rId6"/>
-    <p:sldId id="260" r:id="rId7"/>
-    <p:sldId id="261" r:id="rId8"/>
-    <p:sldId id="262" r:id="rId9"/>
-    <p:sldId id="263" r:id="rId10"/>
-    <p:sldId id="264" r:id="rId11"/>
-    <p:sldId id="265" r:id="rId12"/>
-    <p:sldId id="266" r:id="rId13"/>
-    <p:sldId id="267" r:id="rId14"/>
-    <p:sldId id="268" r:id="rId15"/>
-    <p:sldId id="270" r:id="rId16"/>
+    <p:sldId id="271" r:id="rId4"/>
+    <p:sldId id="258" r:id="rId5"/>
+    <p:sldId id="259" r:id="rId6"/>
+    <p:sldId id="269" r:id="rId7"/>
+    <p:sldId id="260" r:id="rId8"/>
+    <p:sldId id="261" r:id="rId9"/>
+    <p:sldId id="262" r:id="rId10"/>
+    <p:sldId id="263" r:id="rId11"/>
+    <p:sldId id="264" r:id="rId12"/>
+    <p:sldId id="265" r:id="rId13"/>
+    <p:sldId id="266" r:id="rId14"/>
+    <p:sldId id="267" r:id="rId15"/>
+    <p:sldId id="268" r:id="rId16"/>
+    <p:sldId id="270" r:id="rId17"/>
   </p:sldIdLst>
   <p:sldSz cx="12192000" cy="6858000"/>
   <p:notesSz cx="6858000" cy="9144000"/>
@@ -129,7 +130,7 @@
 <file path=ppt/revisionInfo.xml><?xml version="1.0" encoding="utf-8"?>
 <p1510:revInfo xmlns:a="http://schemas.openxmlformats.org/drawingml/2006/main" xmlns:r="http://schemas.openxmlformats.org/officeDocument/2006/relationships" xmlns:p1510="http://schemas.microsoft.com/office/powerpoint/2015/10/main">
   <p1510:revLst>
-    <p1510:client id="{6C3AA957-2AA0-2B44-953A-44C83FD8F678}" v="1" dt="2025-10-15T19:54:46.384"/>
+    <p1510:client id="{F17399DF-123B-EE49-A317-20B5B398BF10}" v="4" dt="2025-12-08T22:34:00.591"/>
   </p1510:revLst>
 </p1510:revInfo>
 </file>
@@ -137,51 +138,271 @@
 <file path=ppt/changesInfos/changesInfo1.xml><?xml version="1.0" encoding="utf-8"?>
 <pc:chgInfo xmlns:a="http://schemas.openxmlformats.org/drawingml/2006/main" xmlns:r="http://schemas.openxmlformats.org/officeDocument/2006/relationships" xmlns:ac="http://schemas.microsoft.com/office/drawing/2013/main/command" xmlns:pc="http://schemas.microsoft.com/office/powerpoint/2013/main/command">
   <pc:docChgLst>
-    <pc:chgData name="Toby Donaldson" userId="2e6e5431-bb17-4c41-9985-d39c50d83c73" providerId="ADAL" clId="{F31BC264-820E-54C4-A6D1-F92AF9CC222E}"/>
-    <pc:docChg chg="custSel modSld">
-      <pc:chgData name="Toby Donaldson" userId="2e6e5431-bb17-4c41-9985-d39c50d83c73" providerId="ADAL" clId="{F31BC264-820E-54C4-A6D1-F92AF9CC222E}" dt="2025-10-15T19:55:23.214" v="21" actId="14100"/>
+    <pc:chgData name="Toby Donaldson" userId="2e6e5431-bb17-4c41-9985-d39c50d83c73" providerId="ADAL" clId="{7F9681A8-EEE2-56F4-9B39-ECCBEE0471AC}"/>
+    <pc:docChg chg="undo custSel addSld modSld">
+      <pc:chgData name="Toby Donaldson" userId="2e6e5431-bb17-4c41-9985-d39c50d83c73" providerId="ADAL" clId="{7F9681A8-EEE2-56F4-9B39-ECCBEE0471AC}" dt="2025-12-08T22:52:38.629" v="1296" actId="20577"/>
       <pc:docMkLst>
         <pc:docMk/>
       </pc:docMkLst>
-      <pc:sldChg chg="modSp mod">
-        <pc:chgData name="Toby Donaldson" userId="2e6e5431-bb17-4c41-9985-d39c50d83c73" providerId="ADAL" clId="{F31BC264-820E-54C4-A6D1-F92AF9CC222E}" dt="2025-10-15T19:52:14.672" v="10" actId="20577"/>
+      <pc:sldChg chg="addSp delSp modSp mod">
+        <pc:chgData name="Toby Donaldson" userId="2e6e5431-bb17-4c41-9985-d39c50d83c73" providerId="ADAL" clId="{7F9681A8-EEE2-56F4-9B39-ECCBEE0471AC}" dt="2025-12-08T22:51:43.359" v="1292" actId="20577"/>
         <pc:sldMkLst>
           <pc:docMk/>
-          <pc:sldMk cId="39305824" sldId="256"/>
+          <pc:sldMk cId="1433169316" sldId="257"/>
         </pc:sldMkLst>
         <pc:spChg chg="mod">
-          <ac:chgData name="Toby Donaldson" userId="2e6e5431-bb17-4c41-9985-d39c50d83c73" providerId="ADAL" clId="{F31BC264-820E-54C4-A6D1-F92AF9CC222E}" dt="2025-10-15T19:52:14.672" v="10" actId="20577"/>
+          <ac:chgData name="Toby Donaldson" userId="2e6e5431-bb17-4c41-9985-d39c50d83c73" providerId="ADAL" clId="{7F9681A8-EEE2-56F4-9B39-ECCBEE0471AC}" dt="2025-12-08T22:51:43.359" v="1292" actId="20577"/>
           <ac:spMkLst>
             <pc:docMk/>
-            <pc:sldMk cId="39305824" sldId="256"/>
-            <ac:spMk id="3" creationId="{C98F3F09-2A22-777B-0073-D655AAA28CE6}"/>
+            <pc:sldMk cId="1433169316" sldId="257"/>
+            <ac:spMk id="3" creationId="{1CE88E03-CAFE-9264-933A-0CD67C9C6CA6}"/>
+          </ac:spMkLst>
+        </pc:spChg>
+        <pc:spChg chg="add del mod">
+          <ac:chgData name="Toby Donaldson" userId="2e6e5431-bb17-4c41-9985-d39c50d83c73" providerId="ADAL" clId="{7F9681A8-EEE2-56F4-9B39-ECCBEE0471AC}" dt="2025-12-08T21:43:36.343" v="451" actId="21"/>
+          <ac:spMkLst>
+            <pc:docMk/>
+            <pc:sldMk cId="1433169316" sldId="257"/>
+            <ac:spMk id="4" creationId="{5D4ED5FF-4397-160B-7125-0AF5BCF09453}"/>
+          </ac:spMkLst>
+        </pc:spChg>
+      </pc:sldChg>
+      <pc:sldChg chg="modSp mod">
+        <pc:chgData name="Toby Donaldson" userId="2e6e5431-bb17-4c41-9985-d39c50d83c73" providerId="ADAL" clId="{7F9681A8-EEE2-56F4-9B39-ECCBEE0471AC}" dt="2025-12-08T21:43:43.228" v="452" actId="113"/>
+        <pc:sldMkLst>
+          <pc:docMk/>
+          <pc:sldMk cId="2692445676" sldId="258"/>
+        </pc:sldMkLst>
+        <pc:spChg chg="mod">
+          <ac:chgData name="Toby Donaldson" userId="2e6e5431-bb17-4c41-9985-d39c50d83c73" providerId="ADAL" clId="{7F9681A8-EEE2-56F4-9B39-ECCBEE0471AC}" dt="2025-12-08T21:43:43.228" v="452" actId="113"/>
+          <ac:spMkLst>
+            <pc:docMk/>
+            <pc:sldMk cId="2692445676" sldId="258"/>
+            <ac:spMk id="3" creationId="{98A8E8F5-CA50-08D5-90EF-A6B808F7483C}"/>
+          </ac:spMkLst>
+        </pc:spChg>
+      </pc:sldChg>
+      <pc:sldChg chg="modSp mod">
+        <pc:chgData name="Toby Donaldson" userId="2e6e5431-bb17-4c41-9985-d39c50d83c73" providerId="ADAL" clId="{7F9681A8-EEE2-56F4-9B39-ECCBEE0471AC}" dt="2025-12-08T21:44:41.383" v="475" actId="6549"/>
+        <pc:sldMkLst>
+          <pc:docMk/>
+          <pc:sldMk cId="2756254005" sldId="259"/>
+        </pc:sldMkLst>
+        <pc:spChg chg="mod">
+          <ac:chgData name="Toby Donaldson" userId="2e6e5431-bb17-4c41-9985-d39c50d83c73" providerId="ADAL" clId="{7F9681A8-EEE2-56F4-9B39-ECCBEE0471AC}" dt="2025-12-08T21:44:41.383" v="475" actId="6549"/>
+          <ac:spMkLst>
+            <pc:docMk/>
+            <pc:sldMk cId="2756254005" sldId="259"/>
+            <ac:spMk id="3" creationId="{98A8E8F5-CA50-08D5-90EF-A6B808F7483C}"/>
+          </ac:spMkLst>
+        </pc:spChg>
+        <pc:spChg chg="mod">
+          <ac:chgData name="Toby Donaldson" userId="2e6e5431-bb17-4c41-9985-d39c50d83c73" providerId="ADAL" clId="{7F9681A8-EEE2-56F4-9B39-ECCBEE0471AC}" dt="2025-12-08T21:39:14.263" v="8" actId="207"/>
+          <ac:spMkLst>
+            <pc:docMk/>
+            <pc:sldMk cId="2756254005" sldId="259"/>
+            <ac:spMk id="4" creationId="{C4A18D26-0A05-1E77-DB1B-5DD5F78809C6}"/>
+          </ac:spMkLst>
+        </pc:spChg>
+      </pc:sldChg>
+      <pc:sldChg chg="modSp mod">
+        <pc:chgData name="Toby Donaldson" userId="2e6e5431-bb17-4c41-9985-d39c50d83c73" providerId="ADAL" clId="{7F9681A8-EEE2-56F4-9B39-ECCBEE0471AC}" dt="2025-12-08T22:52:23.041" v="1295" actId="113"/>
+        <pc:sldMkLst>
+          <pc:docMk/>
+          <pc:sldMk cId="938849494" sldId="260"/>
+        </pc:sldMkLst>
+        <pc:spChg chg="mod">
+          <ac:chgData name="Toby Donaldson" userId="2e6e5431-bb17-4c41-9985-d39c50d83c73" providerId="ADAL" clId="{7F9681A8-EEE2-56F4-9B39-ECCBEE0471AC}" dt="2025-12-08T22:52:23.041" v="1295" actId="113"/>
+          <ac:spMkLst>
+            <pc:docMk/>
+            <pc:sldMk cId="938849494" sldId="260"/>
+            <ac:spMk id="3" creationId="{CDDE56BB-85C7-D749-78C1-283D1AB897C0}"/>
+          </ac:spMkLst>
+        </pc:spChg>
+      </pc:sldChg>
+      <pc:sldChg chg="modSp mod">
+        <pc:chgData name="Toby Donaldson" userId="2e6e5431-bb17-4c41-9985-d39c50d83c73" providerId="ADAL" clId="{7F9681A8-EEE2-56F4-9B39-ECCBEE0471AC}" dt="2025-12-08T22:52:38.629" v="1296" actId="20577"/>
+        <pc:sldMkLst>
+          <pc:docMk/>
+          <pc:sldMk cId="3817561596" sldId="261"/>
+        </pc:sldMkLst>
+        <pc:spChg chg="mod">
+          <ac:chgData name="Toby Donaldson" userId="2e6e5431-bb17-4c41-9985-d39c50d83c73" providerId="ADAL" clId="{7F9681A8-EEE2-56F4-9B39-ECCBEE0471AC}" dt="2025-12-08T22:52:38.629" v="1296" actId="20577"/>
+          <ac:spMkLst>
+            <pc:docMk/>
+            <pc:sldMk cId="3817561596" sldId="261"/>
+            <ac:spMk id="3" creationId="{5B7000D7-3453-5BD4-0A71-EBA2BD423FC9}"/>
+          </ac:spMkLst>
+        </pc:spChg>
+      </pc:sldChg>
+      <pc:sldChg chg="modSp mod">
+        <pc:chgData name="Toby Donaldson" userId="2e6e5431-bb17-4c41-9985-d39c50d83c73" providerId="ADAL" clId="{7F9681A8-EEE2-56F4-9B39-ECCBEE0471AC}" dt="2025-12-08T21:52:09.511" v="766" actId="1076"/>
+        <pc:sldMkLst>
+          <pc:docMk/>
+          <pc:sldMk cId="4281630409" sldId="262"/>
+        </pc:sldMkLst>
+        <pc:spChg chg="mod">
+          <ac:chgData name="Toby Donaldson" userId="2e6e5431-bb17-4c41-9985-d39c50d83c73" providerId="ADAL" clId="{7F9681A8-EEE2-56F4-9B39-ECCBEE0471AC}" dt="2025-12-08T21:52:09.511" v="766" actId="1076"/>
+          <ac:spMkLst>
+            <pc:docMk/>
+            <pc:sldMk cId="4281630409" sldId="262"/>
+            <ac:spMk id="4" creationId="{B0FB5CCC-97E9-CCC8-53AA-6EBA19E865D1}"/>
+          </ac:spMkLst>
+        </pc:spChg>
+      </pc:sldChg>
+      <pc:sldChg chg="modSp mod">
+        <pc:chgData name="Toby Donaldson" userId="2e6e5431-bb17-4c41-9985-d39c50d83c73" providerId="ADAL" clId="{7F9681A8-EEE2-56F4-9B39-ECCBEE0471AC}" dt="2025-12-08T21:52:15.583" v="768" actId="20577"/>
+        <pc:sldMkLst>
+          <pc:docMk/>
+          <pc:sldMk cId="1617268802" sldId="263"/>
+        </pc:sldMkLst>
+        <pc:spChg chg="mod">
+          <ac:chgData name="Toby Donaldson" userId="2e6e5431-bb17-4c41-9985-d39c50d83c73" providerId="ADAL" clId="{7F9681A8-EEE2-56F4-9B39-ECCBEE0471AC}" dt="2025-12-08T21:48:23.832" v="618" actId="14100"/>
+          <ac:spMkLst>
+            <pc:docMk/>
+            <pc:sldMk cId="1617268802" sldId="263"/>
+            <ac:spMk id="3" creationId="{50798CC9-C622-B878-F83F-05F196ABC0AF}"/>
+          </ac:spMkLst>
+        </pc:spChg>
+        <pc:spChg chg="mod">
+          <ac:chgData name="Toby Donaldson" userId="2e6e5431-bb17-4c41-9985-d39c50d83c73" providerId="ADAL" clId="{7F9681A8-EEE2-56F4-9B39-ECCBEE0471AC}" dt="2025-12-08T21:52:15.583" v="768" actId="20577"/>
+          <ac:spMkLst>
+            <pc:docMk/>
+            <pc:sldMk cId="1617268802" sldId="263"/>
+            <ac:spMk id="4" creationId="{B0FB5CCC-97E9-CCC8-53AA-6EBA19E865D1}"/>
+          </ac:spMkLst>
+        </pc:spChg>
+      </pc:sldChg>
+      <pc:sldChg chg="modSp mod">
+        <pc:chgData name="Toby Donaldson" userId="2e6e5431-bb17-4c41-9985-d39c50d83c73" providerId="ADAL" clId="{7F9681A8-EEE2-56F4-9B39-ECCBEE0471AC}" dt="2025-12-08T21:53:20.462" v="882" actId="1076"/>
+        <pc:sldMkLst>
+          <pc:docMk/>
+          <pc:sldMk cId="3937816594" sldId="264"/>
+        </pc:sldMkLst>
+        <pc:spChg chg="mod">
+          <ac:chgData name="Toby Donaldson" userId="2e6e5431-bb17-4c41-9985-d39c50d83c73" providerId="ADAL" clId="{7F9681A8-EEE2-56F4-9B39-ECCBEE0471AC}" dt="2025-12-08T21:53:20.462" v="882" actId="1076"/>
+          <ac:spMkLst>
+            <pc:docMk/>
+            <pc:sldMk cId="3937816594" sldId="264"/>
+            <ac:spMk id="4" creationId="{B0FB5CCC-97E9-CCC8-53AA-6EBA19E865D1}"/>
+          </ac:spMkLst>
+        </pc:spChg>
+      </pc:sldChg>
+      <pc:sldChg chg="modSp mod">
+        <pc:chgData name="Toby Donaldson" userId="2e6e5431-bb17-4c41-9985-d39c50d83c73" providerId="ADAL" clId="{7F9681A8-EEE2-56F4-9B39-ECCBEE0471AC}" dt="2025-12-08T21:55:11.880" v="998" actId="1076"/>
+        <pc:sldMkLst>
+          <pc:docMk/>
+          <pc:sldMk cId="3853224143" sldId="265"/>
+        </pc:sldMkLst>
+        <pc:spChg chg="mod">
+          <ac:chgData name="Toby Donaldson" userId="2e6e5431-bb17-4c41-9985-d39c50d83c73" providerId="ADAL" clId="{7F9681A8-EEE2-56F4-9B39-ECCBEE0471AC}" dt="2025-12-08T21:55:11.880" v="998" actId="1076"/>
+          <ac:spMkLst>
+            <pc:docMk/>
+            <pc:sldMk cId="3853224143" sldId="265"/>
+            <ac:spMk id="4" creationId="{B0FB5CCC-97E9-CCC8-53AA-6EBA19E865D1}"/>
+          </ac:spMkLst>
+        </pc:spChg>
+      </pc:sldChg>
+      <pc:sldChg chg="modSp mod">
+        <pc:chgData name="Toby Donaldson" userId="2e6e5431-bb17-4c41-9985-d39c50d83c73" providerId="ADAL" clId="{7F9681A8-EEE2-56F4-9B39-ECCBEE0471AC}" dt="2025-12-08T22:29:32.287" v="1122" actId="20577"/>
+        <pc:sldMkLst>
+          <pc:docMk/>
+          <pc:sldMk cId="2910585830" sldId="266"/>
+        </pc:sldMkLst>
+        <pc:spChg chg="mod">
+          <ac:chgData name="Toby Donaldson" userId="2e6e5431-bb17-4c41-9985-d39c50d83c73" providerId="ADAL" clId="{7F9681A8-EEE2-56F4-9B39-ECCBEE0471AC}" dt="2025-12-08T22:28:12.933" v="1045" actId="1076"/>
+          <ac:spMkLst>
+            <pc:docMk/>
+            <pc:sldMk cId="2910585830" sldId="266"/>
+            <ac:spMk id="3" creationId="{50798CC9-C622-B878-F83F-05F196ABC0AF}"/>
+          </ac:spMkLst>
+        </pc:spChg>
+        <pc:spChg chg="mod">
+          <ac:chgData name="Toby Donaldson" userId="2e6e5431-bb17-4c41-9985-d39c50d83c73" providerId="ADAL" clId="{7F9681A8-EEE2-56F4-9B39-ECCBEE0471AC}" dt="2025-12-08T22:29:32.287" v="1122" actId="20577"/>
+          <ac:spMkLst>
+            <pc:docMk/>
+            <pc:sldMk cId="2910585830" sldId="266"/>
+            <ac:spMk id="4" creationId="{B0FB5CCC-97E9-CCC8-53AA-6EBA19E865D1}"/>
+          </ac:spMkLst>
+        </pc:spChg>
+      </pc:sldChg>
+      <pc:sldChg chg="modSp mod">
+        <pc:chgData name="Toby Donaldson" userId="2e6e5431-bb17-4c41-9985-d39c50d83c73" providerId="ADAL" clId="{7F9681A8-EEE2-56F4-9B39-ECCBEE0471AC}" dt="2025-12-08T22:31:03.537" v="1152" actId="20577"/>
+        <pc:sldMkLst>
+          <pc:docMk/>
+          <pc:sldMk cId="598370551" sldId="267"/>
+        </pc:sldMkLst>
+        <pc:spChg chg="mod">
+          <ac:chgData name="Toby Donaldson" userId="2e6e5431-bb17-4c41-9985-d39c50d83c73" providerId="ADAL" clId="{7F9681A8-EEE2-56F4-9B39-ECCBEE0471AC}" dt="2025-12-08T22:31:03.537" v="1152" actId="20577"/>
+          <ac:spMkLst>
+            <pc:docMk/>
+            <pc:sldMk cId="598370551" sldId="267"/>
+            <ac:spMk id="4" creationId="{B0FB5CCC-97E9-CCC8-53AA-6EBA19E865D1}"/>
+          </ac:spMkLst>
+        </pc:spChg>
+      </pc:sldChg>
+      <pc:sldChg chg="modSp mod">
+        <pc:chgData name="Toby Donaldson" userId="2e6e5431-bb17-4c41-9985-d39c50d83c73" providerId="ADAL" clId="{7F9681A8-EEE2-56F4-9B39-ECCBEE0471AC}" dt="2025-12-08T22:32:32.994" v="1262" actId="20577"/>
+        <pc:sldMkLst>
+          <pc:docMk/>
+          <pc:sldMk cId="299047572" sldId="268"/>
+        </pc:sldMkLst>
+        <pc:spChg chg="mod">
+          <ac:chgData name="Toby Donaldson" userId="2e6e5431-bb17-4c41-9985-d39c50d83c73" providerId="ADAL" clId="{7F9681A8-EEE2-56F4-9B39-ECCBEE0471AC}" dt="2025-12-08T22:32:32.994" v="1262" actId="20577"/>
+          <ac:spMkLst>
+            <pc:docMk/>
+            <pc:sldMk cId="299047572" sldId="268"/>
+            <ac:spMk id="4" creationId="{B0FB5CCC-97E9-CCC8-53AA-6EBA19E865D1}"/>
+          </ac:spMkLst>
+        </pc:spChg>
+      </pc:sldChg>
+      <pc:sldChg chg="modSp mod">
+        <pc:chgData name="Toby Donaldson" userId="2e6e5431-bb17-4c41-9985-d39c50d83c73" providerId="ADAL" clId="{7F9681A8-EEE2-56F4-9B39-ECCBEE0471AC}" dt="2025-12-08T21:45:20.053" v="479" actId="207"/>
+        <pc:sldMkLst>
+          <pc:docMk/>
+          <pc:sldMk cId="3348444406" sldId="269"/>
+        </pc:sldMkLst>
+        <pc:spChg chg="mod">
+          <ac:chgData name="Toby Donaldson" userId="2e6e5431-bb17-4c41-9985-d39c50d83c73" providerId="ADAL" clId="{7F9681A8-EEE2-56F4-9B39-ECCBEE0471AC}" dt="2025-12-08T21:45:20.053" v="479" actId="207"/>
+          <ac:spMkLst>
+            <pc:docMk/>
+            <pc:sldMk cId="3348444406" sldId="269"/>
+            <ac:spMk id="3" creationId="{98A8E8F5-CA50-08D5-90EF-A6B808F7483C}"/>
           </ac:spMkLst>
         </pc:spChg>
       </pc:sldChg>
       <pc:sldChg chg="addSp delSp modSp mod">
-        <pc:chgData name="Toby Donaldson" userId="2e6e5431-bb17-4c41-9985-d39c50d83c73" providerId="ADAL" clId="{F31BC264-820E-54C4-A6D1-F92AF9CC222E}" dt="2025-10-15T19:55:23.214" v="21" actId="14100"/>
+        <pc:chgData name="Toby Donaldson" userId="2e6e5431-bb17-4c41-9985-d39c50d83c73" providerId="ADAL" clId="{7F9681A8-EEE2-56F4-9B39-ECCBEE0471AC}" dt="2025-12-08T22:34:20.082" v="1272" actId="1076"/>
         <pc:sldMkLst>
           <pc:docMk/>
           <pc:sldMk cId="2283882614" sldId="270"/>
         </pc:sldMkLst>
-        <pc:spChg chg="del">
-          <ac:chgData name="Toby Donaldson" userId="2e6e5431-bb17-4c41-9985-d39c50d83c73" providerId="ADAL" clId="{F31BC264-820E-54C4-A6D1-F92AF9CC222E}" dt="2025-10-15T19:54:46.384" v="12"/>
+        <pc:spChg chg="add mod">
+          <ac:chgData name="Toby Donaldson" userId="2e6e5431-bb17-4c41-9985-d39c50d83c73" providerId="ADAL" clId="{7F9681A8-EEE2-56F4-9B39-ECCBEE0471AC}" dt="2025-12-08T22:33:53.845" v="1263"/>
           <ac:spMkLst>
             <pc:docMk/>
             <pc:sldMk cId="2283882614" sldId="270"/>
-            <ac:spMk id="3" creationId="{F7C252A5-7617-052E-A872-66726F218556}"/>
+            <ac:spMk id="3" creationId="{CBA3B810-C195-19CC-006F-D59CC4BD60BA}"/>
           </ac:spMkLst>
         </pc:spChg>
-        <pc:picChg chg="del mod">
-          <ac:chgData name="Toby Donaldson" userId="2e6e5431-bb17-4c41-9985-d39c50d83c73" providerId="ADAL" clId="{F31BC264-820E-54C4-A6D1-F92AF9CC222E}" dt="2025-10-15T19:55:10.883" v="18" actId="21"/>
+        <pc:spChg chg="add del mod">
+          <ac:chgData name="Toby Donaldson" userId="2e6e5431-bb17-4c41-9985-d39c50d83c73" providerId="ADAL" clId="{7F9681A8-EEE2-56F4-9B39-ECCBEE0471AC}" dt="2025-12-08T22:34:05.855" v="1266" actId="21"/>
+          <ac:spMkLst>
+            <pc:docMk/>
+            <pc:sldMk cId="2283882614" sldId="270"/>
+            <ac:spMk id="8" creationId="{F66D2C98-C49B-DAF9-7B26-DCFB2503BFF5}"/>
+          </ac:spMkLst>
+        </pc:spChg>
+        <pc:picChg chg="add mod">
+          <ac:chgData name="Toby Donaldson" userId="2e6e5431-bb17-4c41-9985-d39c50d83c73" providerId="ADAL" clId="{7F9681A8-EEE2-56F4-9B39-ECCBEE0471AC}" dt="2025-12-08T22:34:20.082" v="1272" actId="1076"/>
           <ac:picMkLst>
             <pc:docMk/>
             <pc:sldMk cId="2283882614" sldId="270"/>
-            <ac:picMk id="5" creationId="{460F23B6-FF56-E859-B00D-5BA280B03A89}"/>
+            <ac:picMk id="5" creationId="{9C840B38-44F3-A48D-AB9E-4DA413524991}"/>
           </ac:picMkLst>
         </pc:picChg>
-        <pc:picChg chg="add mod">
-          <ac:chgData name="Toby Donaldson" userId="2e6e5431-bb17-4c41-9985-d39c50d83c73" providerId="ADAL" clId="{F31BC264-820E-54C4-A6D1-F92AF9CC222E}" dt="2025-10-15T19:55:23.214" v="21" actId="14100"/>
+        <pc:picChg chg="del">
+          <ac:chgData name="Toby Donaldson" userId="2e6e5431-bb17-4c41-9985-d39c50d83c73" providerId="ADAL" clId="{7F9681A8-EEE2-56F4-9B39-ECCBEE0471AC}" dt="2025-12-08T22:34:02.788" v="1265" actId="21"/>
           <ac:picMkLst>
             <pc:docMk/>
             <pc:sldMk cId="2283882614" sldId="270"/>
@@ -189,184 +410,20 @@
           </ac:picMkLst>
         </pc:picChg>
       </pc:sldChg>
-    </pc:docChg>
-  </pc:docChgLst>
-  <pc:docChgLst>
-    <pc:chgData name="Toby Donaldson" userId="2e6e5431-bb17-4c41-9985-d39c50d83c73" providerId="ADAL" clId="{2836AFBC-50E4-4BA5-B026-B044CA7C8336}"/>
-    <pc:docChg chg="undo redo custSel addSld modSld">
-      <pc:chgData name="Toby Donaldson" userId="2e6e5431-bb17-4c41-9985-d39c50d83c73" providerId="ADAL" clId="{2836AFBC-50E4-4BA5-B026-B044CA7C8336}" dt="2024-09-11T07:44:48.072" v="6070" actId="1076"/>
-      <pc:docMkLst>
-        <pc:docMk/>
-      </pc:docMkLst>
-      <pc:sldChg chg="modSp new mod">
-        <pc:chgData name="Toby Donaldson" userId="2e6e5431-bb17-4c41-9985-d39c50d83c73" providerId="ADAL" clId="{2836AFBC-50E4-4BA5-B026-B044CA7C8336}" dt="2024-09-11T06:46:49.572" v="125" actId="20577"/>
+      <pc:sldChg chg="modSp add mod">
+        <pc:chgData name="Toby Donaldson" userId="2e6e5431-bb17-4c41-9985-d39c50d83c73" providerId="ADAL" clId="{7F9681A8-EEE2-56F4-9B39-ECCBEE0471AC}" dt="2025-12-08T22:50:20.237" v="1276" actId="20577"/>
         <pc:sldMkLst>
           <pc:docMk/>
-          <pc:sldMk cId="39305824" sldId="256"/>
+          <pc:sldMk cId="63370177" sldId="271"/>
         </pc:sldMkLst>
-      </pc:sldChg>
-      <pc:sldChg chg="modSp new mod">
-        <pc:chgData name="Toby Donaldson" userId="2e6e5431-bb17-4c41-9985-d39c50d83c73" providerId="ADAL" clId="{2836AFBC-50E4-4BA5-B026-B044CA7C8336}" dt="2024-09-11T06:55:51.208" v="953" actId="20577"/>
-        <pc:sldMkLst>
-          <pc:docMk/>
-          <pc:sldMk cId="1433169316" sldId="257"/>
-        </pc:sldMkLst>
-      </pc:sldChg>
-      <pc:sldChg chg="modSp new mod">
-        <pc:chgData name="Toby Donaldson" userId="2e6e5431-bb17-4c41-9985-d39c50d83c73" providerId="ADAL" clId="{2836AFBC-50E4-4BA5-B026-B044CA7C8336}" dt="2024-09-11T07:00:28.588" v="1487" actId="14"/>
-        <pc:sldMkLst>
-          <pc:docMk/>
-          <pc:sldMk cId="2692445676" sldId="258"/>
-        </pc:sldMkLst>
-      </pc:sldChg>
-      <pc:sldChg chg="addSp modSp add mod">
-        <pc:chgData name="Toby Donaldson" userId="2e6e5431-bb17-4c41-9985-d39c50d83c73" providerId="ADAL" clId="{2836AFBC-50E4-4BA5-B026-B044CA7C8336}" dt="2024-09-11T07:04:25.620" v="1700" actId="313"/>
-        <pc:sldMkLst>
-          <pc:docMk/>
-          <pc:sldMk cId="2756254005" sldId="259"/>
-        </pc:sldMkLst>
-      </pc:sldChg>
-      <pc:sldChg chg="modSp new mod">
-        <pc:chgData name="Toby Donaldson" userId="2e6e5431-bb17-4c41-9985-d39c50d83c73" providerId="ADAL" clId="{2836AFBC-50E4-4BA5-B026-B044CA7C8336}" dt="2024-09-11T07:05:50.498" v="1900" actId="20577"/>
-        <pc:sldMkLst>
-          <pc:docMk/>
-          <pc:sldMk cId="938849494" sldId="260"/>
-        </pc:sldMkLst>
-      </pc:sldChg>
-      <pc:sldChg chg="modSp new mod">
-        <pc:chgData name="Toby Donaldson" userId="2e6e5431-bb17-4c41-9985-d39c50d83c73" providerId="ADAL" clId="{2836AFBC-50E4-4BA5-B026-B044CA7C8336}" dt="2024-09-11T07:06:44.805" v="1975" actId="12"/>
-        <pc:sldMkLst>
-          <pc:docMk/>
-          <pc:sldMk cId="3817561596" sldId="261"/>
-        </pc:sldMkLst>
-      </pc:sldChg>
-      <pc:sldChg chg="addSp modSp new mod">
-        <pc:chgData name="Toby Donaldson" userId="2e6e5431-bb17-4c41-9985-d39c50d83c73" providerId="ADAL" clId="{2836AFBC-50E4-4BA5-B026-B044CA7C8336}" dt="2024-09-11T07:12:30.066" v="2378" actId="1076"/>
-        <pc:sldMkLst>
-          <pc:docMk/>
-          <pc:sldMk cId="4281630409" sldId="262"/>
-        </pc:sldMkLst>
-      </pc:sldChg>
-      <pc:sldChg chg="modSp add mod">
-        <pc:chgData name="Toby Donaldson" userId="2e6e5431-bb17-4c41-9985-d39c50d83c73" providerId="ADAL" clId="{2836AFBC-50E4-4BA5-B026-B044CA7C8336}" dt="2024-09-11T07:19:23.066" v="3331" actId="20577"/>
-        <pc:sldMkLst>
-          <pc:docMk/>
-          <pc:sldMk cId="1617268802" sldId="263"/>
-        </pc:sldMkLst>
-      </pc:sldChg>
-      <pc:sldChg chg="modSp add mod">
-        <pc:chgData name="Toby Donaldson" userId="2e6e5431-bb17-4c41-9985-d39c50d83c73" providerId="ADAL" clId="{2836AFBC-50E4-4BA5-B026-B044CA7C8336}" dt="2024-09-11T07:19:36.449" v="3332" actId="20577"/>
-        <pc:sldMkLst>
-          <pc:docMk/>
-          <pc:sldMk cId="3937816594" sldId="264"/>
-        </pc:sldMkLst>
-      </pc:sldChg>
-      <pc:sldChg chg="modSp add mod">
-        <pc:chgData name="Toby Donaldson" userId="2e6e5431-bb17-4c41-9985-d39c50d83c73" providerId="ADAL" clId="{2836AFBC-50E4-4BA5-B026-B044CA7C8336}" dt="2024-09-11T07:44:48.072" v="6070" actId="1076"/>
-        <pc:sldMkLst>
-          <pc:docMk/>
-          <pc:sldMk cId="3853224143" sldId="265"/>
-        </pc:sldMkLst>
-      </pc:sldChg>
-      <pc:sldChg chg="modSp add mod">
-        <pc:chgData name="Toby Donaldson" userId="2e6e5431-bb17-4c41-9985-d39c50d83c73" providerId="ADAL" clId="{2836AFBC-50E4-4BA5-B026-B044CA7C8336}" dt="2024-09-11T07:30:46.600" v="4648" actId="20577"/>
-        <pc:sldMkLst>
-          <pc:docMk/>
-          <pc:sldMk cId="2910585830" sldId="266"/>
-        </pc:sldMkLst>
-      </pc:sldChg>
-      <pc:sldChg chg="modSp add mod">
-        <pc:chgData name="Toby Donaldson" userId="2e6e5431-bb17-4c41-9985-d39c50d83c73" providerId="ADAL" clId="{2836AFBC-50E4-4BA5-B026-B044CA7C8336}" dt="2024-09-11T07:38:39.700" v="5585" actId="20577"/>
-        <pc:sldMkLst>
-          <pc:docMk/>
-          <pc:sldMk cId="598370551" sldId="267"/>
-        </pc:sldMkLst>
-      </pc:sldChg>
-      <pc:sldChg chg="modSp add mod">
-        <pc:chgData name="Toby Donaldson" userId="2e6e5431-bb17-4c41-9985-d39c50d83c73" providerId="ADAL" clId="{2836AFBC-50E4-4BA5-B026-B044CA7C8336}" dt="2024-09-11T07:43:15.840" v="6069" actId="20577"/>
-        <pc:sldMkLst>
-          <pc:docMk/>
-          <pc:sldMk cId="299047572" sldId="268"/>
-        </pc:sldMkLst>
-      </pc:sldChg>
-    </pc:docChg>
-  </pc:docChgLst>
-  <pc:docChgLst>
-    <pc:chgData name="Toby Donaldson" userId="2e6e5431-bb17-4c41-9985-d39c50d83c73" providerId="ADAL" clId="{EA054A64-5B38-49EC-A615-F0CC9AC2E0FE}"/>
-    <pc:docChg chg="custSel addSld modSld">
-      <pc:chgData name="Toby Donaldson" userId="2e6e5431-bb17-4c41-9985-d39c50d83c73" providerId="ADAL" clId="{EA054A64-5B38-49EC-A615-F0CC9AC2E0FE}" dt="2024-09-11T20:28:39.905" v="227" actId="20577"/>
-      <pc:docMkLst>
-        <pc:docMk/>
-      </pc:docMkLst>
-      <pc:sldChg chg="modSp mod">
-        <pc:chgData name="Toby Donaldson" userId="2e6e5431-bb17-4c41-9985-d39c50d83c73" providerId="ADAL" clId="{EA054A64-5B38-49EC-A615-F0CC9AC2E0FE}" dt="2024-09-11T20:13:31.048" v="6" actId="20577"/>
-        <pc:sldMkLst>
-          <pc:docMk/>
-          <pc:sldMk cId="1433169316" sldId="257"/>
-        </pc:sldMkLst>
-      </pc:sldChg>
-      <pc:sldChg chg="modSp mod">
-        <pc:chgData name="Toby Donaldson" userId="2e6e5431-bb17-4c41-9985-d39c50d83c73" providerId="ADAL" clId="{EA054A64-5B38-49EC-A615-F0CC9AC2E0FE}" dt="2024-09-11T20:13:55.764" v="11" actId="5793"/>
-        <pc:sldMkLst>
-          <pc:docMk/>
-          <pc:sldMk cId="2692445676" sldId="258"/>
-        </pc:sldMkLst>
-      </pc:sldChg>
-      <pc:sldChg chg="modSp mod">
-        <pc:chgData name="Toby Donaldson" userId="2e6e5431-bb17-4c41-9985-d39c50d83c73" providerId="ADAL" clId="{EA054A64-5B38-49EC-A615-F0CC9AC2E0FE}" dt="2024-09-11T20:15:32.485" v="127" actId="1076"/>
-        <pc:sldMkLst>
-          <pc:docMk/>
-          <pc:sldMk cId="2756254005" sldId="259"/>
-        </pc:sldMkLst>
-      </pc:sldChg>
-      <pc:sldChg chg="modSp mod">
-        <pc:chgData name="Toby Donaldson" userId="2e6e5431-bb17-4c41-9985-d39c50d83c73" providerId="ADAL" clId="{EA054A64-5B38-49EC-A615-F0CC9AC2E0FE}" dt="2024-09-11T20:15:57.656" v="130" actId="20577"/>
-        <pc:sldMkLst>
-          <pc:docMk/>
-          <pc:sldMk cId="938849494" sldId="260"/>
-        </pc:sldMkLst>
-      </pc:sldChg>
-      <pc:sldChg chg="modSp mod">
-        <pc:chgData name="Toby Donaldson" userId="2e6e5431-bb17-4c41-9985-d39c50d83c73" providerId="ADAL" clId="{EA054A64-5B38-49EC-A615-F0CC9AC2E0FE}" dt="2024-09-11T20:19:33.298" v="138" actId="20577"/>
-        <pc:sldMkLst>
-          <pc:docMk/>
-          <pc:sldMk cId="3937816594" sldId="264"/>
-        </pc:sldMkLst>
-      </pc:sldChg>
-      <pc:sldChg chg="modSp mod">
-        <pc:chgData name="Toby Donaldson" userId="2e6e5431-bb17-4c41-9985-d39c50d83c73" providerId="ADAL" clId="{EA054A64-5B38-49EC-A615-F0CC9AC2E0FE}" dt="2024-09-11T20:20:12.493" v="168" actId="14100"/>
-        <pc:sldMkLst>
-          <pc:docMk/>
-          <pc:sldMk cId="3853224143" sldId="265"/>
-        </pc:sldMkLst>
-      </pc:sldChg>
-      <pc:sldChg chg="modSp mod">
-        <pc:chgData name="Toby Donaldson" userId="2e6e5431-bb17-4c41-9985-d39c50d83c73" providerId="ADAL" clId="{EA054A64-5B38-49EC-A615-F0CC9AC2E0FE}" dt="2024-09-11T20:21:32.947" v="171" actId="14100"/>
-        <pc:sldMkLst>
-          <pc:docMk/>
-          <pc:sldMk cId="2910585830" sldId="266"/>
-        </pc:sldMkLst>
-      </pc:sldChg>
-      <pc:sldChg chg="modSp mod">
-        <pc:chgData name="Toby Donaldson" userId="2e6e5431-bb17-4c41-9985-d39c50d83c73" providerId="ADAL" clId="{EA054A64-5B38-49EC-A615-F0CC9AC2E0FE}" dt="2024-09-11T20:22:42.005" v="173" actId="20577"/>
-        <pc:sldMkLst>
-          <pc:docMk/>
-          <pc:sldMk cId="598370551" sldId="267"/>
-        </pc:sldMkLst>
-      </pc:sldChg>
-      <pc:sldChg chg="addSp delSp modSp add mod">
-        <pc:chgData name="Toby Donaldson" userId="2e6e5431-bb17-4c41-9985-d39c50d83c73" providerId="ADAL" clId="{EA054A64-5B38-49EC-A615-F0CC9AC2E0FE}" dt="2024-09-11T20:15:35.901" v="128"/>
-        <pc:sldMkLst>
-          <pc:docMk/>
-          <pc:sldMk cId="3348444406" sldId="269"/>
-        </pc:sldMkLst>
-      </pc:sldChg>
-      <pc:sldChg chg="addSp modSp new mod">
-        <pc:chgData name="Toby Donaldson" userId="2e6e5431-bb17-4c41-9985-d39c50d83c73" providerId="ADAL" clId="{EA054A64-5B38-49EC-A615-F0CC9AC2E0FE}" dt="2024-09-11T20:28:39.905" v="227" actId="20577"/>
-        <pc:sldMkLst>
-          <pc:docMk/>
-          <pc:sldMk cId="2283882614" sldId="270"/>
-        </pc:sldMkLst>
+        <pc:spChg chg="mod">
+          <ac:chgData name="Toby Donaldson" userId="2e6e5431-bb17-4c41-9985-d39c50d83c73" providerId="ADAL" clId="{7F9681A8-EEE2-56F4-9B39-ECCBEE0471AC}" dt="2025-12-08T22:50:20.237" v="1276" actId="20577"/>
+          <ac:spMkLst>
+            <pc:docMk/>
+            <pc:sldMk cId="63370177" sldId="271"/>
+            <ac:spMk id="4" creationId="{ED0B9EDC-F6B3-EAF2-75AF-CEACDB15C3C2}"/>
+          </ac:spMkLst>
+        </pc:spChg>
       </pc:sldChg>
     </pc:docChg>
   </pc:docChgLst>
@@ -522,7 +579,7 @@
           <a:p>
             <a:fld id="{E2CDF564-AA16-4F8A-8361-C9076F43B828}" type="datetimeFigureOut">
               <a:rPr lang="en-CA" smtClean="0"/>
-              <a:t>2025-10-15</a:t>
+              <a:t>2025-12-08</a:t>
             </a:fld>
             <a:endParaRPr lang="en-CA"/>
           </a:p>
@@ -722,7 +779,7 @@
           <a:p>
             <a:fld id="{E2CDF564-AA16-4F8A-8361-C9076F43B828}" type="datetimeFigureOut">
               <a:rPr lang="en-CA" smtClean="0"/>
-              <a:t>2025-10-15</a:t>
+              <a:t>2025-12-08</a:t>
             </a:fld>
             <a:endParaRPr lang="en-CA"/>
           </a:p>
@@ -932,7 +989,7 @@
           <a:p>
             <a:fld id="{E2CDF564-AA16-4F8A-8361-C9076F43B828}" type="datetimeFigureOut">
               <a:rPr lang="en-CA" smtClean="0"/>
-              <a:t>2025-10-15</a:t>
+              <a:t>2025-12-08</a:t>
             </a:fld>
             <a:endParaRPr lang="en-CA"/>
           </a:p>
@@ -1132,7 +1189,7 @@
           <a:p>
             <a:fld id="{E2CDF564-AA16-4F8A-8361-C9076F43B828}" type="datetimeFigureOut">
               <a:rPr lang="en-CA" smtClean="0"/>
-              <a:t>2025-10-15</a:t>
+              <a:t>2025-12-08</a:t>
             </a:fld>
             <a:endParaRPr lang="en-CA"/>
           </a:p>
@@ -1408,7 +1465,7 @@
           <a:p>
             <a:fld id="{E2CDF564-AA16-4F8A-8361-C9076F43B828}" type="datetimeFigureOut">
               <a:rPr lang="en-CA" smtClean="0"/>
-              <a:t>2025-10-15</a:t>
+              <a:t>2025-12-08</a:t>
             </a:fld>
             <a:endParaRPr lang="en-CA"/>
           </a:p>
@@ -1676,7 +1733,7 @@
           <a:p>
             <a:fld id="{E2CDF564-AA16-4F8A-8361-C9076F43B828}" type="datetimeFigureOut">
               <a:rPr lang="en-CA" smtClean="0"/>
-              <a:t>2025-10-15</a:t>
+              <a:t>2025-12-08</a:t>
             </a:fld>
             <a:endParaRPr lang="en-CA"/>
           </a:p>
@@ -2091,7 +2148,7 @@
           <a:p>
             <a:fld id="{E2CDF564-AA16-4F8A-8361-C9076F43B828}" type="datetimeFigureOut">
               <a:rPr lang="en-CA" smtClean="0"/>
-              <a:t>2025-10-15</a:t>
+              <a:t>2025-12-08</a:t>
             </a:fld>
             <a:endParaRPr lang="en-CA"/>
           </a:p>
@@ -2233,7 +2290,7 @@
           <a:p>
             <a:fld id="{E2CDF564-AA16-4F8A-8361-C9076F43B828}" type="datetimeFigureOut">
               <a:rPr lang="en-CA" smtClean="0"/>
-              <a:t>2025-10-15</a:t>
+              <a:t>2025-12-08</a:t>
             </a:fld>
             <a:endParaRPr lang="en-CA"/>
           </a:p>
@@ -2346,7 +2403,7 @@
           <a:p>
             <a:fld id="{E2CDF564-AA16-4F8A-8361-C9076F43B828}" type="datetimeFigureOut">
               <a:rPr lang="en-CA" smtClean="0"/>
-              <a:t>2025-10-15</a:t>
+              <a:t>2025-12-08</a:t>
             </a:fld>
             <a:endParaRPr lang="en-CA"/>
           </a:p>
@@ -2659,7 +2716,7 @@
           <a:p>
             <a:fld id="{E2CDF564-AA16-4F8A-8361-C9076F43B828}" type="datetimeFigureOut">
               <a:rPr lang="en-CA" smtClean="0"/>
-              <a:t>2025-10-15</a:t>
+              <a:t>2025-12-08</a:t>
             </a:fld>
             <a:endParaRPr lang="en-CA"/>
           </a:p>
@@ -2948,7 +3005,7 @@
           <a:p>
             <a:fld id="{E2CDF564-AA16-4F8A-8361-C9076F43B828}" type="datetimeFigureOut">
               <a:rPr lang="en-CA" smtClean="0"/>
-              <a:t>2025-10-15</a:t>
+              <a:t>2025-12-08</a:t>
             </a:fld>
             <a:endParaRPr lang="en-CA"/>
           </a:p>
@@ -3191,7 +3248,7 @@
           <a:p>
             <a:fld id="{E2CDF564-AA16-4F8A-8361-C9076F43B828}" type="datetimeFigureOut">
               <a:rPr lang="en-CA" smtClean="0"/>
-              <a:t>2025-10-15</a:t>
+              <a:t>2025-12-08</a:t>
             </a:fld>
             <a:endParaRPr lang="en-CA"/>
           </a:p>
@@ -3729,7 +3786,7 @@
           <a:p>
             <a:r>
               <a:rPr lang="en-CA" dirty="0"/>
-              <a:t>C++ Language</a:t>
+              <a:t>C Language</a:t>
             </a:r>
           </a:p>
         </p:txBody>
@@ -3750,10 +3807,15 @@
             <p:ph idx="1"/>
           </p:nvPr>
         </p:nvSpPr>
-        <p:spPr/>
+        <p:spPr>
+          <a:xfrm>
+            <a:off x="838200" y="1825625"/>
+            <a:ext cx="6519041" cy="4351338"/>
+          </a:xfrm>
+        </p:spPr>
         <p:txBody>
           <a:bodyPr>
-            <a:normAutofit lnSpcReduction="10000"/>
+            <a:normAutofit/>
           </a:bodyPr>
           <a:lstStyle/>
           <a:p>
@@ -3765,7 +3827,21 @@
                 <a:effectLst/>
                 <a:latin typeface="Consolas" panose="020B0609020204030204" pitchFamily="49" charset="0"/>
               </a:rPr>
-              <a:t>#include &lt;iostream&gt;</a:t>
+              <a:t>#include &lt;</a:t>
+            </a:r>
+            <a:r>
+              <a:rPr lang="en-US" b="0" dirty="0" err="1">
+                <a:effectLst/>
+                <a:latin typeface="Consolas" panose="020B0609020204030204" pitchFamily="49" charset="0"/>
+              </a:rPr>
+              <a:t>stdio.h</a:t>
+            </a:r>
+            <a:r>
+              <a:rPr lang="en-US" b="0" dirty="0">
+                <a:effectLst/>
+                <a:latin typeface="Consolas" panose="020B0609020204030204" pitchFamily="49" charset="0"/>
+              </a:rPr>
+              <a:t>&gt;</a:t>
             </a:r>
           </a:p>
           <a:p>
@@ -3786,17 +3862,20 @@
                 <a:effectLst/>
                 <a:latin typeface="Consolas" panose="020B0609020204030204" pitchFamily="49" charset="0"/>
               </a:rPr>
-              <a:t>using namespace std;</a:t>
+              <a:t>int main() </a:t>
             </a:r>
           </a:p>
           <a:p>
             <a:pPr marL="0" indent="0">
               <a:buNone/>
             </a:pPr>
-            <a:endParaRPr lang="en-US" b="0" dirty="0">
-              <a:effectLst/>
-              <a:latin typeface="Consolas" panose="020B0609020204030204" pitchFamily="49" charset="0"/>
-            </a:endParaRPr>
+            <a:r>
+              <a:rPr lang="en-US" b="0" dirty="0">
+                <a:effectLst/>
+                <a:latin typeface="Consolas" panose="020B0609020204030204" pitchFamily="49" charset="0"/>
+              </a:rPr>
+              <a:t>{</a:t>
+            </a:r>
           </a:p>
           <a:p>
             <a:pPr marL="0" indent="0">
@@ -3807,45 +3886,21 @@
                 <a:effectLst/>
                 <a:latin typeface="Consolas" panose="020B0609020204030204" pitchFamily="49" charset="0"/>
               </a:rPr>
-              <a:t>int main() </a:t>
-            </a:r>
-          </a:p>
-          <a:p>
-            <a:pPr marL="0" indent="0">
-              <a:buNone/>
-            </a:pPr>
+              <a:t>    </a:t>
+            </a:r>
+            <a:r>
+              <a:rPr lang="en-US" b="0" dirty="0" err="1">
+                <a:effectLst/>
+                <a:latin typeface="Consolas" panose="020B0609020204030204" pitchFamily="49" charset="0"/>
+              </a:rPr>
+              <a:t>printf</a:t>
+            </a:r>
             <a:r>
               <a:rPr lang="en-US" b="0" dirty="0">
                 <a:effectLst/>
                 <a:latin typeface="Consolas" panose="020B0609020204030204" pitchFamily="49" charset="0"/>
               </a:rPr>
-              <a:t>{</a:t>
-            </a:r>
-          </a:p>
-          <a:p>
-            <a:pPr marL="0" indent="0">
-              <a:buNone/>
-            </a:pPr>
-            <a:r>
-              <a:rPr lang="en-US" b="0" dirty="0">
-                <a:effectLst/>
-                <a:latin typeface="Consolas" panose="020B0609020204030204" pitchFamily="49" charset="0"/>
-              </a:rPr>
-              <a:t>    cout &lt;&lt; "Hello, World!" &lt;&lt; </a:t>
-            </a:r>
-            <a:r>
-              <a:rPr lang="en-US" b="0" dirty="0" err="1">
-                <a:effectLst/>
-                <a:latin typeface="Consolas" panose="020B0609020204030204" pitchFamily="49" charset="0"/>
-              </a:rPr>
-              <a:t>endl</a:t>
-            </a:r>
-            <a:r>
-              <a:rPr lang="en-US" b="0" dirty="0">
-                <a:effectLst/>
-                <a:latin typeface="Consolas" panose="020B0609020204030204" pitchFamily="49" charset="0"/>
-              </a:rPr>
-              <a:t>;</a:t>
+              <a:t>("Hello, World!\n");</a:t>
             </a:r>
           </a:p>
           <a:p>
@@ -3889,8 +3944,8 @@
         </p:nvSpPr>
         <p:spPr>
           <a:xfrm>
-            <a:off x="8025064" y="2154634"/>
-            <a:ext cx="3850320" cy="3139321"/>
+            <a:off x="7567449" y="544652"/>
+            <a:ext cx="4066198" cy="4524315"/>
           </a:xfrm>
           <a:prstGeom prst="rect">
             <a:avLst/>
@@ -3907,35 +3962,94 @@
           <a:p>
             <a:r>
               <a:rPr lang="en-CA" b="1" dirty="0"/>
-              <a:t>C++</a:t>
-            </a:r>
-            <a:r>
-              <a:rPr lang="en-CA" dirty="0"/>
-              <a:t> is essentially C but with extra features, such as object-oriented programming (OOP) and generics. </a:t>
-            </a:r>
-          </a:p>
-          <a:p>
-            <a:endParaRPr lang="en-CA" dirty="0"/>
+              <a:t>C</a:t>
+            </a:r>
+            <a:r>
+              <a:rPr lang="en-CA" dirty="0"/>
+              <a:t> is an extremely influential language originally designed to write the </a:t>
+            </a:r>
+            <a:r>
+              <a:rPr lang="en-CA" b="1" dirty="0"/>
+              <a:t>Unix</a:t>
+            </a:r>
+            <a:r>
+              <a:rPr lang="en-CA" dirty="0"/>
+              <a:t> operating system in the 1970s. Compared to most other programming languages it is quite low-level and fast.</a:t>
+            </a:r>
           </a:p>
           <a:p>
             <a:r>
               <a:rPr lang="en-CA" b="1" dirty="0"/>
               <a:t>Pros</a:t>
             </a:r>
-            <a:r>
-              <a:rPr lang="en-CA" dirty="0"/>
-              <a:t>: fast, flexible, often easier than C, more support for writing big programs</a:t>
-            </a:r>
-            <a:br>
-              <a:rPr lang="en-CA" dirty="0"/>
-            </a:br>
+            <a:endParaRPr lang="en-CA" dirty="0"/>
+          </a:p>
+          <a:p>
+            <a:pPr marL="285750" indent="-285750">
+              <a:buFont typeface="Arial" panose="020B0604020202020204" pitchFamily="34" charset="0"/>
+              <a:buChar char="•"/>
+            </a:pPr>
+            <a:r>
+              <a:rPr lang="en-CA" dirty="0"/>
+              <a:t>fast, flexible</a:t>
+            </a:r>
+          </a:p>
+          <a:p>
+            <a:pPr marL="285750" indent="-285750">
+              <a:buFont typeface="Arial" panose="020B0604020202020204" pitchFamily="34" charset="0"/>
+              <a:buChar char="•"/>
+            </a:pPr>
+            <a:r>
+              <a:rPr lang="en-CA" dirty="0"/>
+              <a:t>easier than assembly</a:t>
+            </a:r>
+          </a:p>
+          <a:p>
+            <a:pPr marL="285750" indent="-285750">
+              <a:buFont typeface="Arial" panose="020B0604020202020204" pitchFamily="34" charset="0"/>
+              <a:buChar char="•"/>
+            </a:pPr>
+            <a:r>
+              <a:rPr lang="en-CA" dirty="0"/>
+              <a:t>portable across computers</a:t>
+            </a:r>
+            <a:endParaRPr lang="en-CA" b="1" dirty="0"/>
+          </a:p>
+          <a:p>
             <a:r>
               <a:rPr lang="en-CA" b="1" dirty="0"/>
               <a:t>Cons</a:t>
             </a:r>
-            <a:r>
-              <a:rPr lang="en-CA" dirty="0"/>
-              <a:t>: huge and complex; still relatively low-level,  i.e. like C and assembly, memory is managed manually (no garbage collection)</a:t>
+            <a:endParaRPr lang="en-CA" dirty="0"/>
+          </a:p>
+          <a:p>
+            <a:pPr marL="285750" indent="-285750">
+              <a:buFont typeface="Arial" panose="020B0604020202020204" pitchFamily="34" charset="0"/>
+              <a:buChar char="•"/>
+            </a:pPr>
+            <a:r>
+              <a:rPr lang="en-CA" dirty="0"/>
+              <a:t>not very “programmer friendly”</a:t>
+            </a:r>
+          </a:p>
+          <a:p>
+            <a:pPr marL="285750" indent="-285750">
+              <a:buFont typeface="Arial" panose="020B0604020202020204" pitchFamily="34" charset="0"/>
+              <a:buChar char="•"/>
+            </a:pPr>
+            <a:r>
+              <a:rPr lang="en-CA" dirty="0"/>
+              <a:t>designed for programs like operating systems or hardware, and often difficult to use for other applications</a:t>
+            </a:r>
+          </a:p>
+          <a:p>
+            <a:pPr marL="285750" indent="-285750">
+              <a:buFont typeface="Arial" panose="020B0604020202020204" pitchFamily="34" charset="0"/>
+              <a:buChar char="•"/>
+            </a:pPr>
+            <a:r>
+              <a:rPr lang="en-CA" dirty="0"/>
+              <a:t>manual memory management (no garbage collection)</a:t>
             </a:r>
           </a:p>
         </p:txBody>
@@ -3943,7 +4057,7 @@
     </p:spTree>
     <p:extLst>
       <p:ext uri="{BB962C8B-B14F-4D97-AF65-F5344CB8AC3E}">
-        <p14:creationId xmlns:p14="http://schemas.microsoft.com/office/powerpoint/2010/main" val="3937816594"/>
+        <p14:creationId xmlns:p14="http://schemas.microsoft.com/office/powerpoint/2010/main" val="1617268802"/>
       </p:ext>
     </p:extLst>
   </p:cSld>
@@ -3993,7 +4107,7 @@
           <a:p>
             <a:r>
               <a:rPr lang="en-CA" dirty="0"/>
-              <a:t>Java Language</a:t>
+              <a:t>C++ Language</a:t>
             </a:r>
           </a:p>
         </p:txBody>
@@ -4017,7 +4131,7 @@
         <p:spPr/>
         <p:txBody>
           <a:bodyPr>
-            <a:normAutofit/>
+            <a:normAutofit lnSpcReduction="10000"/>
           </a:bodyPr>
           <a:lstStyle/>
           <a:p>
@@ -4029,33 +4143,87 @@
                 <a:effectLst/>
                 <a:latin typeface="Consolas" panose="020B0609020204030204" pitchFamily="49" charset="0"/>
               </a:rPr>
-              <a:t>public class HelloWorld {</a:t>
+              <a:t>#include &lt;iostream&gt;</a:t>
             </a:r>
           </a:p>
           <a:p>
             <a:pPr marL="0" indent="0">
               <a:buNone/>
             </a:pPr>
+            <a:endParaRPr lang="en-US" b="0" dirty="0">
+              <a:effectLst/>
+              <a:latin typeface="Consolas" panose="020B0609020204030204" pitchFamily="49" charset="0"/>
+            </a:endParaRPr>
+          </a:p>
+          <a:p>
+            <a:pPr marL="0" indent="0">
+              <a:buNone/>
+            </a:pPr>
             <a:r>
               <a:rPr lang="en-US" b="0" dirty="0">
                 <a:effectLst/>
                 <a:latin typeface="Consolas" panose="020B0609020204030204" pitchFamily="49" charset="0"/>
               </a:rPr>
-              <a:t>    public static void main(String[] </a:t>
+              <a:t>using namespace std;</a:t>
+            </a:r>
+          </a:p>
+          <a:p>
+            <a:pPr marL="0" indent="0">
+              <a:buNone/>
+            </a:pPr>
+            <a:endParaRPr lang="en-US" b="0" dirty="0">
+              <a:effectLst/>
+              <a:latin typeface="Consolas" panose="020B0609020204030204" pitchFamily="49" charset="0"/>
+            </a:endParaRPr>
+          </a:p>
+          <a:p>
+            <a:pPr marL="0" indent="0">
+              <a:buNone/>
+            </a:pPr>
+            <a:r>
+              <a:rPr lang="en-US" b="0" dirty="0">
+                <a:effectLst/>
+                <a:latin typeface="Consolas" panose="020B0609020204030204" pitchFamily="49" charset="0"/>
+              </a:rPr>
+              <a:t>int main() </a:t>
+            </a:r>
+          </a:p>
+          <a:p>
+            <a:pPr marL="0" indent="0">
+              <a:buNone/>
+            </a:pPr>
+            <a:r>
+              <a:rPr lang="en-US" b="0" dirty="0">
+                <a:effectLst/>
+                <a:latin typeface="Consolas" panose="020B0609020204030204" pitchFamily="49" charset="0"/>
+              </a:rPr>
+              <a:t>{</a:t>
+            </a:r>
+          </a:p>
+          <a:p>
+            <a:pPr marL="0" indent="0">
+              <a:buNone/>
+            </a:pPr>
+            <a:r>
+              <a:rPr lang="en-US" b="0" dirty="0">
+                <a:effectLst/>
+                <a:latin typeface="Consolas" panose="020B0609020204030204" pitchFamily="49" charset="0"/>
+              </a:rPr>
+              <a:t>    cout &lt;&lt; "Hello, World!" &lt;&lt; </a:t>
             </a:r>
             <a:r>
               <a:rPr lang="en-US" b="0" dirty="0" err="1">
                 <a:effectLst/>
                 <a:latin typeface="Consolas" panose="020B0609020204030204" pitchFamily="49" charset="0"/>
               </a:rPr>
-              <a:t>args</a:t>
+              <a:t>endl</a:t>
             </a:r>
             <a:r>
               <a:rPr lang="en-US" b="0" dirty="0">
                 <a:effectLst/>
                 <a:latin typeface="Consolas" panose="020B0609020204030204" pitchFamily="49" charset="0"/>
               </a:rPr>
-              <a:t>) {</a:t>
+              <a:t>;</a:t>
             </a:r>
           </a:p>
           <a:p>
@@ -4067,33 +4235,7 @@
                 <a:effectLst/>
                 <a:latin typeface="Consolas" panose="020B0609020204030204" pitchFamily="49" charset="0"/>
               </a:rPr>
-              <a:t>        </a:t>
-            </a:r>
-            <a:r>
-              <a:rPr lang="en-US" b="0" dirty="0" err="1">
-                <a:effectLst/>
-                <a:latin typeface="Consolas" panose="020B0609020204030204" pitchFamily="49" charset="0"/>
-              </a:rPr>
-              <a:t>System.out.println</a:t>
-            </a:r>
-            <a:r>
-              <a:rPr lang="en-US" b="0" dirty="0">
-                <a:effectLst/>
-                <a:latin typeface="Consolas" panose="020B0609020204030204" pitchFamily="49" charset="0"/>
-              </a:rPr>
-              <a:t>("Hello, World!");</a:t>
-            </a:r>
-          </a:p>
-          <a:p>
-            <a:pPr marL="0" indent="0">
-              <a:buNone/>
-            </a:pPr>
-            <a:r>
-              <a:rPr lang="en-US" b="0" dirty="0">
-                <a:effectLst/>
-                <a:latin typeface="Consolas" panose="020B0609020204030204" pitchFamily="49" charset="0"/>
-              </a:rPr>
-              <a:t>    }</a:t>
+              <a:t>    return 0;</a:t>
             </a:r>
           </a:p>
           <a:p>
@@ -4125,8 +4267,8 @@
         </p:nvSpPr>
         <p:spPr>
           <a:xfrm>
-            <a:off x="5019261" y="3474714"/>
-            <a:ext cx="6158446" cy="2585323"/>
+            <a:off x="8151188" y="1166842"/>
+            <a:ext cx="3850320" cy="4524315"/>
           </a:xfrm>
           <a:prstGeom prst="rect">
             <a:avLst/>
@@ -4143,11 +4285,11 @@
           <a:p>
             <a:r>
               <a:rPr lang="en-CA" b="1" dirty="0"/>
-              <a:t>Java </a:t>
-            </a:r>
-            <a:r>
-              <a:rPr lang="en-CA" dirty="0"/>
-              <a:t>was designed as an alternative to C++, but a  little more programmer friendly and with a stronger commitment to object-oriented programming (OOP).</a:t>
+              <a:t>C++</a:t>
+            </a:r>
+            <a:r>
+              <a:rPr lang="en-CA" dirty="0"/>
+              <a:t> is essentially C but with extra features, such as object-oriented programming (OOP) and generics. </a:t>
             </a:r>
           </a:p>
           <a:p>
@@ -4158,20 +4300,71 @@
               <a:rPr lang="en-CA" b="1" dirty="0"/>
               <a:t>Pros</a:t>
             </a:r>
-            <a:r>
-              <a:rPr lang="en-CA" dirty="0"/>
-              <a:t>: OOP is built-in; has garbage collection: memory management is automatic; on the surface, looks like C/C++; catches more errors than C/C++</a:t>
-            </a:r>
-            <a:br>
-              <a:rPr lang="en-CA" dirty="0"/>
-            </a:br>
+          </a:p>
+          <a:p>
+            <a:pPr marL="285750" indent="-285750">
+              <a:buFont typeface="Arial" panose="020B0604020202020204" pitchFamily="34" charset="0"/>
+              <a:buChar char="•"/>
+            </a:pPr>
+            <a:r>
+              <a:rPr lang="en-CA" dirty="0"/>
+              <a:t>fast, flexible</a:t>
+            </a:r>
+          </a:p>
+          <a:p>
+            <a:pPr marL="285750" indent="-285750">
+              <a:buFont typeface="Arial" panose="020B0604020202020204" pitchFamily="34" charset="0"/>
+              <a:buChar char="•"/>
+            </a:pPr>
+            <a:r>
+              <a:rPr lang="en-CA" dirty="0"/>
+              <a:t>often easier than C</a:t>
+            </a:r>
+          </a:p>
+          <a:p>
+            <a:pPr marL="285750" indent="-285750">
+              <a:buFont typeface="Arial" panose="020B0604020202020204" pitchFamily="34" charset="0"/>
+              <a:buChar char="•"/>
+            </a:pPr>
+            <a:r>
+              <a:rPr lang="en-CA" dirty="0"/>
+              <a:t>more support for writing big programs</a:t>
+            </a:r>
+          </a:p>
+          <a:p>
             <a:r>
               <a:rPr lang="en-CA" b="1" dirty="0"/>
               <a:t>Cons</a:t>
             </a:r>
-            <a:r>
-              <a:rPr lang="en-CA" dirty="0"/>
-              <a:t>: verbose --- many simple programs are quite long; OOP is not optional --- OOP is not the best choice for everything</a:t>
+          </a:p>
+          <a:p>
+            <a:pPr marL="285750" indent="-285750">
+              <a:buFont typeface="Arial" panose="020B0604020202020204" pitchFamily="34" charset="0"/>
+              <a:buChar char="•"/>
+            </a:pPr>
+            <a:r>
+              <a:rPr lang="en-CA" dirty="0"/>
+              <a:t>huge and complex (new features added all the time; old features rarely removed)</a:t>
+            </a:r>
+          </a:p>
+          <a:p>
+            <a:pPr marL="285750" indent="-285750">
+              <a:buFont typeface="Arial" panose="020B0604020202020204" pitchFamily="34" charset="0"/>
+              <a:buChar char="•"/>
+            </a:pPr>
+            <a:r>
+              <a:rPr lang="en-CA" dirty="0"/>
+              <a:t>still relatively low-level</a:t>
+            </a:r>
+          </a:p>
+          <a:p>
+            <a:pPr marL="285750" indent="-285750">
+              <a:buFont typeface="Arial" panose="020B0604020202020204" pitchFamily="34" charset="0"/>
+              <a:buChar char="•"/>
+            </a:pPr>
+            <a:r>
+              <a:rPr lang="en-CA" dirty="0"/>
+              <a:t>memory is managed manually (no garbage collection)</a:t>
             </a:r>
           </a:p>
         </p:txBody>
@@ -4179,7 +4372,7 @@
     </p:spTree>
     <p:extLst>
       <p:ext uri="{BB962C8B-B14F-4D97-AF65-F5344CB8AC3E}">
-        <p14:creationId xmlns:p14="http://schemas.microsoft.com/office/powerpoint/2010/main" val="3853224143"/>
+        <p14:creationId xmlns:p14="http://schemas.microsoft.com/office/powerpoint/2010/main" val="3937816594"/>
       </p:ext>
     </p:extLst>
   </p:cSld>
@@ -4229,7 +4422,7 @@
           <a:p>
             <a:r>
               <a:rPr lang="en-CA" dirty="0"/>
-              <a:t>Go Language</a:t>
+              <a:t>Java Language</a:t>
             </a:r>
           </a:p>
         </p:txBody>
@@ -4250,12 +4443,7 @@
             <p:ph idx="1"/>
           </p:nvPr>
         </p:nvSpPr>
-        <p:spPr>
-          <a:xfrm>
-            <a:off x="374986" y="2060241"/>
-            <a:ext cx="10515600" cy="4351338"/>
-          </a:xfrm>
-        </p:spPr>
+        <p:spPr/>
         <p:txBody>
           <a:bodyPr>
             <a:normAutofit/>
@@ -4270,17 +4458,34 @@
                 <a:effectLst/>
                 <a:latin typeface="Consolas" panose="020B0609020204030204" pitchFamily="49" charset="0"/>
               </a:rPr>
-              <a:t>package main</a:t>
+              <a:t>public class HelloWorld {</a:t>
             </a:r>
           </a:p>
           <a:p>
             <a:pPr marL="0" indent="0">
               <a:buNone/>
             </a:pPr>
-            <a:endParaRPr lang="en-US" b="0" dirty="0">
-              <a:effectLst/>
-              <a:latin typeface="Consolas" panose="020B0609020204030204" pitchFamily="49" charset="0"/>
-            </a:endParaRPr>
+            <a:r>
+              <a:rPr lang="en-US" b="0" dirty="0">
+                <a:effectLst/>
+                <a:latin typeface="Consolas" panose="020B0609020204030204" pitchFamily="49" charset="0"/>
+              </a:rPr>
+              <a:t>    public static void main(String[] </a:t>
+            </a:r>
+            <a:r>
+              <a:rPr lang="en-US" b="0" dirty="0" err="1">
+                <a:effectLst/>
+                <a:latin typeface="Consolas" panose="020B0609020204030204" pitchFamily="49" charset="0"/>
+              </a:rPr>
+              <a:t>args</a:t>
+            </a:r>
+            <a:r>
+              <a:rPr lang="en-US" b="0" dirty="0">
+                <a:effectLst/>
+                <a:latin typeface="Consolas" panose="020B0609020204030204" pitchFamily="49" charset="0"/>
+              </a:rPr>
+              <a:t>) {</a:t>
+            </a:r>
           </a:p>
           <a:p>
             <a:pPr marL="0" indent="0">
@@ -4291,75 +4496,33 @@
                 <a:effectLst/>
                 <a:latin typeface="Consolas" panose="020B0609020204030204" pitchFamily="49" charset="0"/>
               </a:rPr>
-              <a:t>import "</a:t>
+              <a:t>        </a:t>
             </a:r>
             <a:r>
               <a:rPr lang="en-US" b="0" dirty="0" err="1">
                 <a:effectLst/>
                 <a:latin typeface="Consolas" panose="020B0609020204030204" pitchFamily="49" charset="0"/>
               </a:rPr>
-              <a:t>fmt</a:t>
+              <a:t>System.out.println</a:t>
             </a:r>
             <a:r>
               <a:rPr lang="en-US" b="0" dirty="0">
                 <a:effectLst/>
                 <a:latin typeface="Consolas" panose="020B0609020204030204" pitchFamily="49" charset="0"/>
               </a:rPr>
-              <a:t>"</a:t>
+              <a:t>("Hello, World!");</a:t>
             </a:r>
           </a:p>
           <a:p>
             <a:pPr marL="0" indent="0">
               <a:buNone/>
             </a:pPr>
-            <a:endParaRPr lang="en-US" b="0" dirty="0">
-              <a:effectLst/>
-              <a:latin typeface="Consolas" panose="020B0609020204030204" pitchFamily="49" charset="0"/>
-            </a:endParaRPr>
-          </a:p>
-          <a:p>
-            <a:pPr marL="0" indent="0">
-              <a:buNone/>
-            </a:pPr>
-            <a:r>
-              <a:rPr lang="en-US" b="0" dirty="0" err="1">
-                <a:effectLst/>
-                <a:latin typeface="Consolas" panose="020B0609020204030204" pitchFamily="49" charset="0"/>
-              </a:rPr>
-              <a:t>func</a:t>
-            </a:r>
             <a:r>
               <a:rPr lang="en-US" b="0" dirty="0">
                 <a:effectLst/>
                 <a:latin typeface="Consolas" panose="020B0609020204030204" pitchFamily="49" charset="0"/>
               </a:rPr>
-              <a:t> main() {</a:t>
-            </a:r>
-          </a:p>
-          <a:p>
-            <a:pPr marL="0" indent="0">
-              <a:buNone/>
-            </a:pPr>
-            <a:r>
-              <a:rPr lang="en-US" b="0" dirty="0">
-                <a:effectLst/>
-                <a:latin typeface="Consolas" panose="020B0609020204030204" pitchFamily="49" charset="0"/>
-              </a:rPr>
-              <a:t>    </a:t>
-            </a:r>
-            <a:r>
-              <a:rPr lang="en-US" b="0" dirty="0" err="1">
-                <a:effectLst/>
-                <a:latin typeface="Consolas" panose="020B0609020204030204" pitchFamily="49" charset="0"/>
-              </a:rPr>
-              <a:t>fmt.Println</a:t>
-            </a:r>
-            <a:r>
-              <a:rPr lang="en-US" b="0" dirty="0">
-                <a:effectLst/>
-                <a:latin typeface="Consolas" panose="020B0609020204030204" pitchFamily="49" charset="0"/>
-              </a:rPr>
-              <a:t>("Hello, World!")</a:t>
+              <a:t>    }</a:t>
             </a:r>
           </a:p>
           <a:p>
@@ -4391,8 +4554,8 @@
         </p:nvSpPr>
         <p:spPr>
           <a:xfrm>
-            <a:off x="5804452" y="228331"/>
-            <a:ext cx="6135447" cy="3693319"/>
+            <a:off x="5752403" y="3309176"/>
+            <a:ext cx="6158446" cy="3416320"/>
           </a:xfrm>
           <a:prstGeom prst="rect">
             <a:avLst/>
@@ -4409,11 +4572,27 @@
           <a:p>
             <a:r>
               <a:rPr lang="en-CA" b="1" dirty="0"/>
-              <a:t>Go </a:t>
-            </a:r>
-            <a:r>
-              <a:rPr lang="en-CA" dirty="0"/>
-              <a:t>is based on C but goes in a different direction than C++. It is more programmer friendly, simpler, and has automatic memory management. It is very popular for writing “server” programs, e.g. web servers, or applications that might have many users at the same time.</a:t>
+              <a:t>Java </a:t>
+            </a:r>
+            <a:r>
+              <a:rPr lang="en-CA" dirty="0"/>
+              <a:t>was designed as an alternative to C++, but a  little more programmer friendly and with a stronger commitment to </a:t>
+            </a:r>
+            <a:r>
+              <a:rPr lang="en-CA" b="1" dirty="0"/>
+              <a:t>object-oriented programming </a:t>
+            </a:r>
+            <a:r>
+              <a:rPr lang="en-CA" dirty="0"/>
+              <a:t>(</a:t>
+            </a:r>
+            <a:r>
+              <a:rPr lang="en-CA" b="1" dirty="0"/>
+              <a:t>OOP</a:t>
+            </a:r>
+            <a:r>
+              <a:rPr lang="en-CA" dirty="0"/>
+              <a:t>).</a:t>
             </a:r>
           </a:p>
           <a:p>
@@ -4424,20 +4603,61 @@
               <a:rPr lang="en-CA" b="1" dirty="0"/>
               <a:t>Pros</a:t>
             </a:r>
-            <a:r>
-              <a:rPr lang="en-CA" dirty="0"/>
-              <a:t>: grammar are rules are different and simpler than C/C++/Java; allows multiple programming styles; has garbage collection: memory management is automatic</a:t>
-            </a:r>
-            <a:br>
-              <a:rPr lang="en-CA" dirty="0"/>
-            </a:br>
+          </a:p>
+          <a:p>
+            <a:pPr marL="285750" indent="-285750">
+              <a:buFont typeface="Arial" panose="020B0604020202020204" pitchFamily="34" charset="0"/>
+              <a:buChar char="•"/>
+            </a:pPr>
+            <a:r>
+              <a:rPr lang="en-CA" dirty="0"/>
+              <a:t>OOP is built-in</a:t>
+            </a:r>
+          </a:p>
+          <a:p>
+            <a:pPr marL="285750" indent="-285750">
+              <a:buFont typeface="Arial" panose="020B0604020202020204" pitchFamily="34" charset="0"/>
+              <a:buChar char="•"/>
+            </a:pPr>
+            <a:r>
+              <a:rPr lang="en-CA" dirty="0"/>
+              <a:t>memory management is automatic (garbage collected)</a:t>
+            </a:r>
+          </a:p>
+          <a:p>
+            <a:pPr marL="285750" indent="-285750">
+              <a:buFont typeface="Arial" panose="020B0604020202020204" pitchFamily="34" charset="0"/>
+              <a:buChar char="•"/>
+            </a:pPr>
+            <a:r>
+              <a:rPr lang="en-CA" dirty="0"/>
+              <a:t>on the surface, looks like C/C++, but a little more “programmer friendly”</a:t>
+            </a:r>
+          </a:p>
+          <a:p>
             <a:r>
               <a:rPr lang="en-CA" b="1" dirty="0"/>
               <a:t>Cons</a:t>
             </a:r>
-            <a:r>
-              <a:rPr lang="en-CA" dirty="0"/>
-              <a:t>: verbose --- many simple programs are quite long; not close enough to C/C++/Java for some programmers; some odd design decisions, e.g. error-handling is unusual compared to many modern languages</a:t>
+          </a:p>
+          <a:p>
+            <a:pPr marL="285750" indent="-285750">
+              <a:buFont typeface="Arial" panose="020B0604020202020204" pitchFamily="34" charset="0"/>
+              <a:buChar char="•"/>
+            </a:pPr>
+            <a:r>
+              <a:rPr lang="en-CA" dirty="0"/>
+              <a:t>verbose --- many simple programs are quite long</a:t>
+            </a:r>
+          </a:p>
+          <a:p>
+            <a:pPr marL="285750" indent="-285750">
+              <a:buFont typeface="Arial" panose="020B0604020202020204" pitchFamily="34" charset="0"/>
+              <a:buChar char="•"/>
+            </a:pPr>
+            <a:r>
+              <a:rPr lang="en-CA" dirty="0"/>
+              <a:t>OOP is not the best choice for everything</a:t>
             </a:r>
           </a:p>
         </p:txBody>
@@ -4445,7 +4665,7 @@
     </p:spTree>
     <p:extLst>
       <p:ext uri="{BB962C8B-B14F-4D97-AF65-F5344CB8AC3E}">
-        <p14:creationId xmlns:p14="http://schemas.microsoft.com/office/powerpoint/2010/main" val="2910585830"/>
+        <p14:creationId xmlns:p14="http://schemas.microsoft.com/office/powerpoint/2010/main" val="3853224143"/>
       </p:ext>
     </p:extLst>
   </p:cSld>
@@ -4495,7 +4715,7 @@
           <a:p>
             <a:r>
               <a:rPr lang="en-CA" dirty="0"/>
-              <a:t>JavaScript Language</a:t>
+              <a:t>Go Language</a:t>
             </a:r>
           </a:p>
         </p:txBody>
@@ -4518,7 +4738,7 @@
         </p:nvSpPr>
         <p:spPr>
           <a:xfrm>
-            <a:off x="374986" y="2060241"/>
+            <a:off x="838200" y="2848516"/>
             <a:ext cx="10515600" cy="4351338"/>
           </a:xfrm>
         </p:spPr>
@@ -4536,7 +4756,108 @@
                 <a:effectLst/>
                 <a:latin typeface="Consolas" panose="020B0609020204030204" pitchFamily="49" charset="0"/>
               </a:rPr>
-              <a:t>console.log("Hello, World!");</a:t>
+              <a:t>package main</a:t>
+            </a:r>
+          </a:p>
+          <a:p>
+            <a:pPr marL="0" indent="0">
+              <a:buNone/>
+            </a:pPr>
+            <a:endParaRPr lang="en-US" b="0" dirty="0">
+              <a:effectLst/>
+              <a:latin typeface="Consolas" panose="020B0609020204030204" pitchFamily="49" charset="0"/>
+            </a:endParaRPr>
+          </a:p>
+          <a:p>
+            <a:pPr marL="0" indent="0">
+              <a:buNone/>
+            </a:pPr>
+            <a:r>
+              <a:rPr lang="en-US" b="0" dirty="0">
+                <a:effectLst/>
+                <a:latin typeface="Consolas" panose="020B0609020204030204" pitchFamily="49" charset="0"/>
+              </a:rPr>
+              <a:t>import "</a:t>
+            </a:r>
+            <a:r>
+              <a:rPr lang="en-US" b="0" dirty="0" err="1">
+                <a:effectLst/>
+                <a:latin typeface="Consolas" panose="020B0609020204030204" pitchFamily="49" charset="0"/>
+              </a:rPr>
+              <a:t>fmt</a:t>
+            </a:r>
+            <a:r>
+              <a:rPr lang="en-US" b="0" dirty="0">
+                <a:effectLst/>
+                <a:latin typeface="Consolas" panose="020B0609020204030204" pitchFamily="49" charset="0"/>
+              </a:rPr>
+              <a:t>"</a:t>
+            </a:r>
+          </a:p>
+          <a:p>
+            <a:pPr marL="0" indent="0">
+              <a:buNone/>
+            </a:pPr>
+            <a:endParaRPr lang="en-US" b="0" dirty="0">
+              <a:effectLst/>
+              <a:latin typeface="Consolas" panose="020B0609020204030204" pitchFamily="49" charset="0"/>
+            </a:endParaRPr>
+          </a:p>
+          <a:p>
+            <a:pPr marL="0" indent="0">
+              <a:buNone/>
+            </a:pPr>
+            <a:r>
+              <a:rPr lang="en-US" b="0" dirty="0" err="1">
+                <a:effectLst/>
+                <a:latin typeface="Consolas" panose="020B0609020204030204" pitchFamily="49" charset="0"/>
+              </a:rPr>
+              <a:t>func</a:t>
+            </a:r>
+            <a:r>
+              <a:rPr lang="en-US" b="0" dirty="0">
+                <a:effectLst/>
+                <a:latin typeface="Consolas" panose="020B0609020204030204" pitchFamily="49" charset="0"/>
+              </a:rPr>
+              <a:t> main() {</a:t>
+            </a:r>
+          </a:p>
+          <a:p>
+            <a:pPr marL="0" indent="0">
+              <a:buNone/>
+            </a:pPr>
+            <a:r>
+              <a:rPr lang="en-US" b="0" dirty="0">
+                <a:effectLst/>
+                <a:latin typeface="Consolas" panose="020B0609020204030204" pitchFamily="49" charset="0"/>
+              </a:rPr>
+              <a:t>    </a:t>
+            </a:r>
+            <a:r>
+              <a:rPr lang="en-US" b="0" dirty="0" err="1">
+                <a:effectLst/>
+                <a:latin typeface="Consolas" panose="020B0609020204030204" pitchFamily="49" charset="0"/>
+              </a:rPr>
+              <a:t>fmt.Println</a:t>
+            </a:r>
+            <a:r>
+              <a:rPr lang="en-US" b="0" dirty="0">
+                <a:effectLst/>
+                <a:latin typeface="Consolas" panose="020B0609020204030204" pitchFamily="49" charset="0"/>
+              </a:rPr>
+              <a:t>("Hello, World!")</a:t>
+            </a:r>
+          </a:p>
+          <a:p>
+            <a:pPr marL="0" indent="0">
+              <a:buNone/>
+            </a:pPr>
+            <a:r>
+              <a:rPr lang="en-US" b="0" dirty="0">
+                <a:effectLst/>
+                <a:latin typeface="Consolas" panose="020B0609020204030204" pitchFamily="49" charset="0"/>
+              </a:rPr>
+              <a:t>}</a:t>
             </a:r>
             <a:endParaRPr lang="en-CA" dirty="0"/>
           </a:p>
@@ -4556,8 +4877,8 @@
         </p:nvSpPr>
         <p:spPr>
           <a:xfrm>
-            <a:off x="6757736" y="178635"/>
-            <a:ext cx="5221920" cy="4247317"/>
+            <a:off x="5804452" y="228331"/>
+            <a:ext cx="6135447" cy="3693319"/>
           </a:xfrm>
           <a:prstGeom prst="rect">
             <a:avLst/>
@@ -4574,35 +4895,87 @@
           <a:p>
             <a:r>
               <a:rPr lang="en-CA" b="1" dirty="0"/>
-              <a:t>JavaScript </a:t>
-            </a:r>
-            <a:r>
-              <a:rPr lang="en-CA" dirty="0"/>
-              <a:t>is the native language of web browsers: if you want to run a program in a browser, it needs to be in JavaScript. On the surface it looks like Java, but the programming styles it supports and encourages are very different. </a:t>
-            </a:r>
-          </a:p>
-          <a:p>
-            <a:endParaRPr lang="en-CA" dirty="0"/>
+              <a:t>Go </a:t>
+            </a:r>
+            <a:r>
+              <a:rPr lang="en-CA" dirty="0"/>
+              <a:t>is based on C but goes in a different direction than C++. It is more programmer friendly, simpler, and has automatic memory management. It is very popular for writing “server” programs, e.g. web servers, or applications that might have many users at the same time.</a:t>
+            </a:r>
           </a:p>
           <a:p>
             <a:r>
               <a:rPr lang="en-CA" b="1" dirty="0"/>
               <a:t>Pros</a:t>
             </a:r>
-            <a:r>
-              <a:rPr lang="en-CA" dirty="0"/>
-              <a:t>: relatively easy to use; supports OOP and other coding styles; surface-level similarity to C/C++; is THE language for web browsers</a:t>
-            </a:r>
-            <a:br>
-              <a:rPr lang="en-CA" dirty="0"/>
-            </a:br>
+          </a:p>
+          <a:p>
+            <a:pPr marL="285750" indent="-285750">
+              <a:buFont typeface="Arial" panose="020B0604020202020204" pitchFamily="34" charset="0"/>
+              <a:buChar char="•"/>
+            </a:pPr>
+            <a:r>
+              <a:rPr lang="en-CA" dirty="0"/>
+              <a:t>grammar are rules are simpler than C/C++/Java</a:t>
+            </a:r>
+          </a:p>
+          <a:p>
+            <a:pPr marL="285750" indent="-285750">
+              <a:buFont typeface="Arial" panose="020B0604020202020204" pitchFamily="34" charset="0"/>
+              <a:buChar char="•"/>
+            </a:pPr>
+            <a:r>
+              <a:rPr lang="en-CA" dirty="0"/>
+              <a:t>nice built-in support for concurrent programs</a:t>
+            </a:r>
+          </a:p>
+          <a:p>
+            <a:pPr marL="285750" indent="-285750">
+              <a:buFont typeface="Arial" panose="020B0604020202020204" pitchFamily="34" charset="0"/>
+              <a:buChar char="•"/>
+            </a:pPr>
+            <a:r>
+              <a:rPr lang="en-CA" dirty="0"/>
+              <a:t>memory management is automatic (garbage collected)</a:t>
+            </a:r>
+          </a:p>
+          <a:p>
             <a:r>
               <a:rPr lang="en-CA" b="1" dirty="0"/>
               <a:t>Cons</a:t>
             </a:r>
             <a:r>
               <a:rPr lang="en-CA" dirty="0"/>
-              <a:t>: runs differently, and generally more slowly, than C/C++; can be difficult to write large programs due to quirks in the language and lack of support for data types (the TypeScript language is a popular alternative --- it has better support for writing big programs but is compatible with JavaScript)</a:t>
+              <a:t>: </a:t>
+            </a:r>
+          </a:p>
+          <a:p>
+            <a:pPr marL="285750" indent="-285750">
+              <a:buFont typeface="Arial" panose="020B0604020202020204" pitchFamily="34" charset="0"/>
+              <a:buChar char="•"/>
+            </a:pPr>
+            <a:r>
+              <a:rPr lang="en-CA" dirty="0"/>
+              <a:t>verbose --- many simple programs are quite long</a:t>
+            </a:r>
+          </a:p>
+          <a:p>
+            <a:pPr marL="285750" indent="-285750">
+              <a:buFont typeface="Arial" panose="020B0604020202020204" pitchFamily="34" charset="0"/>
+              <a:buChar char="•"/>
+            </a:pPr>
+            <a:r>
+              <a:rPr lang="en-CA" dirty="0"/>
+              <a:t>not close enough to C/C++/Java for some programmers</a:t>
+            </a:r>
+          </a:p>
+          <a:p>
+            <a:pPr marL="285750" indent="-285750">
+              <a:buFont typeface="Arial" panose="020B0604020202020204" pitchFamily="34" charset="0"/>
+              <a:buChar char="•"/>
+            </a:pPr>
+            <a:r>
+              <a:rPr lang="en-CA" dirty="0"/>
+              <a:t>some odd design decisions, e.g. error-handling is unusual</a:t>
             </a:r>
           </a:p>
         </p:txBody>
@@ -4610,7 +4983,7 @@
     </p:spTree>
     <p:extLst>
       <p:ext uri="{BB962C8B-B14F-4D97-AF65-F5344CB8AC3E}">
-        <p14:creationId xmlns:p14="http://schemas.microsoft.com/office/powerpoint/2010/main" val="598370551"/>
+        <p14:creationId xmlns:p14="http://schemas.microsoft.com/office/powerpoint/2010/main" val="2910585830"/>
       </p:ext>
     </p:extLst>
   </p:cSld>
@@ -4660,7 +5033,7 @@
           <a:p>
             <a:r>
               <a:rPr lang="en-CA" dirty="0"/>
-              <a:t>Python Language</a:t>
+              <a:t>JavaScript Language</a:t>
             </a:r>
           </a:p>
         </p:txBody>
@@ -4701,7 +5074,7 @@
                 <a:effectLst/>
                 <a:latin typeface="Consolas" panose="020B0609020204030204" pitchFamily="49" charset="0"/>
               </a:rPr>
-              <a:t>print("Hello, World!")</a:t>
+              <a:t>console.log("Hello, World!");</a:t>
             </a:r>
             <a:endParaRPr lang="en-CA" dirty="0"/>
           </a:p>
@@ -4722,7 +5095,7 @@
         <p:spPr>
           <a:xfrm>
             <a:off x="6757736" y="178635"/>
-            <a:ext cx="5221920" cy="2862322"/>
+            <a:ext cx="5221920" cy="5078313"/>
           </a:xfrm>
           <a:prstGeom prst="rect">
             <a:avLst/>
@@ -4739,35 +5112,91 @@
           <a:p>
             <a:r>
               <a:rPr lang="en-CA" b="1" dirty="0"/>
-              <a:t>Python </a:t>
-            </a:r>
-            <a:r>
-              <a:rPr lang="en-CA" dirty="0"/>
-              <a:t>is the language we’re learning. It is extremely popular in applications such as data science, machine learning, and education. </a:t>
-            </a:r>
-          </a:p>
-          <a:p>
-            <a:endParaRPr lang="en-CA" dirty="0"/>
+              <a:t>JavaScript </a:t>
+            </a:r>
+            <a:r>
+              <a:rPr lang="en-CA" dirty="0"/>
+              <a:t>is the language of web browsers: if you want to run a program in a browser, it needs to be in JavaScript. On the surface it looks like Java, but the programming styles it supports and encourages are very different.</a:t>
+            </a:r>
           </a:p>
           <a:p>
             <a:r>
               <a:rPr lang="en-CA" b="1" dirty="0"/>
               <a:t>Pros</a:t>
             </a:r>
-            <a:r>
-              <a:rPr lang="en-CA" dirty="0"/>
-              <a:t>: relatively easy to use and learn; supports OOP and other coding styles</a:t>
-            </a:r>
-            <a:br>
-              <a:rPr lang="en-CA" dirty="0"/>
-            </a:br>
+          </a:p>
+          <a:p>
+            <a:pPr marL="285750" indent="-285750">
+              <a:buFont typeface="Arial" panose="020B0604020202020204" pitchFamily="34" charset="0"/>
+              <a:buChar char="•"/>
+            </a:pPr>
+            <a:r>
+              <a:rPr lang="en-CA" dirty="0"/>
+              <a:t>relatively easy to use</a:t>
+            </a:r>
+          </a:p>
+          <a:p>
+            <a:pPr marL="285750" indent="-285750">
+              <a:buFont typeface="Arial" panose="020B0604020202020204" pitchFamily="34" charset="0"/>
+              <a:buChar char="•"/>
+            </a:pPr>
+            <a:r>
+              <a:rPr lang="en-CA" dirty="0"/>
+              <a:t>supports OOP and other coding styles</a:t>
+            </a:r>
+          </a:p>
+          <a:p>
+            <a:pPr marL="285750" indent="-285750">
+              <a:buFont typeface="Arial" panose="020B0604020202020204" pitchFamily="34" charset="0"/>
+              <a:buChar char="•"/>
+            </a:pPr>
+            <a:r>
+              <a:rPr lang="en-CA" dirty="0"/>
+              <a:t>surface-level similarity to C/C++</a:t>
+            </a:r>
+          </a:p>
+          <a:p>
+            <a:pPr marL="285750" indent="-285750">
+              <a:buFont typeface="Arial" panose="020B0604020202020204" pitchFamily="34" charset="0"/>
+              <a:buChar char="•"/>
+            </a:pPr>
+            <a:r>
+              <a:rPr lang="en-CA" dirty="0"/>
+              <a:t>is THE language for web browsers</a:t>
+            </a:r>
+          </a:p>
+          <a:p>
             <a:r>
               <a:rPr lang="en-CA" b="1" dirty="0"/>
               <a:t>Cons</a:t>
             </a:r>
-            <a:r>
-              <a:rPr lang="en-CA" dirty="0"/>
-              <a:t>: can use orders of magnitude more time and memory than C/C++, so not practical for programs where performance is crucial; like JavaScript, can be difficult to write bigger programs</a:t>
+          </a:p>
+          <a:p>
+            <a:pPr marL="285750" indent="-285750">
+              <a:buFont typeface="Arial" panose="020B0604020202020204" pitchFamily="34" charset="0"/>
+              <a:buChar char="•"/>
+            </a:pPr>
+            <a:r>
+              <a:rPr lang="en-CA" dirty="0"/>
+              <a:t>runs differently, and generally more slowly, than C/C++</a:t>
+            </a:r>
+          </a:p>
+          <a:p>
+            <a:pPr marL="285750" indent="-285750">
+              <a:buFont typeface="Arial" panose="020B0604020202020204" pitchFamily="34" charset="0"/>
+              <a:buChar char="•"/>
+            </a:pPr>
+            <a:r>
+              <a:rPr lang="en-CA" dirty="0"/>
+              <a:t>can be difficult to write large programs due to quirks in the language and lack of support for data types (the </a:t>
+            </a:r>
+            <a:r>
+              <a:rPr lang="en-CA" b="1" dirty="0"/>
+              <a:t>TypeScript</a:t>
+            </a:r>
+            <a:r>
+              <a:rPr lang="en-CA" dirty="0"/>
+              <a:t> language is a popular alternative --- it has better support for writing big programs and is compatible with JavaScript)</a:t>
             </a:r>
           </a:p>
         </p:txBody>
@@ -4775,7 +5204,7 @@
     </p:spTree>
     <p:extLst>
       <p:ext uri="{BB962C8B-B14F-4D97-AF65-F5344CB8AC3E}">
-        <p14:creationId xmlns:p14="http://schemas.microsoft.com/office/powerpoint/2010/main" val="299047572"/>
+        <p14:creationId xmlns:p14="http://schemas.microsoft.com/office/powerpoint/2010/main" val="598370551"/>
       </p:ext>
     </p:extLst>
   </p:cSld>
@@ -4807,6 +5236,215 @@
           <p:cNvPr id="2" name="Title 1">
             <a:extLst>
               <a:ext uri="{FF2B5EF4-FFF2-40B4-BE49-F238E27FC236}">
+                <a16:creationId xmlns:a16="http://schemas.microsoft.com/office/drawing/2014/main" id="{2FDF9A17-767A-E12B-BC3E-F74482A661A8}"/>
+              </a:ext>
+            </a:extLst>
+          </p:cNvPr>
+          <p:cNvSpPr>
+            <a:spLocks noGrp="1"/>
+          </p:cNvSpPr>
+          <p:nvPr>
+            <p:ph type="title"/>
+          </p:nvPr>
+        </p:nvSpPr>
+        <p:spPr/>
+        <p:txBody>
+          <a:bodyPr/>
+          <a:lstStyle/>
+          <a:p>
+            <a:r>
+              <a:rPr lang="en-CA" dirty="0"/>
+              <a:t>Python Language</a:t>
+            </a:r>
+          </a:p>
+        </p:txBody>
+      </p:sp>
+      <p:sp>
+        <p:nvSpPr>
+          <p:cNvPr id="3" name="Content Placeholder 2">
+            <a:extLst>
+              <a:ext uri="{FF2B5EF4-FFF2-40B4-BE49-F238E27FC236}">
+                <a16:creationId xmlns:a16="http://schemas.microsoft.com/office/drawing/2014/main" id="{50798CC9-C622-B878-F83F-05F196ABC0AF}"/>
+              </a:ext>
+            </a:extLst>
+          </p:cNvPr>
+          <p:cNvSpPr>
+            <a:spLocks noGrp="1"/>
+          </p:cNvSpPr>
+          <p:nvPr>
+            <p:ph idx="1"/>
+          </p:nvPr>
+        </p:nvSpPr>
+        <p:spPr>
+          <a:xfrm>
+            <a:off x="374986" y="2060241"/>
+            <a:ext cx="10515600" cy="4351338"/>
+          </a:xfrm>
+        </p:spPr>
+        <p:txBody>
+          <a:bodyPr>
+            <a:normAutofit/>
+          </a:bodyPr>
+          <a:lstStyle/>
+          <a:p>
+            <a:pPr marL="0" indent="0">
+              <a:buNone/>
+            </a:pPr>
+            <a:r>
+              <a:rPr lang="en-US" b="0" dirty="0">
+                <a:effectLst/>
+                <a:latin typeface="Consolas" panose="020B0609020204030204" pitchFamily="49" charset="0"/>
+              </a:rPr>
+              <a:t>print("Hello, World!")</a:t>
+            </a:r>
+            <a:endParaRPr lang="en-CA" dirty="0"/>
+          </a:p>
+        </p:txBody>
+      </p:sp>
+      <p:sp>
+        <p:nvSpPr>
+          <p:cNvPr id="4" name="TextBox 3">
+            <a:extLst>
+              <a:ext uri="{FF2B5EF4-FFF2-40B4-BE49-F238E27FC236}">
+                <a16:creationId xmlns:a16="http://schemas.microsoft.com/office/drawing/2014/main" id="{B0FB5CCC-97E9-CCC8-53AA-6EBA19E865D1}"/>
+              </a:ext>
+            </a:extLst>
+          </p:cNvPr>
+          <p:cNvSpPr txBox="1"/>
+          <p:nvPr/>
+        </p:nvSpPr>
+        <p:spPr>
+          <a:xfrm>
+            <a:off x="6757736" y="178635"/>
+            <a:ext cx="5221920" cy="3416320"/>
+          </a:xfrm>
+          <a:prstGeom prst="rect">
+            <a:avLst/>
+          </a:prstGeom>
+          <a:solidFill>
+            <a:srgbClr val="FFFF00"/>
+          </a:solidFill>
+        </p:spPr>
+        <p:txBody>
+          <a:bodyPr wrap="square" rtlCol="0">
+            <a:spAutoFit/>
+          </a:bodyPr>
+          <a:lstStyle/>
+          <a:p>
+            <a:r>
+              <a:rPr lang="en-CA" b="1" dirty="0"/>
+              <a:t>Python </a:t>
+            </a:r>
+            <a:r>
+              <a:rPr lang="en-CA" dirty="0"/>
+              <a:t>is the language we’re learning.</a:t>
+            </a:r>
+          </a:p>
+          <a:p>
+            <a:r>
+              <a:rPr lang="en-CA" dirty="0"/>
+              <a:t> </a:t>
+            </a:r>
+          </a:p>
+          <a:p>
+            <a:r>
+              <a:rPr lang="en-CA" b="1" dirty="0"/>
+              <a:t>Pros</a:t>
+            </a:r>
+          </a:p>
+          <a:p>
+            <a:pPr marL="285750" indent="-285750">
+              <a:buFont typeface="Arial" panose="020B0604020202020204" pitchFamily="34" charset="0"/>
+              <a:buChar char="•"/>
+            </a:pPr>
+            <a:r>
+              <a:rPr lang="en-CA" dirty="0"/>
+              <a:t>relatively easy to use and learn</a:t>
+            </a:r>
+          </a:p>
+          <a:p>
+            <a:pPr marL="285750" indent="-285750">
+              <a:buFont typeface="Arial" panose="020B0604020202020204" pitchFamily="34" charset="0"/>
+              <a:buChar char="•"/>
+            </a:pPr>
+            <a:r>
+              <a:rPr lang="en-CA" dirty="0"/>
+              <a:t>supports OOP and other coding styles</a:t>
+            </a:r>
+          </a:p>
+          <a:p>
+            <a:pPr marL="285750" indent="-285750">
+              <a:buFont typeface="Arial" panose="020B0604020202020204" pitchFamily="34" charset="0"/>
+              <a:buChar char="•"/>
+            </a:pPr>
+            <a:r>
+              <a:rPr lang="en-CA" dirty="0"/>
+              <a:t>extremely popular in data science and AI</a:t>
+            </a:r>
+          </a:p>
+          <a:p>
+            <a:r>
+              <a:rPr lang="en-CA" b="1" dirty="0"/>
+              <a:t>Cons</a:t>
+            </a:r>
+          </a:p>
+          <a:p>
+            <a:pPr marL="285750" indent="-285750">
+              <a:buFont typeface="Arial" panose="020B0604020202020204" pitchFamily="34" charset="0"/>
+              <a:buChar char="•"/>
+            </a:pPr>
+            <a:r>
+              <a:rPr lang="en-CA" dirty="0"/>
+              <a:t>can use significantly more time and memory than C/C++, so not practical for programs where performance is crucial</a:t>
+            </a:r>
+          </a:p>
+          <a:p>
+            <a:pPr marL="285750" indent="-285750">
+              <a:buFont typeface="Arial" panose="020B0604020202020204" pitchFamily="34" charset="0"/>
+              <a:buChar char="•"/>
+            </a:pPr>
+            <a:r>
+              <a:rPr lang="en-CA" dirty="0"/>
+              <a:t>like JavaScript, can be difficult to write bigger programs</a:t>
+            </a:r>
+          </a:p>
+        </p:txBody>
+      </p:sp>
+    </p:spTree>
+    <p:extLst>
+      <p:ext uri="{BB962C8B-B14F-4D97-AF65-F5344CB8AC3E}">
+        <p14:creationId xmlns:p14="http://schemas.microsoft.com/office/powerpoint/2010/main" val="299047572"/>
+      </p:ext>
+    </p:extLst>
+  </p:cSld>
+  <p:clrMapOvr>
+    <a:masterClrMapping/>
+  </p:clrMapOvr>
+</p:sld>
+</file>
+
+<file path=ppt/slides/slide16.xml><?xml version="1.0" encoding="utf-8"?>
+<p:sld xmlns:a="http://schemas.openxmlformats.org/drawingml/2006/main" xmlns:r="http://schemas.openxmlformats.org/officeDocument/2006/relationships" xmlns:p="http://schemas.openxmlformats.org/presentationml/2006/main">
+  <p:cSld>
+    <p:spTree>
+      <p:nvGrpSpPr>
+        <p:cNvPr id="1" name=""/>
+        <p:cNvGrpSpPr/>
+        <p:nvPr/>
+      </p:nvGrpSpPr>
+      <p:grpSpPr>
+        <a:xfrm>
+          <a:off x="0" y="0"/>
+          <a:ext cx="0" cy="0"/>
+          <a:chOff x="0" y="0"/>
+          <a:chExt cx="0" cy="0"/>
+        </a:xfrm>
+      </p:grpSpPr>
+      <p:sp>
+        <p:nvSpPr>
+          <p:cNvPr id="2" name="Title 1">
+            <a:extLst>
+              <a:ext uri="{FF2B5EF4-FFF2-40B4-BE49-F238E27FC236}">
                 <a16:creationId xmlns:a16="http://schemas.microsoft.com/office/drawing/2014/main" id="{5B673300-ACD0-F3B2-CA8E-AFDE9A7EBC63}"/>
               </a:ext>
             </a:extLst>
@@ -4837,19 +5475,17 @@
       </p:sp>
       <p:pic>
         <p:nvPicPr>
-          <p:cNvPr id="6" name="Content Placeholder 5" descr="A screen shot of a computer&#10;&#10;AI-generated content may be incorrect.">
-            <a:extLst>
-              <a:ext uri="{FF2B5EF4-FFF2-40B4-BE49-F238E27FC236}">
-                <a16:creationId xmlns:a16="http://schemas.microsoft.com/office/drawing/2014/main" id="{4FFD85E7-E2D5-0AAF-AF46-2616E3EA921A}"/>
+          <p:cNvPr id="5" name="Picture 4" descr="A screen shot of a computer&#10;&#10;AI-generated content may be incorrect.">
+            <a:extLst>
+              <a:ext uri="{FF2B5EF4-FFF2-40B4-BE49-F238E27FC236}">
+                <a16:creationId xmlns:a16="http://schemas.microsoft.com/office/drawing/2014/main" id="{9C840B38-44F3-A48D-AB9E-4DA413524991}"/>
               </a:ext>
             </a:extLst>
           </p:cNvPr>
           <p:cNvPicPr>
-            <a:picLocks noGrp="1" noChangeAspect="1"/>
+            <a:picLocks noChangeAspect="1"/>
           </p:cNvPicPr>
-          <p:nvPr>
-            <p:ph idx="1"/>
-          </p:nvPr>
+          <p:nvPr/>
         </p:nvPicPr>
         <p:blipFill>
           <a:blip r:embed="rId2">
@@ -4865,9 +5501,12 @@
         </p:blipFill>
         <p:spPr>
           <a:xfrm>
-            <a:off x="123044" y="656044"/>
-            <a:ext cx="11768469" cy="5393882"/>
+            <a:off x="206620" y="975070"/>
+            <a:ext cx="11778759" cy="5440802"/>
           </a:xfrm>
+          <a:prstGeom prst="rect">
+            <a:avLst/>
+          </a:prstGeom>
         </p:spPr>
       </p:pic>
     </p:spTree>
@@ -4944,22 +5583,31 @@
             <p:ph idx="1"/>
           </p:nvPr>
         </p:nvSpPr>
-        <p:spPr/>
+        <p:spPr>
+          <a:xfrm>
+            <a:off x="838200" y="1825625"/>
+            <a:ext cx="5822092" cy="4351338"/>
+          </a:xfrm>
+        </p:spPr>
         <p:txBody>
           <a:bodyPr>
-            <a:normAutofit/>
+            <a:normAutofit fontScale="92500" lnSpcReduction="20000"/>
           </a:bodyPr>
           <a:lstStyle/>
           <a:p>
             <a:r>
-              <a:rPr lang="en-CA" dirty="0"/>
-              <a:t>Languages spoken by people, e.g. English, German, Chinese, etc.</a:t>
-            </a:r>
-          </a:p>
-          <a:p>
-            <a:r>
-              <a:rPr lang="en-CA" dirty="0"/>
-              <a:t>Have grammar and rules, but they are often implicit and informal</a:t>
+              <a:rPr lang="en-CA" b="1" dirty="0"/>
+              <a:t>Natural languages </a:t>
+            </a:r>
+            <a:r>
+              <a:rPr lang="en-CA" dirty="0"/>
+              <a:t>are the languages spoken by people, e.g. English, German, Chinese, etc.</a:t>
+            </a:r>
+          </a:p>
+          <a:p>
+            <a:r>
+              <a:rPr lang="en-CA" dirty="0"/>
+              <a:t>They have grammar and rules, but they are often implicit and informal</a:t>
             </a:r>
           </a:p>
           <a:p>
@@ -4973,27 +5621,34 @@
             <a:pPr lvl="1"/>
             <a:r>
               <a:rPr lang="en-CA" dirty="0"/>
-              <a:t>But speakers of the language need not be aware of them</a:t>
-            </a:r>
-          </a:p>
-          <a:p>
-            <a:r>
-              <a:rPr lang="en-CA" dirty="0"/>
-              <a:t>It can often be okay to break grammar rules if the meaning is still clear</a:t>
+              <a:t>Speakers of the language often unaware of them</a:t>
+            </a:r>
+          </a:p>
+          <a:p>
+            <a:r>
+              <a:rPr lang="en-CA" dirty="0"/>
+              <a:t>Can break rules if the meaning is still clear</a:t>
             </a:r>
           </a:p>
           <a:p>
             <a:pPr lvl="1"/>
             <a:r>
-              <a:rPr lang="en-CA" dirty="0"/>
-              <a:t>“I am at the restaurant.”</a:t>
+              <a:rPr lang="en-CA" i="1" dirty="0"/>
+              <a:t>I am at the restaurant.</a:t>
             </a:r>
           </a:p>
           <a:p>
             <a:pPr lvl="1"/>
             <a:r>
-              <a:rPr lang="en-CA" dirty="0"/>
-              <a:t>“Me at restaurant.”  (ungrammatical, but understandable)</a:t>
+              <a:rPr lang="en-CA" i="1" dirty="0"/>
+              <a:t>Me restaurant at.</a:t>
+            </a:r>
+            <a:br>
+              <a:rPr lang="en-CA" dirty="0"/>
+            </a:br>
+            <a:r>
+              <a:rPr lang="en-CA" dirty="0"/>
+              <a:t>(ungrammatical, but understandable)</a:t>
             </a:r>
           </a:p>
         </p:txBody>
@@ -5016,7 +5671,13 @@
   <p:cSld>
     <p:spTree>
       <p:nvGrpSpPr>
-        <p:cNvPr id="1" name=""/>
+        <p:cNvPr id="1" name="">
+          <a:extLst>
+            <a:ext uri="{FF2B5EF4-FFF2-40B4-BE49-F238E27FC236}">
+              <a16:creationId xmlns:a16="http://schemas.microsoft.com/office/drawing/2014/main" id="{23C02E65-2D5A-CC76-BA90-1F5B661447B6}"/>
+            </a:ext>
+          </a:extLst>
+        </p:cNvPr>
         <p:cNvGrpSpPr/>
         <p:nvPr/>
       </p:nvGrpSpPr>
@@ -5033,7 +5694,7 @@
           <p:cNvPr id="2" name="Title 1">
             <a:extLst>
               <a:ext uri="{FF2B5EF4-FFF2-40B4-BE49-F238E27FC236}">
-                <a16:creationId xmlns:a16="http://schemas.microsoft.com/office/drawing/2014/main" id="{5574B902-B00F-9A60-C5CB-966C120CAE31}"/>
+                <a16:creationId xmlns:a16="http://schemas.microsoft.com/office/drawing/2014/main" id="{11D63970-BD2C-5053-F8C4-DBA44BDEA3F2}"/>
               </a:ext>
             </a:extLst>
           </p:cNvPr>
@@ -5051,7 +5712,7 @@
           <a:p>
             <a:r>
               <a:rPr lang="en-CA" dirty="0"/>
-              <a:t>Formal Languages</a:t>
+              <a:t>Natural Languages</a:t>
             </a:r>
           </a:p>
         </p:txBody>
@@ -5061,7 +5722,7 @@
           <p:cNvPr id="3" name="Content Placeholder 2">
             <a:extLst>
               <a:ext uri="{FF2B5EF4-FFF2-40B4-BE49-F238E27FC236}">
-                <a16:creationId xmlns:a16="http://schemas.microsoft.com/office/drawing/2014/main" id="{98A8E8F5-CA50-08D5-90EF-A6B808F7483C}"/>
+                <a16:creationId xmlns:a16="http://schemas.microsoft.com/office/drawing/2014/main" id="{4E4BB0CF-233F-86C4-3F23-CFED9C9AA152}"/>
               </a:ext>
             </a:extLst>
           </p:cNvPr>
@@ -5072,40 +5733,134 @@
             <p:ph idx="1"/>
           </p:nvPr>
         </p:nvSpPr>
-        <p:spPr/>
-        <p:txBody>
-          <a:bodyPr/>
-          <a:lstStyle/>
-          <a:p>
-            <a:r>
-              <a:rPr lang="en-CA" dirty="0"/>
-              <a:t>Programming languages like Python are formal languages</a:t>
-            </a:r>
-          </a:p>
-          <a:p>
-            <a:r>
-              <a:rPr lang="en-CA" dirty="0"/>
-              <a:t>Unlike natural languages, formal languages require that you follow the rules strictly</a:t>
-            </a:r>
-          </a:p>
-          <a:p>
-            <a:r>
-              <a:rPr lang="en-CA" dirty="0"/>
-              <a:t>Even if the meaning of a program is clear, it will be rejected if it is not also perfectly grammatical …</a:t>
-            </a:r>
-          </a:p>
-          <a:p>
-            <a:pPr marL="0" indent="0">
-              <a:buNone/>
-            </a:pPr>
-            <a:endParaRPr lang="en-CA" dirty="0"/>
+        <p:spPr>
+          <a:xfrm>
+            <a:off x="838200" y="1825625"/>
+            <a:ext cx="5822092" cy="4351338"/>
+          </a:xfrm>
+        </p:spPr>
+        <p:txBody>
+          <a:bodyPr>
+            <a:normAutofit fontScale="92500" lnSpcReduction="20000"/>
+          </a:bodyPr>
+          <a:lstStyle/>
+          <a:p>
+            <a:r>
+              <a:rPr lang="en-CA" b="1" dirty="0"/>
+              <a:t>Natural languages </a:t>
+            </a:r>
+            <a:r>
+              <a:rPr lang="en-CA" dirty="0"/>
+              <a:t>are the languages spoken by people, e.g. English, German, Chinese, etc.</a:t>
+            </a:r>
+          </a:p>
+          <a:p>
+            <a:r>
+              <a:rPr lang="en-CA" dirty="0"/>
+              <a:t>They have grammar and rules, but they are often implicit and informal</a:t>
+            </a:r>
+          </a:p>
+          <a:p>
+            <a:pPr lvl="1"/>
+            <a:r>
+              <a:rPr lang="en-CA" dirty="0"/>
+              <a:t>Linguists study these rules</a:t>
+            </a:r>
+          </a:p>
+          <a:p>
+            <a:pPr lvl="1"/>
+            <a:r>
+              <a:rPr lang="en-CA" dirty="0"/>
+              <a:t>But speakers of the language often unaware of them</a:t>
+            </a:r>
+          </a:p>
+          <a:p>
+            <a:r>
+              <a:rPr lang="en-CA" dirty="0"/>
+              <a:t>Can break rules if the meaning is still clear</a:t>
+            </a:r>
+          </a:p>
+          <a:p>
+            <a:pPr lvl="1"/>
+            <a:r>
+              <a:rPr lang="en-CA" dirty="0"/>
+              <a:t>“I am at the restaurant.”</a:t>
+            </a:r>
+          </a:p>
+          <a:p>
+            <a:pPr lvl="1"/>
+            <a:r>
+              <a:rPr lang="en-CA" dirty="0"/>
+              <a:t>“Me at restaurant.”  (ungrammatical, but understandable)</a:t>
+            </a:r>
+          </a:p>
+        </p:txBody>
+      </p:sp>
+      <p:sp>
+        <p:nvSpPr>
+          <p:cNvPr id="4" name="TextBox 3">
+            <a:extLst>
+              <a:ext uri="{FF2B5EF4-FFF2-40B4-BE49-F238E27FC236}">
+                <a16:creationId xmlns:a16="http://schemas.microsoft.com/office/drawing/2014/main" id="{ED0B9EDC-F6B3-EAF2-75AF-CEACDB15C3C2}"/>
+              </a:ext>
+            </a:extLst>
+          </p:cNvPr>
+          <p:cNvSpPr txBox="1"/>
+          <p:nvPr/>
+        </p:nvSpPr>
+        <p:spPr>
+          <a:xfrm>
+            <a:off x="6660292" y="2551837"/>
+            <a:ext cx="5261330" cy="1754326"/>
+          </a:xfrm>
+          <a:prstGeom prst="rect">
+            <a:avLst/>
+          </a:prstGeom>
+          <a:solidFill>
+            <a:srgbClr val="FFFF00"/>
+          </a:solidFill>
+        </p:spPr>
+        <p:txBody>
+          <a:bodyPr wrap="square" rtlCol="0">
+            <a:spAutoFit/>
+          </a:bodyPr>
+          <a:lstStyle/>
+          <a:p>
+            <a:pPr algn="ctr"/>
+            <a:r>
+              <a:rPr lang="en-CA" b="1" dirty="0"/>
+              <a:t>Update</a:t>
+            </a:r>
+            <a:br>
+              <a:rPr lang="en-CA" dirty="0"/>
+            </a:br>
+            <a:r>
+              <a:rPr lang="en-CA" dirty="0"/>
+              <a:t>In the last couple of years, </a:t>
+            </a:r>
+            <a:r>
+              <a:rPr lang="en-CA" b="1" dirty="0"/>
+              <a:t>vibe coding </a:t>
+            </a:r>
+            <a:r>
+              <a:rPr lang="en-CA" dirty="0"/>
+              <a:t>or </a:t>
+            </a:r>
+            <a:r>
+              <a:rPr lang="en-CA" b="1" dirty="0"/>
+              <a:t>agentic coding</a:t>
+            </a:r>
+            <a:r>
+              <a:rPr lang="en-CA" dirty="0"/>
+              <a:t> using AI has become a popular way to write programs. You converse with the AI to make a program. For this course we will be learning the old fashioned “by hand” way of programming.</a:t>
+            </a:r>
           </a:p>
         </p:txBody>
       </p:sp>
     </p:spTree>
     <p:extLst>
       <p:ext uri="{BB962C8B-B14F-4D97-AF65-F5344CB8AC3E}">
-        <p14:creationId xmlns:p14="http://schemas.microsoft.com/office/powerpoint/2010/main" val="2692445676"/>
+        <p14:creationId xmlns:p14="http://schemas.microsoft.com/office/powerpoint/2010/main" val="63370177"/>
       </p:ext>
     </p:extLst>
   </p:cSld>
@@ -5183,95 +5938,37 @@
           <a:p>
             <a:r>
               <a:rPr lang="en-CA" dirty="0"/>
-              <a:t>print('Hi!')   # ok</a:t>
-            </a:r>
-          </a:p>
-          <a:p>
-            <a:r>
-              <a:rPr lang="en-CA" dirty="0"/>
-              <a:t>Print('Hi!')   # error</a:t>
-            </a:r>
-          </a:p>
-          <a:p>
-            <a:r>
-              <a:rPr lang="en-CA" dirty="0"/>
-              <a:t>print('Hi!")   # error</a:t>
-            </a:r>
-          </a:p>
-          <a:p>
-            <a:r>
-              <a:rPr lang="en-CA" dirty="0"/>
-              <a:t> print('Hi!')   # error</a:t>
-            </a:r>
-          </a:p>
-          <a:p>
+              <a:t>Programming languages like Python are </a:t>
+            </a:r>
+            <a:r>
+              <a:rPr lang="en-CA" b="1" dirty="0"/>
+              <a:t>formal languages</a:t>
+            </a:r>
+          </a:p>
+          <a:p>
+            <a:r>
+              <a:rPr lang="en-CA" dirty="0"/>
+              <a:t>Unlike natural languages, formal languages require that you follow the rules strictly</a:t>
+            </a:r>
+          </a:p>
+          <a:p>
+            <a:r>
+              <a:rPr lang="en-CA" dirty="0"/>
+              <a:t>Even if the meaning of a program is clear, it will be rejected if it is not also perfectly grammatical …</a:t>
+            </a:r>
+          </a:p>
+          <a:p>
+            <a:pPr marL="0" indent="0">
+              <a:buNone/>
+            </a:pPr>
             <a:endParaRPr lang="en-CA" dirty="0"/>
-          </a:p>
-        </p:txBody>
-      </p:sp>
-      <p:sp>
-        <p:nvSpPr>
-          <p:cNvPr id="4" name="TextBox 3">
-            <a:extLst>
-              <a:ext uri="{FF2B5EF4-FFF2-40B4-BE49-F238E27FC236}">
-                <a16:creationId xmlns:a16="http://schemas.microsoft.com/office/drawing/2014/main" id="{C4A18D26-0A05-1E77-DB1B-5DD5F78809C6}"/>
-              </a:ext>
-            </a:extLst>
-          </p:cNvPr>
-          <p:cNvSpPr txBox="1"/>
-          <p:nvPr/>
-        </p:nvSpPr>
-        <p:spPr>
-          <a:xfrm>
-            <a:off x="7770569" y="681037"/>
-            <a:ext cx="3871444" cy="1200329"/>
-          </a:xfrm>
-          <a:prstGeom prst="rect">
-            <a:avLst/>
-          </a:prstGeom>
-          <a:solidFill>
-            <a:srgbClr val="FFFF00"/>
-          </a:solidFill>
-        </p:spPr>
-        <p:txBody>
-          <a:bodyPr wrap="none" rtlCol="0">
-            <a:spAutoFit/>
-          </a:bodyPr>
-          <a:lstStyle/>
-          <a:p>
-            <a:pPr algn="ctr"/>
-            <a:r>
-              <a:rPr lang="en-CA" dirty="0"/>
-              <a:t>Part of the challenge of learning</a:t>
-            </a:r>
-          </a:p>
-          <a:p>
-            <a:pPr algn="ctr"/>
-            <a:r>
-              <a:rPr lang="en-CA" dirty="0"/>
-              <a:t>to program is getting used to the </a:t>
-            </a:r>
-          </a:p>
-          <a:p>
-            <a:pPr algn="ctr"/>
-            <a:r>
-              <a:rPr lang="en-CA" dirty="0"/>
-              <a:t>strictness of using a formal language.</a:t>
-            </a:r>
-          </a:p>
-          <a:p>
-            <a:pPr algn="ctr"/>
-            <a:r>
-              <a:rPr lang="en-CA" dirty="0"/>
-              <a:t>It can be frustrating at first!</a:t>
-            </a:r>
           </a:p>
         </p:txBody>
       </p:sp>
     </p:spTree>
     <p:extLst>
       <p:ext uri="{BB962C8B-B14F-4D97-AF65-F5344CB8AC3E}">
-        <p14:creationId xmlns:p14="http://schemas.microsoft.com/office/powerpoint/2010/main" val="2756254005"/>
+        <p14:creationId xmlns:p14="http://schemas.microsoft.com/office/powerpoint/2010/main" val="2692445676"/>
       </p:ext>
     </p:extLst>
   </p:cSld>
@@ -5347,27 +6044,51 @@
           <a:bodyPr/>
           <a:lstStyle/>
           <a:p>
-            <a:r>
-              <a:rPr lang="en-CA" dirty="0"/>
+            <a:pPr marL="0" indent="0">
+              <a:buNone/>
+            </a:pPr>
+            <a:r>
+              <a:rPr lang="en-CA" dirty="0">
+                <a:latin typeface="Consolas" panose="020B0609020204030204" pitchFamily="49" charset="0"/>
+                <a:cs typeface="Consolas" panose="020B0609020204030204" pitchFamily="49" charset="0"/>
+              </a:rPr>
               <a:t>print('Hi!')   # ok</a:t>
             </a:r>
           </a:p>
           <a:p>
-            <a:r>
-              <a:rPr lang="en-CA" dirty="0"/>
-              <a:t>Print('Hi!')   # error: capitalized is incorrect (case matters)</a:t>
-            </a:r>
-          </a:p>
-          <a:p>
-            <a:r>
-              <a:rPr lang="en-CA" dirty="0"/>
-              <a:t>print('Hi!")   # error: mis-matched quotes</a:t>
-            </a:r>
-          </a:p>
-          <a:p>
-            <a:r>
-              <a:rPr lang="en-CA" dirty="0"/>
-              <a:t> print('Hi!')   # error: space at beginning</a:t>
+            <a:pPr marL="0" indent="0">
+              <a:buNone/>
+            </a:pPr>
+            <a:r>
+              <a:rPr lang="en-CA" dirty="0">
+                <a:latin typeface="Consolas" panose="020B0609020204030204" pitchFamily="49" charset="0"/>
+                <a:cs typeface="Consolas" panose="020B0609020204030204" pitchFamily="49" charset="0"/>
+              </a:rPr>
+              <a:t>Print('Hi!')   # error</a:t>
+            </a:r>
+          </a:p>
+          <a:p>
+            <a:pPr marL="0" indent="0">
+              <a:buNone/>
+            </a:pPr>
+            <a:r>
+              <a:rPr lang="en-CA" dirty="0">
+                <a:latin typeface="Consolas" panose="020B0609020204030204" pitchFamily="49" charset="0"/>
+                <a:cs typeface="Consolas" panose="020B0609020204030204" pitchFamily="49" charset="0"/>
+              </a:rPr>
+              <a:t>print('Hi!")   # error</a:t>
+            </a:r>
+          </a:p>
+          <a:p>
+            <a:pPr marL="0" indent="0">
+              <a:buNone/>
+            </a:pPr>
+            <a:r>
+              <a:rPr lang="en-CA" dirty="0">
+                <a:latin typeface="Consolas" panose="020B0609020204030204" pitchFamily="49" charset="0"/>
+                <a:cs typeface="Consolas" panose="020B0609020204030204" pitchFamily="49" charset="0"/>
+              </a:rPr>
+              <a:t> print('Hi!')  # error</a:t>
             </a:r>
           </a:p>
           <a:p>
@@ -5377,10 +6098,10 @@
       </p:sp>
       <p:sp>
         <p:nvSpPr>
-          <p:cNvPr id="5" name="TextBox 4">
-            <a:extLst>
-              <a:ext uri="{FF2B5EF4-FFF2-40B4-BE49-F238E27FC236}">
-                <a16:creationId xmlns:a16="http://schemas.microsoft.com/office/drawing/2014/main" id="{B646BB83-5AD1-1543-0F3A-BB00160F5DAB}"/>
+          <p:cNvPr id="4" name="TextBox 3">
+            <a:extLst>
+              <a:ext uri="{FF2B5EF4-FFF2-40B4-BE49-F238E27FC236}">
+                <a16:creationId xmlns:a16="http://schemas.microsoft.com/office/drawing/2014/main" id="{C4A18D26-0A05-1E77-DB1B-5DD5F78809C6}"/>
               </a:ext>
             </a:extLst>
           </p:cNvPr>
@@ -5389,7 +6110,7 @@
         </p:nvSpPr>
         <p:spPr>
           <a:xfrm>
-            <a:off x="7770569" y="681037"/>
+            <a:off x="6845659" y="2049995"/>
             <a:ext cx="3871444" cy="1200329"/>
           </a:xfrm>
           <a:prstGeom prst="rect">
@@ -5437,7 +6158,7 @@
     </p:spTree>
     <p:extLst>
       <p:ext uri="{BB962C8B-B14F-4D97-AF65-F5344CB8AC3E}">
-        <p14:creationId xmlns:p14="http://schemas.microsoft.com/office/powerpoint/2010/main" val="3348444406"/>
+        <p14:creationId xmlns:p14="http://schemas.microsoft.com/office/powerpoint/2010/main" val="2756254005"/>
       </p:ext>
     </p:extLst>
   </p:cSld>
@@ -5469,7 +6190,7 @@
           <p:cNvPr id="2" name="Title 1">
             <a:extLst>
               <a:ext uri="{FF2B5EF4-FFF2-40B4-BE49-F238E27FC236}">
-                <a16:creationId xmlns:a16="http://schemas.microsoft.com/office/drawing/2014/main" id="{F0447A7A-D215-010A-A458-B2640B4B26D9}"/>
+                <a16:creationId xmlns:a16="http://schemas.microsoft.com/office/drawing/2014/main" id="{5574B902-B00F-9A60-C5CB-966C120CAE31}"/>
               </a:ext>
             </a:extLst>
           </p:cNvPr>
@@ -5487,7 +6208,7 @@
           <a:p>
             <a:r>
               <a:rPr lang="en-CA" dirty="0"/>
-              <a:t>Hello World in Various Languages</a:t>
+              <a:t>Formal Languages</a:t>
             </a:r>
           </a:p>
         </p:txBody>
@@ -5497,7 +6218,7 @@
           <p:cNvPr id="3" name="Content Placeholder 2">
             <a:extLst>
               <a:ext uri="{FF2B5EF4-FFF2-40B4-BE49-F238E27FC236}">
-                <a16:creationId xmlns:a16="http://schemas.microsoft.com/office/drawing/2014/main" id="{CDDE56BB-85C7-D749-78C1-283D1AB897C0}"/>
+                <a16:creationId xmlns:a16="http://schemas.microsoft.com/office/drawing/2014/main" id="{98A8E8F5-CA50-08D5-90EF-A6B808F7483C}"/>
               </a:ext>
             </a:extLst>
           </p:cNvPr>
@@ -5508,7 +6229,12 @@
             <p:ph idx="1"/>
           </p:nvPr>
         </p:nvSpPr>
-        <p:spPr/>
+        <p:spPr>
+          <a:xfrm>
+            <a:off x="838200" y="1825625"/>
+            <a:ext cx="11353800" cy="4351338"/>
+          </a:xfrm>
+        </p:spPr>
         <p:txBody>
           <a:bodyPr/>
           <a:lstStyle/>
@@ -5517,23 +6243,139 @@
               <a:buNone/>
             </a:pPr>
             <a:r>
-              <a:rPr lang="en-CA" dirty="0"/>
-              <a:t>Writing a program that prints “Hello, world!” is a classic programming exercise.</a:t>
+              <a:rPr lang="en-CA" dirty="0">
+                <a:latin typeface="Consolas" panose="020B0609020204030204" pitchFamily="49" charset="0"/>
+                <a:cs typeface="Consolas" panose="020B0609020204030204" pitchFamily="49" charset="0"/>
+              </a:rPr>
+              <a:t>print('Hi!')   # ok</a:t>
             </a:r>
           </a:p>
           <a:p>
             <a:pPr marL="0" indent="0">
               <a:buNone/>
             </a:pPr>
+            <a:r>
+              <a:rPr lang="en-CA" dirty="0">
+                <a:latin typeface="Consolas" panose="020B0609020204030204" pitchFamily="49" charset="0"/>
+                <a:cs typeface="Consolas" panose="020B0609020204030204" pitchFamily="49" charset="0"/>
+              </a:rPr>
+              <a:t>Print('Hi!')   # error: </a:t>
+            </a:r>
+            <a:r>
+              <a:rPr lang="en-CA" dirty="0">
+                <a:solidFill>
+                  <a:srgbClr val="FF0000"/>
+                </a:solidFill>
+                <a:latin typeface="Consolas" panose="020B0609020204030204" pitchFamily="49" charset="0"/>
+                <a:cs typeface="Consolas" panose="020B0609020204030204" pitchFamily="49" charset="0"/>
+              </a:rPr>
+              <a:t>capitalized is incorrect</a:t>
+            </a:r>
+          </a:p>
+          <a:p>
+            <a:pPr marL="0" indent="0">
+              <a:buNone/>
+            </a:pPr>
+            <a:r>
+              <a:rPr lang="en-CA" dirty="0">
+                <a:latin typeface="Consolas" panose="020B0609020204030204" pitchFamily="49" charset="0"/>
+                <a:cs typeface="Consolas" panose="020B0609020204030204" pitchFamily="49" charset="0"/>
+              </a:rPr>
+              <a:t>print('Hi!")   # error: </a:t>
+            </a:r>
+            <a:r>
+              <a:rPr lang="en-CA" dirty="0">
+                <a:solidFill>
+                  <a:srgbClr val="FF0000"/>
+                </a:solidFill>
+                <a:latin typeface="Consolas" panose="020B0609020204030204" pitchFamily="49" charset="0"/>
+                <a:cs typeface="Consolas" panose="020B0609020204030204" pitchFamily="49" charset="0"/>
+              </a:rPr>
+              <a:t>mis-matched quotes</a:t>
+            </a:r>
+          </a:p>
+          <a:p>
+            <a:pPr marL="0" indent="0">
+              <a:buNone/>
+            </a:pPr>
+            <a:r>
+              <a:rPr lang="en-CA" dirty="0">
+                <a:latin typeface="Consolas" panose="020B0609020204030204" pitchFamily="49" charset="0"/>
+                <a:cs typeface="Consolas" panose="020B0609020204030204" pitchFamily="49" charset="0"/>
+              </a:rPr>
+              <a:t> print('Hi!')  # error: </a:t>
+            </a:r>
+            <a:r>
+              <a:rPr lang="en-CA" dirty="0">
+                <a:solidFill>
+                  <a:srgbClr val="FF0000"/>
+                </a:solidFill>
+                <a:latin typeface="Consolas" panose="020B0609020204030204" pitchFamily="49" charset="0"/>
+                <a:cs typeface="Consolas" panose="020B0609020204030204" pitchFamily="49" charset="0"/>
+              </a:rPr>
+              <a:t>space at beginning</a:t>
+            </a:r>
+          </a:p>
+          <a:p>
             <a:endParaRPr lang="en-CA" dirty="0"/>
           </a:p>
-          <a:p>
-            <a:pPr marL="0" indent="0">
-              <a:buNone/>
-            </a:pPr>
-            <a:r>
-              <a:rPr lang="en-CA" dirty="0"/>
-              <a:t>Let’s see how a few popular languages do it …</a:t>
+        </p:txBody>
+      </p:sp>
+      <p:sp>
+        <p:nvSpPr>
+          <p:cNvPr id="5" name="TextBox 4">
+            <a:extLst>
+              <a:ext uri="{FF2B5EF4-FFF2-40B4-BE49-F238E27FC236}">
+                <a16:creationId xmlns:a16="http://schemas.microsoft.com/office/drawing/2014/main" id="{B646BB83-5AD1-1543-0F3A-BB00160F5DAB}"/>
+              </a:ext>
+            </a:extLst>
+          </p:cNvPr>
+          <p:cNvSpPr txBox="1"/>
+          <p:nvPr/>
+        </p:nvSpPr>
+        <p:spPr>
+          <a:xfrm>
+            <a:off x="7770569" y="681037"/>
+            <a:ext cx="3871444" cy="1200329"/>
+          </a:xfrm>
+          <a:prstGeom prst="rect">
+            <a:avLst/>
+          </a:prstGeom>
+          <a:solidFill>
+            <a:srgbClr val="FFFF00"/>
+          </a:solidFill>
+        </p:spPr>
+        <p:txBody>
+          <a:bodyPr wrap="none" rtlCol="0">
+            <a:spAutoFit/>
+          </a:bodyPr>
+          <a:lstStyle/>
+          <a:p>
+            <a:pPr algn="ctr"/>
+            <a:r>
+              <a:rPr lang="en-CA" dirty="0"/>
+              <a:t>Part of the challenge of learning</a:t>
+            </a:r>
+          </a:p>
+          <a:p>
+            <a:pPr algn="ctr"/>
+            <a:r>
+              <a:rPr lang="en-CA" dirty="0"/>
+              <a:t>to program is getting used to the </a:t>
+            </a:r>
+          </a:p>
+          <a:p>
+            <a:pPr algn="ctr"/>
+            <a:r>
+              <a:rPr lang="en-CA" dirty="0"/>
+              <a:t>strictness of using a formal language.</a:t>
+            </a:r>
+          </a:p>
+          <a:p>
+            <a:pPr algn="ctr"/>
+            <a:r>
+              <a:rPr lang="en-CA" dirty="0"/>
+              <a:t>It can be frustrating at first!</a:t>
             </a:r>
           </a:p>
         </p:txBody>
@@ -5541,7 +6383,7 @@
     </p:spTree>
     <p:extLst>
       <p:ext uri="{BB962C8B-B14F-4D97-AF65-F5344CB8AC3E}">
-        <p14:creationId xmlns:p14="http://schemas.microsoft.com/office/powerpoint/2010/main" val="938849494"/>
+        <p14:creationId xmlns:p14="http://schemas.microsoft.com/office/powerpoint/2010/main" val="3348444406"/>
       </p:ext>
     </p:extLst>
   </p:cSld>
@@ -5573,7 +6415,7 @@
           <p:cNvPr id="2" name="Title 1">
             <a:extLst>
               <a:ext uri="{FF2B5EF4-FFF2-40B4-BE49-F238E27FC236}">
-                <a16:creationId xmlns:a16="http://schemas.microsoft.com/office/drawing/2014/main" id="{92D60C6D-C3E0-3950-95BE-C1C542D5B175}"/>
+                <a16:creationId xmlns:a16="http://schemas.microsoft.com/office/drawing/2014/main" id="{F0447A7A-D215-010A-A458-B2640B4B26D9}"/>
               </a:ext>
             </a:extLst>
           </p:cNvPr>
@@ -5591,7 +6433,7 @@
           <a:p>
             <a:r>
               <a:rPr lang="en-CA" dirty="0"/>
-              <a:t>Natural Language</a:t>
+              <a:t>Hello World in Various Languages</a:t>
             </a:r>
           </a:p>
         </p:txBody>
@@ -5601,7 +6443,7 @@
           <p:cNvPr id="3" name="Content Placeholder 2">
             <a:extLst>
               <a:ext uri="{FF2B5EF4-FFF2-40B4-BE49-F238E27FC236}">
-                <a16:creationId xmlns:a16="http://schemas.microsoft.com/office/drawing/2014/main" id="{5B7000D7-3453-5BD4-0A71-EBA2BD423FC9}"/>
+                <a16:creationId xmlns:a16="http://schemas.microsoft.com/office/drawing/2014/main" id="{CDDE56BB-85C7-D749-78C1-283D1AB897C0}"/>
               </a:ext>
             </a:extLst>
           </p:cNvPr>
@@ -5621,41 +6463,31 @@
               <a:buNone/>
             </a:pPr>
             <a:r>
+              <a:rPr lang="en-CA" dirty="0"/>
+              <a:t>Writing a program that prints </a:t>
+            </a:r>
+            <a:r>
               <a:rPr lang="en-CA" b="1" dirty="0"/>
-              <a:t>English</a:t>
-            </a:r>
-            <a:r>
-              <a:rPr lang="en-CA" dirty="0"/>
-              <a:t>: Hello, world!</a:t>
+              <a:t>Hello, world!</a:t>
+            </a:r>
+            <a:r>
+              <a:rPr lang="en-CA" dirty="0"/>
+              <a:t> is a classic programming exercise.</a:t>
             </a:r>
           </a:p>
           <a:p>
             <a:pPr marL="0" indent="0">
               <a:buNone/>
             </a:pPr>
-            <a:r>
-              <a:rPr lang="en-CA" b="1" dirty="0"/>
-              <a:t>Chinook</a:t>
-            </a:r>
-            <a:r>
-              <a:rPr lang="en-CA" dirty="0"/>
-              <a:t>: Wawa Klahowya </a:t>
-            </a:r>
-            <a:r>
-              <a:rPr lang="en-CA" dirty="0" err="1"/>
-              <a:t>Hayas</a:t>
-            </a:r>
-            <a:r>
-              <a:rPr lang="en-CA" dirty="0"/>
-              <a:t> </a:t>
-            </a:r>
-            <a:r>
-              <a:rPr lang="en-CA" dirty="0" err="1"/>
-              <a:t>Klaska</a:t>
-            </a:r>
-            <a:r>
-              <a:rPr lang="en-CA" dirty="0"/>
-              <a:t>!</a:t>
+            <a:endParaRPr lang="en-CA" dirty="0"/>
+          </a:p>
+          <a:p>
+            <a:pPr marL="0" indent="0">
+              <a:buNone/>
+            </a:pPr>
+            <a:r>
+              <a:rPr lang="en-CA" dirty="0"/>
+              <a:t>Let’s see how a few popular languages do it …</a:t>
             </a:r>
           </a:p>
         </p:txBody>
@@ -5663,7 +6495,7 @@
     </p:spTree>
     <p:extLst>
       <p:ext uri="{BB962C8B-B14F-4D97-AF65-F5344CB8AC3E}">
-        <p14:creationId xmlns:p14="http://schemas.microsoft.com/office/powerpoint/2010/main" val="3817561596"/>
+        <p14:creationId xmlns:p14="http://schemas.microsoft.com/office/powerpoint/2010/main" val="938849494"/>
       </p:ext>
     </p:extLst>
   </p:cSld>
@@ -5695,7 +6527,7 @@
           <p:cNvPr id="2" name="Title 1">
             <a:extLst>
               <a:ext uri="{FF2B5EF4-FFF2-40B4-BE49-F238E27FC236}">
-                <a16:creationId xmlns:a16="http://schemas.microsoft.com/office/drawing/2014/main" id="{2FDF9A17-767A-E12B-BC3E-F74482A661A8}"/>
+                <a16:creationId xmlns:a16="http://schemas.microsoft.com/office/drawing/2014/main" id="{92D60C6D-C3E0-3950-95BE-C1C542D5B175}"/>
               </a:ext>
             </a:extLst>
           </p:cNvPr>
@@ -5713,7 +6545,7 @@
           <a:p>
             <a:r>
               <a:rPr lang="en-CA" dirty="0"/>
-              <a:t>Assembly Language</a:t>
+              <a:t>Natural Language</a:t>
             </a:r>
           </a:p>
         </p:txBody>
@@ -5723,7 +6555,7 @@
           <p:cNvPr id="3" name="Content Placeholder 2">
             <a:extLst>
               <a:ext uri="{FF2B5EF4-FFF2-40B4-BE49-F238E27FC236}">
-                <a16:creationId xmlns:a16="http://schemas.microsoft.com/office/drawing/2014/main" id="{50798CC9-C622-B878-F83F-05F196ABC0AF}"/>
+                <a16:creationId xmlns:a16="http://schemas.microsoft.com/office/drawing/2014/main" id="{5B7000D7-3453-5BD4-0A71-EBA2BD423FC9}"/>
               </a:ext>
             </a:extLst>
           </p:cNvPr>
@@ -5736,469 +6568,54 @@
         </p:nvSpPr>
         <p:spPr/>
         <p:txBody>
-          <a:bodyPr>
-            <a:normAutofit fontScale="55000" lnSpcReduction="20000"/>
-          </a:bodyPr>
+          <a:bodyPr/>
           <a:lstStyle/>
           <a:p>
             <a:pPr marL="0" indent="0">
               <a:buNone/>
             </a:pPr>
             <a:r>
-              <a:rPr lang="en-US" b="0" dirty="0">
-                <a:effectLst/>
-                <a:latin typeface="Consolas" panose="020B0609020204030204" pitchFamily="49" charset="0"/>
-              </a:rPr>
-              <a:t>section        .text                   ; declare the .text section</a:t>
+              <a:rPr lang="en-CA" b="1" dirty="0"/>
+              <a:t>English</a:t>
+            </a:r>
+            <a:r>
+              <a:rPr lang="en-CA" dirty="0"/>
+              <a:t>: Hello, world!</a:t>
             </a:r>
           </a:p>
           <a:p>
             <a:pPr marL="0" indent="0">
               <a:buNone/>
             </a:pPr>
-            <a:r>
-              <a:rPr lang="en-US" b="0" dirty="0">
-                <a:effectLst/>
-                <a:latin typeface="Consolas" panose="020B0609020204030204" pitchFamily="49" charset="0"/>
-              </a:rPr>
-              <a:t>global         _start                  ; has to be declared for the linker (</a:t>
-            </a:r>
-            <a:r>
-              <a:rPr lang="en-US" b="0" dirty="0" err="1">
-                <a:effectLst/>
-                <a:latin typeface="Consolas" panose="020B0609020204030204" pitchFamily="49" charset="0"/>
-              </a:rPr>
-              <a:t>ld</a:t>
-            </a:r>
-            <a:r>
-              <a:rPr lang="en-US" b="0" dirty="0">
-                <a:effectLst/>
-                <a:latin typeface="Consolas" panose="020B0609020204030204" pitchFamily="49" charset="0"/>
-              </a:rPr>
-              <a:t>)</a:t>
-            </a:r>
+            <a:endParaRPr lang="en-CA" dirty="0"/>
           </a:p>
           <a:p>
             <a:pPr marL="0" indent="0">
               <a:buNone/>
             </a:pPr>
             <a:r>
-              <a:rPr lang="en-US" b="0" dirty="0">
-                <a:effectLst/>
-                <a:latin typeface="Consolas" panose="020B0609020204030204" pitchFamily="49" charset="0"/>
-              </a:rPr>
-              <a:t>_start:                                ; entry point for _start</a:t>
-            </a:r>
-          </a:p>
-          <a:p>
-            <a:pPr marL="0" indent="0">
-              <a:buNone/>
-            </a:pPr>
-            <a:r>
-              <a:rPr lang="en-US" b="0" dirty="0">
-                <a:effectLst/>
-                <a:latin typeface="Consolas" panose="020B0609020204030204" pitchFamily="49" charset="0"/>
-              </a:rPr>
-              <a:t>    mov </a:t>
-            </a:r>
-            <a:r>
-              <a:rPr lang="en-US" b="0" dirty="0" err="1">
-                <a:effectLst/>
-                <a:latin typeface="Consolas" panose="020B0609020204030204" pitchFamily="49" charset="0"/>
-              </a:rPr>
-              <a:t>edx</a:t>
-            </a:r>
-            <a:r>
-              <a:rPr lang="en-US" b="0" dirty="0">
-                <a:effectLst/>
-                <a:latin typeface="Consolas" panose="020B0609020204030204" pitchFamily="49" charset="0"/>
-              </a:rPr>
-              <a:t>, </a:t>
-            </a:r>
-            <a:r>
-              <a:rPr lang="en-US" b="0" dirty="0" err="1">
-                <a:effectLst/>
-                <a:latin typeface="Consolas" panose="020B0609020204030204" pitchFamily="49" charset="0"/>
-              </a:rPr>
-              <a:t>len</a:t>
-            </a:r>
-            <a:r>
-              <a:rPr lang="en-US" b="0" dirty="0">
-                <a:effectLst/>
-                <a:latin typeface="Consolas" panose="020B0609020204030204" pitchFamily="49" charset="0"/>
-              </a:rPr>
-              <a:t>                       ; "invoke" the </a:t>
-            </a:r>
-            <a:r>
-              <a:rPr lang="en-US" b="0" dirty="0" err="1">
-                <a:effectLst/>
-                <a:latin typeface="Consolas" panose="020B0609020204030204" pitchFamily="49" charset="0"/>
-              </a:rPr>
-              <a:t>len</a:t>
-            </a:r>
-            <a:r>
-              <a:rPr lang="en-US" b="0" dirty="0">
-                <a:effectLst/>
-                <a:latin typeface="Consolas" panose="020B0609020204030204" pitchFamily="49" charset="0"/>
-              </a:rPr>
-              <a:t> of the message</a:t>
-            </a:r>
-          </a:p>
-          <a:p>
-            <a:pPr marL="0" indent="0">
-              <a:buNone/>
-            </a:pPr>
-            <a:r>
-              <a:rPr lang="en-US" b="0" dirty="0">
-                <a:effectLst/>
-                <a:latin typeface="Consolas" panose="020B0609020204030204" pitchFamily="49" charset="0"/>
-              </a:rPr>
-              <a:t>    mov </a:t>
-            </a:r>
-            <a:r>
-              <a:rPr lang="en-US" b="0" dirty="0" err="1">
-                <a:effectLst/>
-                <a:latin typeface="Consolas" panose="020B0609020204030204" pitchFamily="49" charset="0"/>
-              </a:rPr>
-              <a:t>ecx</a:t>
-            </a:r>
-            <a:r>
-              <a:rPr lang="en-US" b="0" dirty="0">
-                <a:effectLst/>
-                <a:latin typeface="Consolas" panose="020B0609020204030204" pitchFamily="49" charset="0"/>
-              </a:rPr>
-              <a:t>, msg                       ; "invoke" the message itself</a:t>
-            </a:r>
-          </a:p>
-          <a:p>
-            <a:pPr marL="0" indent="0">
-              <a:buNone/>
-            </a:pPr>
-            <a:br>
-              <a:rPr lang="en-US" b="0" dirty="0">
-                <a:effectLst/>
-                <a:latin typeface="Consolas" panose="020B0609020204030204" pitchFamily="49" charset="0"/>
-              </a:rPr>
-            </a:br>
-            <a:r>
-              <a:rPr lang="en-US" b="0" dirty="0">
-                <a:effectLst/>
-                <a:latin typeface="Consolas" panose="020B0609020204030204" pitchFamily="49" charset="0"/>
-              </a:rPr>
-              <a:t>    mov </a:t>
-            </a:r>
-            <a:r>
-              <a:rPr lang="en-US" b="0" dirty="0" err="1">
-                <a:effectLst/>
-                <a:latin typeface="Consolas" panose="020B0609020204030204" pitchFamily="49" charset="0"/>
-              </a:rPr>
-              <a:t>ebx</a:t>
-            </a:r>
-            <a:r>
-              <a:rPr lang="en-US" b="0" dirty="0">
-                <a:effectLst/>
-                <a:latin typeface="Consolas" panose="020B0609020204030204" pitchFamily="49" charset="0"/>
-              </a:rPr>
-              <a:t>, 1                         ; set the file descriptor (</a:t>
-            </a:r>
-            <a:r>
-              <a:rPr lang="en-US" b="0" dirty="0" err="1">
-                <a:effectLst/>
-                <a:latin typeface="Consolas" panose="020B0609020204030204" pitchFamily="49" charset="0"/>
-              </a:rPr>
-              <a:t>fd</a:t>
-            </a:r>
-            <a:r>
-              <a:rPr lang="en-US" b="0" dirty="0">
-                <a:effectLst/>
-                <a:latin typeface="Consolas" panose="020B0609020204030204" pitchFamily="49" charset="0"/>
-              </a:rPr>
-              <a:t>) to </a:t>
-            </a:r>
-            <a:r>
-              <a:rPr lang="en-US" b="0" dirty="0" err="1">
-                <a:effectLst/>
-                <a:latin typeface="Consolas" panose="020B0609020204030204" pitchFamily="49" charset="0"/>
-              </a:rPr>
-              <a:t>stdout</a:t>
-            </a:r>
-            <a:endParaRPr lang="en-US" b="0" dirty="0">
-              <a:effectLst/>
-              <a:latin typeface="Consolas" panose="020B0609020204030204" pitchFamily="49" charset="0"/>
-            </a:endParaRPr>
-          </a:p>
-          <a:p>
-            <a:pPr marL="0" indent="0">
-              <a:buNone/>
-            </a:pPr>
-            <a:br>
-              <a:rPr lang="en-US" b="0" dirty="0">
-                <a:effectLst/>
-                <a:latin typeface="Consolas" panose="020B0609020204030204" pitchFamily="49" charset="0"/>
-              </a:rPr>
-            </a:br>
-            <a:r>
-              <a:rPr lang="en-US" b="0" dirty="0">
-                <a:effectLst/>
-                <a:latin typeface="Consolas" panose="020B0609020204030204" pitchFamily="49" charset="0"/>
-              </a:rPr>
-              <a:t>    mov </a:t>
-            </a:r>
-            <a:r>
-              <a:rPr lang="en-US" b="0" dirty="0" err="1">
-                <a:effectLst/>
-                <a:latin typeface="Consolas" panose="020B0609020204030204" pitchFamily="49" charset="0"/>
-              </a:rPr>
-              <a:t>eax</a:t>
-            </a:r>
-            <a:r>
-              <a:rPr lang="en-US" b="0" dirty="0">
-                <a:effectLst/>
-                <a:latin typeface="Consolas" panose="020B0609020204030204" pitchFamily="49" charset="0"/>
-              </a:rPr>
-              <a:t>, 4                         ; system call for "write"   </a:t>
-            </a:r>
-          </a:p>
-          <a:p>
-            <a:pPr marL="0" indent="0">
-              <a:buNone/>
-            </a:pPr>
-            <a:r>
-              <a:rPr lang="en-US" b="0" dirty="0">
-                <a:effectLst/>
-                <a:latin typeface="Consolas" panose="020B0609020204030204" pitchFamily="49" charset="0"/>
-              </a:rPr>
-              <a:t>    int 0x80                           ; call the kernel</a:t>
-            </a:r>
-          </a:p>
-          <a:p>
-            <a:pPr marL="0" indent="0">
-              <a:buNone/>
-            </a:pPr>
-            <a:br>
-              <a:rPr lang="en-US" b="0" dirty="0">
-                <a:effectLst/>
-                <a:latin typeface="Consolas" panose="020B0609020204030204" pitchFamily="49" charset="0"/>
-              </a:rPr>
-            </a:br>
-            <a:r>
-              <a:rPr lang="en-US" b="0" dirty="0">
-                <a:effectLst/>
-                <a:latin typeface="Consolas" panose="020B0609020204030204" pitchFamily="49" charset="0"/>
-              </a:rPr>
-              <a:t>    mov </a:t>
-            </a:r>
-            <a:r>
-              <a:rPr lang="en-US" b="0" dirty="0" err="1">
-                <a:effectLst/>
-                <a:latin typeface="Consolas" panose="020B0609020204030204" pitchFamily="49" charset="0"/>
-              </a:rPr>
-              <a:t>eax</a:t>
-            </a:r>
-            <a:r>
-              <a:rPr lang="en-US" b="0" dirty="0">
-                <a:effectLst/>
-                <a:latin typeface="Consolas" panose="020B0609020204030204" pitchFamily="49" charset="0"/>
-              </a:rPr>
-              <a:t>, 1                         ; system call for "exit"</a:t>
-            </a:r>
-          </a:p>
-          <a:p>
-            <a:pPr marL="0" indent="0">
-              <a:buNone/>
-            </a:pPr>
-            <a:r>
-              <a:rPr lang="en-US" b="0" dirty="0">
-                <a:effectLst/>
-                <a:latin typeface="Consolas" panose="020B0609020204030204" pitchFamily="49" charset="0"/>
-              </a:rPr>
-              <a:t>    int 0x80                           ; call the kernel</a:t>
-            </a:r>
-          </a:p>
-          <a:p>
-            <a:pPr marL="0" indent="0">
-              <a:buNone/>
-            </a:pPr>
-            <a:br>
-              <a:rPr lang="en-US" b="0" dirty="0">
-                <a:effectLst/>
-                <a:latin typeface="Consolas" panose="020B0609020204030204" pitchFamily="49" charset="0"/>
-              </a:rPr>
-            </a:br>
-            <a:r>
-              <a:rPr lang="en-US" b="0" dirty="0">
-                <a:effectLst/>
-                <a:latin typeface="Consolas" panose="020B0609020204030204" pitchFamily="49" charset="0"/>
-              </a:rPr>
-              <a:t>section        .data                   ; here you declare the data</a:t>
-            </a:r>
-          </a:p>
-          <a:p>
-            <a:pPr marL="0" indent="0">
-              <a:buNone/>
-            </a:pPr>
-            <a:r>
-              <a:rPr lang="en-US" b="0" dirty="0">
-                <a:effectLst/>
-                <a:latin typeface="Consolas" panose="020B0609020204030204" pitchFamily="49" charset="0"/>
-              </a:rPr>
-              <a:t>    msg        </a:t>
-            </a:r>
-            <a:r>
-              <a:rPr lang="en-US" b="0" dirty="0" err="1">
-                <a:effectLst/>
-                <a:latin typeface="Consolas" panose="020B0609020204030204" pitchFamily="49" charset="0"/>
-              </a:rPr>
-              <a:t>db</a:t>
-            </a:r>
-            <a:r>
-              <a:rPr lang="en-US" b="0" dirty="0">
-                <a:effectLst/>
-                <a:latin typeface="Consolas" panose="020B0609020204030204" pitchFamily="49" charset="0"/>
-              </a:rPr>
+              <a:rPr lang="en-CA" b="1" dirty="0"/>
+              <a:t>Chinook</a:t>
+            </a:r>
+            <a:r>
+              <a:rPr lang="en-CA" dirty="0"/>
+              <a:t>: Wawa Klahowya </a:t>
+            </a:r>
+            <a:r>
+              <a:rPr lang="en-CA" dirty="0" err="1"/>
+              <a:t>Hayas</a:t>
+            </a:r>
+            <a:r>
+              <a:rPr lang="en-CA" dirty="0"/>
               <a:t> </a:t>
             </a:r>
             <a:r>
-              <a:rPr lang="en-US" b="0" dirty="0">
-                <a:effectLst/>
-                <a:highlight>
-                  <a:srgbClr val="FFFF00"/>
-                </a:highlight>
-                <a:latin typeface="Consolas" panose="020B0609020204030204" pitchFamily="49" charset="0"/>
-              </a:rPr>
-              <a:t>"Hello world!"</a:t>
-            </a:r>
-            <a:r>
-              <a:rPr lang="en-US" b="0" dirty="0">
-                <a:effectLst/>
-                <a:latin typeface="Consolas" panose="020B0609020204030204" pitchFamily="49" charset="0"/>
-              </a:rPr>
-              <a:t>       ; the actual message to use</a:t>
-            </a:r>
-          </a:p>
-          <a:p>
-            <a:pPr marL="0" indent="0">
-              <a:buNone/>
-            </a:pPr>
-            <a:r>
-              <a:rPr lang="en-US" b="0" dirty="0">
-                <a:effectLst/>
-                <a:latin typeface="Consolas" panose="020B0609020204030204" pitchFamily="49" charset="0"/>
-              </a:rPr>
-              <a:t>    </a:t>
-            </a:r>
-            <a:r>
-              <a:rPr lang="en-US" b="0" dirty="0" err="1">
-                <a:effectLst/>
-                <a:latin typeface="Consolas" panose="020B0609020204030204" pitchFamily="49" charset="0"/>
-              </a:rPr>
-              <a:t>len</a:t>
-            </a:r>
-            <a:r>
-              <a:rPr lang="en-US" b="0" dirty="0">
-                <a:effectLst/>
-                <a:latin typeface="Consolas" panose="020B0609020204030204" pitchFamily="49" charset="0"/>
-              </a:rPr>
-              <a:t>        </a:t>
-            </a:r>
-            <a:r>
-              <a:rPr lang="en-US" b="0" dirty="0" err="1">
-                <a:effectLst/>
-                <a:latin typeface="Consolas" panose="020B0609020204030204" pitchFamily="49" charset="0"/>
-              </a:rPr>
-              <a:t>equ</a:t>
-            </a:r>
-            <a:r>
-              <a:rPr lang="en-US" b="0" dirty="0">
-                <a:effectLst/>
-                <a:latin typeface="Consolas" panose="020B0609020204030204" pitchFamily="49" charset="0"/>
-              </a:rPr>
-              <a:t> $ -msg              ; get the size of the message</a:t>
-            </a:r>
-          </a:p>
-          <a:p>
-            <a:pPr marL="0" indent="0">
-              <a:buNone/>
-            </a:pPr>
-            <a:endParaRPr lang="en-CA" dirty="0"/>
-          </a:p>
-        </p:txBody>
-      </p:sp>
-      <p:sp>
-        <p:nvSpPr>
-          <p:cNvPr id="4" name="TextBox 3">
-            <a:extLst>
-              <a:ext uri="{FF2B5EF4-FFF2-40B4-BE49-F238E27FC236}">
-                <a16:creationId xmlns:a16="http://schemas.microsoft.com/office/drawing/2014/main" id="{B0FB5CCC-97E9-CCC8-53AA-6EBA19E865D1}"/>
-              </a:ext>
-            </a:extLst>
-          </p:cNvPr>
-          <p:cNvSpPr txBox="1"/>
-          <p:nvPr/>
-        </p:nvSpPr>
-        <p:spPr>
-          <a:xfrm>
-            <a:off x="8163427" y="3796964"/>
-            <a:ext cx="3850320" cy="2585323"/>
-          </a:xfrm>
-          <a:prstGeom prst="rect">
-            <a:avLst/>
-          </a:prstGeom>
-          <a:solidFill>
-            <a:srgbClr val="FFFF00"/>
-          </a:solidFill>
-        </p:spPr>
-        <p:txBody>
-          <a:bodyPr wrap="square" rtlCol="0">
-            <a:spAutoFit/>
-          </a:bodyPr>
-          <a:lstStyle/>
-          <a:p>
-            <a:r>
-              <a:rPr lang="en-CA" b="1" dirty="0"/>
-              <a:t>Assembly language </a:t>
-            </a:r>
-            <a:r>
-              <a:rPr lang="en-CA" dirty="0"/>
-              <a:t>is  the lowest</a:t>
-            </a:r>
-            <a:br>
-              <a:rPr lang="en-CA" dirty="0"/>
-            </a:br>
-            <a:r>
-              <a:rPr lang="en-CA" dirty="0"/>
-              <a:t>level of programming language most</a:t>
-            </a:r>
-            <a:br>
-              <a:rPr lang="en-CA" dirty="0"/>
-            </a:br>
-            <a:r>
-              <a:rPr lang="en-CA" dirty="0"/>
-              <a:t>programmers will ever deal with. It is the native language of the computer.</a:t>
-            </a:r>
-          </a:p>
-          <a:p>
-            <a:endParaRPr lang="en-CA" dirty="0"/>
-          </a:p>
-          <a:p>
-            <a:r>
-              <a:rPr lang="en-CA" b="1" dirty="0"/>
-              <a:t>Pros</a:t>
-            </a:r>
-            <a:r>
-              <a:rPr lang="en-CA" dirty="0"/>
-              <a:t>: fast, flexible</a:t>
-            </a:r>
-            <a:br>
-              <a:rPr lang="en-CA" dirty="0"/>
-            </a:br>
-            <a:r>
-              <a:rPr lang="en-CA" b="1" dirty="0"/>
-              <a:t>Cons</a:t>
-            </a:r>
-            <a:r>
-              <a:rPr lang="en-CA" dirty="0"/>
-              <a:t>: long programs needed to do simple  things; difficult and time-consuming to write and debug</a:t>
+              <a:rPr lang="en-CA" dirty="0" err="1"/>
+              <a:t>Klaska</a:t>
+            </a:r>
+            <a:r>
+              <a:rPr lang="en-CA" dirty="0"/>
+              <a:t>!</a:t>
             </a:r>
           </a:p>
         </p:txBody>
@@ -6206,7 +6623,7 @@
     </p:spTree>
     <p:extLst>
       <p:ext uri="{BB962C8B-B14F-4D97-AF65-F5344CB8AC3E}">
-        <p14:creationId xmlns:p14="http://schemas.microsoft.com/office/powerpoint/2010/main" val="4281630409"/>
+        <p14:creationId xmlns:p14="http://schemas.microsoft.com/office/powerpoint/2010/main" val="3817561596"/>
       </p:ext>
     </p:extLst>
   </p:cSld>
@@ -6256,7 +6673,7 @@
           <a:p>
             <a:r>
               <a:rPr lang="en-CA" dirty="0"/>
-              <a:t>C Language</a:t>
+              <a:t>Assembly Language</a:t>
             </a:r>
           </a:p>
         </p:txBody>
@@ -6280,7 +6697,7 @@
         <p:spPr/>
         <p:txBody>
           <a:bodyPr>
-            <a:normAutofit/>
+            <a:normAutofit fontScale="55000" lnSpcReduction="20000"/>
           </a:bodyPr>
           <a:lstStyle/>
           <a:p>
@@ -6292,27 +6709,179 @@
                 <a:effectLst/>
                 <a:latin typeface="Consolas" panose="020B0609020204030204" pitchFamily="49" charset="0"/>
               </a:rPr>
-              <a:t>#include &lt;</a:t>
+              <a:t>section        .text                   ; declare the .text section</a:t>
+            </a:r>
+          </a:p>
+          <a:p>
+            <a:pPr marL="0" indent="0">
+              <a:buNone/>
+            </a:pPr>
+            <a:r>
+              <a:rPr lang="en-US" b="0" dirty="0">
+                <a:effectLst/>
+                <a:latin typeface="Consolas" panose="020B0609020204030204" pitchFamily="49" charset="0"/>
+              </a:rPr>
+              <a:t>global         _start                  ; has to be declared for the linker (</a:t>
             </a:r>
             <a:r>
               <a:rPr lang="en-US" b="0" dirty="0" err="1">
                 <a:effectLst/>
                 <a:latin typeface="Consolas" panose="020B0609020204030204" pitchFamily="49" charset="0"/>
               </a:rPr>
-              <a:t>stdio.h</a:t>
+              <a:t>ld</a:t>
             </a:r>
             <a:r>
               <a:rPr lang="en-US" b="0" dirty="0">
                 <a:effectLst/>
                 <a:latin typeface="Consolas" panose="020B0609020204030204" pitchFamily="49" charset="0"/>
               </a:rPr>
-              <a:t>&gt;</a:t>
+              <a:t>)</a:t>
             </a:r>
           </a:p>
           <a:p>
             <a:pPr marL="0" indent="0">
               <a:buNone/>
             </a:pPr>
+            <a:r>
+              <a:rPr lang="en-US" b="0" dirty="0">
+                <a:effectLst/>
+                <a:latin typeface="Consolas" panose="020B0609020204030204" pitchFamily="49" charset="0"/>
+              </a:rPr>
+              <a:t>_start:                                ; entry point for _start</a:t>
+            </a:r>
+          </a:p>
+          <a:p>
+            <a:pPr marL="0" indent="0">
+              <a:buNone/>
+            </a:pPr>
+            <a:r>
+              <a:rPr lang="en-US" b="0" dirty="0">
+                <a:effectLst/>
+                <a:latin typeface="Consolas" panose="020B0609020204030204" pitchFamily="49" charset="0"/>
+              </a:rPr>
+              <a:t>    mov </a:t>
+            </a:r>
+            <a:r>
+              <a:rPr lang="en-US" b="0" dirty="0" err="1">
+                <a:effectLst/>
+                <a:latin typeface="Consolas" panose="020B0609020204030204" pitchFamily="49" charset="0"/>
+              </a:rPr>
+              <a:t>edx</a:t>
+            </a:r>
+            <a:r>
+              <a:rPr lang="en-US" b="0" dirty="0">
+                <a:effectLst/>
+                <a:latin typeface="Consolas" panose="020B0609020204030204" pitchFamily="49" charset="0"/>
+              </a:rPr>
+              <a:t>, </a:t>
+            </a:r>
+            <a:r>
+              <a:rPr lang="en-US" b="0" dirty="0" err="1">
+                <a:effectLst/>
+                <a:latin typeface="Consolas" panose="020B0609020204030204" pitchFamily="49" charset="0"/>
+              </a:rPr>
+              <a:t>len</a:t>
+            </a:r>
+            <a:r>
+              <a:rPr lang="en-US" b="0" dirty="0">
+                <a:effectLst/>
+                <a:latin typeface="Consolas" panose="020B0609020204030204" pitchFamily="49" charset="0"/>
+              </a:rPr>
+              <a:t>                       ; "invoke" the </a:t>
+            </a:r>
+            <a:r>
+              <a:rPr lang="en-US" b="0" dirty="0" err="1">
+                <a:effectLst/>
+                <a:latin typeface="Consolas" panose="020B0609020204030204" pitchFamily="49" charset="0"/>
+              </a:rPr>
+              <a:t>len</a:t>
+            </a:r>
+            <a:r>
+              <a:rPr lang="en-US" b="0" dirty="0">
+                <a:effectLst/>
+                <a:latin typeface="Consolas" panose="020B0609020204030204" pitchFamily="49" charset="0"/>
+              </a:rPr>
+              <a:t> of the message</a:t>
+            </a:r>
+          </a:p>
+          <a:p>
+            <a:pPr marL="0" indent="0">
+              <a:buNone/>
+            </a:pPr>
+            <a:r>
+              <a:rPr lang="en-US" b="0" dirty="0">
+                <a:effectLst/>
+                <a:latin typeface="Consolas" panose="020B0609020204030204" pitchFamily="49" charset="0"/>
+              </a:rPr>
+              <a:t>    mov </a:t>
+            </a:r>
+            <a:r>
+              <a:rPr lang="en-US" b="0" dirty="0" err="1">
+                <a:effectLst/>
+                <a:latin typeface="Consolas" panose="020B0609020204030204" pitchFamily="49" charset="0"/>
+              </a:rPr>
+              <a:t>ecx</a:t>
+            </a:r>
+            <a:r>
+              <a:rPr lang="en-US" b="0" dirty="0">
+                <a:effectLst/>
+                <a:latin typeface="Consolas" panose="020B0609020204030204" pitchFamily="49" charset="0"/>
+              </a:rPr>
+              <a:t>, msg                       ; "invoke" the message itself</a:t>
+            </a:r>
+          </a:p>
+          <a:p>
+            <a:pPr marL="0" indent="0">
+              <a:buNone/>
+            </a:pPr>
+            <a:br>
+              <a:rPr lang="en-US" b="0" dirty="0">
+                <a:effectLst/>
+                <a:latin typeface="Consolas" panose="020B0609020204030204" pitchFamily="49" charset="0"/>
+              </a:rPr>
+            </a:br>
+            <a:r>
+              <a:rPr lang="en-US" b="0" dirty="0">
+                <a:effectLst/>
+                <a:latin typeface="Consolas" panose="020B0609020204030204" pitchFamily="49" charset="0"/>
+              </a:rPr>
+              <a:t>    mov </a:t>
+            </a:r>
+            <a:r>
+              <a:rPr lang="en-US" b="0" dirty="0" err="1">
+                <a:effectLst/>
+                <a:latin typeface="Consolas" panose="020B0609020204030204" pitchFamily="49" charset="0"/>
+              </a:rPr>
+              <a:t>ebx</a:t>
+            </a:r>
+            <a:r>
+              <a:rPr lang="en-US" b="0" dirty="0">
+                <a:effectLst/>
+                <a:latin typeface="Consolas" panose="020B0609020204030204" pitchFamily="49" charset="0"/>
+              </a:rPr>
+              <a:t>, 1                         ; set the file descriptor (</a:t>
+            </a:r>
+            <a:r>
+              <a:rPr lang="en-US" b="0" dirty="0" err="1">
+                <a:effectLst/>
+                <a:latin typeface="Consolas" panose="020B0609020204030204" pitchFamily="49" charset="0"/>
+              </a:rPr>
+              <a:t>fd</a:t>
+            </a:r>
+            <a:r>
+              <a:rPr lang="en-US" b="0" dirty="0">
+                <a:effectLst/>
+                <a:latin typeface="Consolas" panose="020B0609020204030204" pitchFamily="49" charset="0"/>
+              </a:rPr>
+              <a:t>) to </a:t>
+            </a:r>
+            <a:r>
+              <a:rPr lang="en-US" b="0" dirty="0" err="1">
+                <a:effectLst/>
+                <a:latin typeface="Consolas" panose="020B0609020204030204" pitchFamily="49" charset="0"/>
+              </a:rPr>
+              <a:t>stdout</a:t>
+            </a:r>
             <a:endParaRPr lang="en-US" b="0" dirty="0">
               <a:effectLst/>
               <a:latin typeface="Consolas" panose="020B0609020204030204" pitchFamily="49" charset="0"/>
@@ -6322,12 +6891,32 @@
             <a:pPr marL="0" indent="0">
               <a:buNone/>
             </a:pPr>
-            <a:r>
+            <a:br>
               <a:rPr lang="en-US" b="0" dirty="0">
                 <a:effectLst/>
                 <a:latin typeface="Consolas" panose="020B0609020204030204" pitchFamily="49" charset="0"/>
               </a:rPr>
-              <a:t>int main() </a:t>
+            </a:br>
+            <a:r>
+              <a:rPr lang="en-US" b="0" dirty="0">
+                <a:effectLst/>
+                <a:latin typeface="Consolas" panose="020B0609020204030204" pitchFamily="49" charset="0"/>
+              </a:rPr>
+              <a:t>    mov </a:t>
+            </a:r>
+            <a:r>
+              <a:rPr lang="en-US" b="0" dirty="0" err="1">
+                <a:effectLst/>
+                <a:latin typeface="Consolas" panose="020B0609020204030204" pitchFamily="49" charset="0"/>
+              </a:rPr>
+              <a:t>eax</a:t>
+            </a:r>
+            <a:r>
+              <a:rPr lang="en-US" b="0" dirty="0">
+                <a:effectLst/>
+                <a:latin typeface="Consolas" panose="020B0609020204030204" pitchFamily="49" charset="0"/>
+              </a:rPr>
+              <a:t>, 4                         ; system call for "write"   </a:t>
             </a:r>
           </a:p>
           <a:p>
@@ -6339,33 +6928,39 @@
                 <a:effectLst/>
                 <a:latin typeface="Consolas" panose="020B0609020204030204" pitchFamily="49" charset="0"/>
               </a:rPr>
-              <a:t>{</a:t>
+              <a:t>    int 0x80                           ; call the kernel</a:t>
             </a:r>
           </a:p>
           <a:p>
             <a:pPr marL="0" indent="0">
               <a:buNone/>
             </a:pPr>
-            <a:r>
+            <a:br>
               <a:rPr lang="en-US" b="0" dirty="0">
                 <a:effectLst/>
                 <a:latin typeface="Consolas" panose="020B0609020204030204" pitchFamily="49" charset="0"/>
               </a:rPr>
-              <a:t>    </a:t>
+            </a:br>
+            <a:r>
+              <a:rPr lang="en-US" b="0" dirty="0">
+                <a:effectLst/>
+                <a:latin typeface="Consolas" panose="020B0609020204030204" pitchFamily="49" charset="0"/>
+              </a:rPr>
+              <a:t>    mov </a:t>
             </a:r>
             <a:r>
               <a:rPr lang="en-US" b="0" dirty="0" err="1">
                 <a:effectLst/>
                 <a:latin typeface="Consolas" panose="020B0609020204030204" pitchFamily="49" charset="0"/>
               </a:rPr>
-              <a:t>printf</a:t>
+              <a:t>eax</a:t>
             </a:r>
             <a:r>
               <a:rPr lang="en-US" b="0" dirty="0">
                 <a:effectLst/>
                 <a:latin typeface="Consolas" panose="020B0609020204030204" pitchFamily="49" charset="0"/>
               </a:rPr>
-              <a:t>("Hello, World!\n");</a:t>
+              <a:t>, 1                         ; system call for "exit"</a:t>
             </a:r>
           </a:p>
           <a:p>
@@ -6377,20 +6972,114 @@
                 <a:effectLst/>
                 <a:latin typeface="Consolas" panose="020B0609020204030204" pitchFamily="49" charset="0"/>
               </a:rPr>
-              <a:t>    return 0;</a:t>
+              <a:t>    int 0x80                           ; call the kernel</a:t>
             </a:r>
           </a:p>
           <a:p>
             <a:pPr marL="0" indent="0">
               <a:buNone/>
             </a:pPr>
-            <a:r>
+            <a:br>
               <a:rPr lang="en-US" b="0" dirty="0">
                 <a:effectLst/>
                 <a:latin typeface="Consolas" panose="020B0609020204030204" pitchFamily="49" charset="0"/>
               </a:rPr>
-              <a:t>}</a:t>
-            </a:r>
+            </a:br>
+            <a:r>
+              <a:rPr lang="en-US" b="0" dirty="0">
+                <a:effectLst/>
+                <a:latin typeface="Consolas" panose="020B0609020204030204" pitchFamily="49" charset="0"/>
+              </a:rPr>
+              <a:t>section        .data                   ; here you declare the data</a:t>
+            </a:r>
+          </a:p>
+          <a:p>
+            <a:pPr marL="0" indent="0">
+              <a:buNone/>
+            </a:pPr>
+            <a:r>
+              <a:rPr lang="en-US" b="0" dirty="0">
+                <a:effectLst/>
+                <a:latin typeface="Consolas" panose="020B0609020204030204" pitchFamily="49" charset="0"/>
+              </a:rPr>
+              <a:t>    msg        </a:t>
+            </a:r>
+            <a:r>
+              <a:rPr lang="en-US" b="0" dirty="0" err="1">
+                <a:effectLst/>
+                <a:latin typeface="Consolas" panose="020B0609020204030204" pitchFamily="49" charset="0"/>
+              </a:rPr>
+              <a:t>db</a:t>
+            </a:r>
+            <a:r>
+              <a:rPr lang="en-US" b="0" dirty="0">
+                <a:effectLst/>
+                <a:latin typeface="Consolas" panose="020B0609020204030204" pitchFamily="49" charset="0"/>
+              </a:rPr>
+              <a:t> </a:t>
+            </a:r>
+            <a:r>
+              <a:rPr lang="en-US" b="0" dirty="0">
+                <a:effectLst/>
+                <a:highlight>
+                  <a:srgbClr val="FFFF00"/>
+                </a:highlight>
+                <a:latin typeface="Consolas" panose="020B0609020204030204" pitchFamily="49" charset="0"/>
+              </a:rPr>
+              <a:t>"Hello world!"</a:t>
+            </a:r>
+            <a:r>
+              <a:rPr lang="en-US" b="0" dirty="0">
+                <a:effectLst/>
+                <a:latin typeface="Consolas" panose="020B0609020204030204" pitchFamily="49" charset="0"/>
+              </a:rPr>
+              <a:t>       ; the actual message to use</a:t>
+            </a:r>
+          </a:p>
+          <a:p>
+            <a:pPr marL="0" indent="0">
+              <a:buNone/>
+            </a:pPr>
+            <a:r>
+              <a:rPr lang="en-US" b="0" dirty="0">
+                <a:effectLst/>
+                <a:latin typeface="Consolas" panose="020B0609020204030204" pitchFamily="49" charset="0"/>
+              </a:rPr>
+              <a:t>    </a:t>
+            </a:r>
+            <a:r>
+              <a:rPr lang="en-US" b="0" dirty="0" err="1">
+                <a:effectLst/>
+                <a:latin typeface="Consolas" panose="020B0609020204030204" pitchFamily="49" charset="0"/>
+              </a:rPr>
+              <a:t>len</a:t>
+            </a:r>
+            <a:r>
+              <a:rPr lang="en-US" b="0" dirty="0">
+                <a:effectLst/>
+                <a:latin typeface="Consolas" panose="020B0609020204030204" pitchFamily="49" charset="0"/>
+              </a:rPr>
+              <a:t>        </a:t>
+            </a:r>
+            <a:r>
+              <a:rPr lang="en-US" b="0" dirty="0" err="1">
+                <a:effectLst/>
+                <a:latin typeface="Consolas" panose="020B0609020204030204" pitchFamily="49" charset="0"/>
+              </a:rPr>
+              <a:t>equ</a:t>
+            </a:r>
+            <a:r>
+              <a:rPr lang="en-US" b="0" dirty="0">
+                <a:effectLst/>
+                <a:latin typeface="Consolas" panose="020B0609020204030204" pitchFamily="49" charset="0"/>
+              </a:rPr>
+              <a:t> $ -msg              ; get the size of the message</a:t>
+            </a:r>
+          </a:p>
+          <a:p>
+            <a:pPr marL="0" indent="0">
+              <a:buNone/>
+            </a:pPr>
             <a:endParaRPr lang="en-CA" dirty="0"/>
           </a:p>
         </p:txBody>
@@ -6409,8 +7098,8 @@
         </p:nvSpPr>
         <p:spPr>
           <a:xfrm>
-            <a:off x="8025064" y="2154634"/>
-            <a:ext cx="3850320" cy="4247317"/>
+            <a:off x="8205469" y="3723392"/>
+            <a:ext cx="3850320" cy="2862322"/>
           </a:xfrm>
           <a:prstGeom prst="rect">
             <a:avLst/>
@@ -6427,35 +7116,67 @@
           <a:p>
             <a:r>
               <a:rPr lang="en-CA" b="1" dirty="0"/>
-              <a:t>C</a:t>
-            </a:r>
-            <a:r>
-              <a:rPr lang="en-CA" dirty="0"/>
-              <a:t> is an extremely influential language originally designed to write the Unix operating system. While not as low level and fast as assembly, it is still very low level and fast compared to most other programming languages.</a:t>
-            </a:r>
-          </a:p>
-          <a:p>
-            <a:endParaRPr lang="en-CA" dirty="0"/>
+              <a:t>Assembly language </a:t>
+            </a:r>
+            <a:r>
+              <a:rPr lang="en-CA" dirty="0"/>
+              <a:t>is  the lowest</a:t>
+            </a:r>
+            <a:br>
+              <a:rPr lang="en-CA" dirty="0"/>
+            </a:br>
+            <a:r>
+              <a:rPr lang="en-CA" dirty="0"/>
+              <a:t>level of programming language most</a:t>
+            </a:r>
+            <a:br>
+              <a:rPr lang="en-CA" dirty="0"/>
+            </a:br>
+            <a:r>
+              <a:rPr lang="en-CA" dirty="0"/>
+              <a:t>programmers will ever deal with. It is the native language of the computer.</a:t>
+            </a:r>
           </a:p>
           <a:p>
             <a:r>
               <a:rPr lang="en-CA" b="1" dirty="0"/>
               <a:t>Pros</a:t>
             </a:r>
-            <a:r>
-              <a:rPr lang="en-CA" dirty="0"/>
-              <a:t>: fast, flexible, easier than assembly, portable across computers</a:t>
-            </a:r>
-            <a:br>
-              <a:rPr lang="en-CA" dirty="0"/>
-            </a:br>
+          </a:p>
+          <a:p>
+            <a:pPr marL="285750" indent="-285750">
+              <a:buFont typeface="Arial" panose="020B0604020202020204" pitchFamily="34" charset="0"/>
+              <a:buChar char="•"/>
+            </a:pPr>
+            <a:r>
+              <a:rPr lang="en-CA" dirty="0"/>
+              <a:t>fast, flexible</a:t>
+            </a:r>
+          </a:p>
+          <a:p>
             <a:r>
               <a:rPr lang="en-CA" b="1" dirty="0"/>
               <a:t>Cons</a:t>
             </a:r>
-            <a:r>
-              <a:rPr lang="en-CA" dirty="0"/>
-              <a:t>: still quite low-level and not very “programmer friendly”; designed for programs like operating systems; memory management is manual (no garbage collection)</a:t>
+          </a:p>
+          <a:p>
+            <a:pPr marL="285750" indent="-285750">
+              <a:buFont typeface="Arial" panose="020B0604020202020204" pitchFamily="34" charset="0"/>
+              <a:buChar char="•"/>
+            </a:pPr>
+            <a:r>
+              <a:rPr lang="en-CA" dirty="0"/>
+              <a:t>simple tasks need long programs</a:t>
+            </a:r>
+          </a:p>
+          <a:p>
+            <a:pPr marL="285750" indent="-285750">
+              <a:buFont typeface="Arial" panose="020B0604020202020204" pitchFamily="34" charset="0"/>
+              <a:buChar char="•"/>
+            </a:pPr>
+            <a:r>
+              <a:rPr lang="en-CA" dirty="0"/>
+              <a:t>difficult and time-consuming to write and debug</a:t>
             </a:r>
           </a:p>
         </p:txBody>
@@ -6463,7 +7184,7 @@
     </p:spTree>
     <p:extLst>
       <p:ext uri="{BB962C8B-B14F-4D97-AF65-F5344CB8AC3E}">
-        <p14:creationId xmlns:p14="http://schemas.microsoft.com/office/powerpoint/2010/main" val="1617268802"/>
+        <p14:creationId xmlns:p14="http://schemas.microsoft.com/office/powerpoint/2010/main" val="4281630409"/>
       </p:ext>
     </p:extLst>
   </p:cSld>

</xml_diff>

<commit_message>
added lecture 3 slides
</commit_message>
<xml_diff>
--- a/lecture_notes/chapter1/chapter1.pptx
+++ b/lecture_notes/chapter1/chapter1.pptx
@@ -127,301 +127,27 @@
 </p:presentation>
 </file>
 
-<file path=ppt/revisionInfo.xml><?xml version="1.0" encoding="utf-8"?>
-<p1510:revInfo xmlns:a="http://schemas.openxmlformats.org/drawingml/2006/main" xmlns:r="http://schemas.openxmlformats.org/officeDocument/2006/relationships" xmlns:p1510="http://schemas.microsoft.com/office/powerpoint/2015/10/main">
-  <p1510:revLst>
-    <p1510:client id="{F17399DF-123B-EE49-A317-20B5B398BF10}" v="4" dt="2025-12-08T22:34:00.591"/>
-  </p1510:revLst>
-</p1510:revInfo>
-</file>
-
 <file path=ppt/changesInfos/changesInfo1.xml><?xml version="1.0" encoding="utf-8"?>
 <pc:chgInfo xmlns:a="http://schemas.openxmlformats.org/drawingml/2006/main" xmlns:r="http://schemas.openxmlformats.org/officeDocument/2006/relationships" xmlns:ac="http://schemas.microsoft.com/office/drawing/2013/main/command" xmlns:pc="http://schemas.microsoft.com/office/powerpoint/2013/main/command">
   <pc:docChgLst>
     <pc:chgData name="Toby Donaldson" userId="2e6e5431-bb17-4c41-9985-d39c50d83c73" providerId="ADAL" clId="{7F9681A8-EEE2-56F4-9B39-ECCBEE0471AC}"/>
     <pc:docChg chg="undo custSel addSld modSld">
-      <pc:chgData name="Toby Donaldson" userId="2e6e5431-bb17-4c41-9985-d39c50d83c73" providerId="ADAL" clId="{7F9681A8-EEE2-56F4-9B39-ECCBEE0471AC}" dt="2025-12-08T22:52:38.629" v="1296" actId="20577"/>
+      <pc:chgData name="Toby Donaldson" userId="2e6e5431-bb17-4c41-9985-d39c50d83c73" providerId="ADAL" clId="{7F9681A8-EEE2-56F4-9B39-ECCBEE0471AC}" dt="2026-01-09T04:44:02.738" v="1313" actId="20577"/>
       <pc:docMkLst>
         <pc:docMk/>
       </pc:docMkLst>
-      <pc:sldChg chg="addSp delSp modSp mod">
-        <pc:chgData name="Toby Donaldson" userId="2e6e5431-bb17-4c41-9985-d39c50d83c73" providerId="ADAL" clId="{7F9681A8-EEE2-56F4-9B39-ECCBEE0471AC}" dt="2025-12-08T22:51:43.359" v="1292" actId="20577"/>
-        <pc:sldMkLst>
-          <pc:docMk/>
-          <pc:sldMk cId="1433169316" sldId="257"/>
-        </pc:sldMkLst>
-        <pc:spChg chg="mod">
-          <ac:chgData name="Toby Donaldson" userId="2e6e5431-bb17-4c41-9985-d39c50d83c73" providerId="ADAL" clId="{7F9681A8-EEE2-56F4-9B39-ECCBEE0471AC}" dt="2025-12-08T22:51:43.359" v="1292" actId="20577"/>
-          <ac:spMkLst>
-            <pc:docMk/>
-            <pc:sldMk cId="1433169316" sldId="257"/>
-            <ac:spMk id="3" creationId="{1CE88E03-CAFE-9264-933A-0CD67C9C6CA6}"/>
-          </ac:spMkLst>
-        </pc:spChg>
-        <pc:spChg chg="add del mod">
-          <ac:chgData name="Toby Donaldson" userId="2e6e5431-bb17-4c41-9985-d39c50d83c73" providerId="ADAL" clId="{7F9681A8-EEE2-56F4-9B39-ECCBEE0471AC}" dt="2025-12-08T21:43:36.343" v="451" actId="21"/>
-          <ac:spMkLst>
-            <pc:docMk/>
-            <pc:sldMk cId="1433169316" sldId="257"/>
-            <ac:spMk id="4" creationId="{5D4ED5FF-4397-160B-7125-0AF5BCF09453}"/>
-          </ac:spMkLst>
-        </pc:spChg>
-      </pc:sldChg>
       <pc:sldChg chg="modSp mod">
-        <pc:chgData name="Toby Donaldson" userId="2e6e5431-bb17-4c41-9985-d39c50d83c73" providerId="ADAL" clId="{7F9681A8-EEE2-56F4-9B39-ECCBEE0471AC}" dt="2025-12-08T21:43:43.228" v="452" actId="113"/>
+        <pc:chgData name="Toby Donaldson" userId="2e6e5431-bb17-4c41-9985-d39c50d83c73" providerId="ADAL" clId="{7F9681A8-EEE2-56F4-9B39-ECCBEE0471AC}" dt="2026-01-09T04:44:02.738" v="1313" actId="20577"/>
         <pc:sldMkLst>
           <pc:docMk/>
           <pc:sldMk cId="2692445676" sldId="258"/>
         </pc:sldMkLst>
         <pc:spChg chg="mod">
-          <ac:chgData name="Toby Donaldson" userId="2e6e5431-bb17-4c41-9985-d39c50d83c73" providerId="ADAL" clId="{7F9681A8-EEE2-56F4-9B39-ECCBEE0471AC}" dt="2025-12-08T21:43:43.228" v="452" actId="113"/>
+          <ac:chgData name="Toby Donaldson" userId="2e6e5431-bb17-4c41-9985-d39c50d83c73" providerId="ADAL" clId="{7F9681A8-EEE2-56F4-9B39-ECCBEE0471AC}" dt="2026-01-09T04:44:02.738" v="1313" actId="20577"/>
           <ac:spMkLst>
             <pc:docMk/>
             <pc:sldMk cId="2692445676" sldId="258"/>
             <ac:spMk id="3" creationId="{98A8E8F5-CA50-08D5-90EF-A6B808F7483C}"/>
-          </ac:spMkLst>
-        </pc:spChg>
-      </pc:sldChg>
-      <pc:sldChg chg="modSp mod">
-        <pc:chgData name="Toby Donaldson" userId="2e6e5431-bb17-4c41-9985-d39c50d83c73" providerId="ADAL" clId="{7F9681A8-EEE2-56F4-9B39-ECCBEE0471AC}" dt="2025-12-08T21:44:41.383" v="475" actId="6549"/>
-        <pc:sldMkLst>
-          <pc:docMk/>
-          <pc:sldMk cId="2756254005" sldId="259"/>
-        </pc:sldMkLst>
-        <pc:spChg chg="mod">
-          <ac:chgData name="Toby Donaldson" userId="2e6e5431-bb17-4c41-9985-d39c50d83c73" providerId="ADAL" clId="{7F9681A8-EEE2-56F4-9B39-ECCBEE0471AC}" dt="2025-12-08T21:44:41.383" v="475" actId="6549"/>
-          <ac:spMkLst>
-            <pc:docMk/>
-            <pc:sldMk cId="2756254005" sldId="259"/>
-            <ac:spMk id="3" creationId="{98A8E8F5-CA50-08D5-90EF-A6B808F7483C}"/>
-          </ac:spMkLst>
-        </pc:spChg>
-        <pc:spChg chg="mod">
-          <ac:chgData name="Toby Donaldson" userId="2e6e5431-bb17-4c41-9985-d39c50d83c73" providerId="ADAL" clId="{7F9681A8-EEE2-56F4-9B39-ECCBEE0471AC}" dt="2025-12-08T21:39:14.263" v="8" actId="207"/>
-          <ac:spMkLst>
-            <pc:docMk/>
-            <pc:sldMk cId="2756254005" sldId="259"/>
-            <ac:spMk id="4" creationId="{C4A18D26-0A05-1E77-DB1B-5DD5F78809C6}"/>
-          </ac:spMkLst>
-        </pc:spChg>
-      </pc:sldChg>
-      <pc:sldChg chg="modSp mod">
-        <pc:chgData name="Toby Donaldson" userId="2e6e5431-bb17-4c41-9985-d39c50d83c73" providerId="ADAL" clId="{7F9681A8-EEE2-56F4-9B39-ECCBEE0471AC}" dt="2025-12-08T22:52:23.041" v="1295" actId="113"/>
-        <pc:sldMkLst>
-          <pc:docMk/>
-          <pc:sldMk cId="938849494" sldId="260"/>
-        </pc:sldMkLst>
-        <pc:spChg chg="mod">
-          <ac:chgData name="Toby Donaldson" userId="2e6e5431-bb17-4c41-9985-d39c50d83c73" providerId="ADAL" clId="{7F9681A8-EEE2-56F4-9B39-ECCBEE0471AC}" dt="2025-12-08T22:52:23.041" v="1295" actId="113"/>
-          <ac:spMkLst>
-            <pc:docMk/>
-            <pc:sldMk cId="938849494" sldId="260"/>
-            <ac:spMk id="3" creationId="{CDDE56BB-85C7-D749-78C1-283D1AB897C0}"/>
-          </ac:spMkLst>
-        </pc:spChg>
-      </pc:sldChg>
-      <pc:sldChg chg="modSp mod">
-        <pc:chgData name="Toby Donaldson" userId="2e6e5431-bb17-4c41-9985-d39c50d83c73" providerId="ADAL" clId="{7F9681A8-EEE2-56F4-9B39-ECCBEE0471AC}" dt="2025-12-08T22:52:38.629" v="1296" actId="20577"/>
-        <pc:sldMkLst>
-          <pc:docMk/>
-          <pc:sldMk cId="3817561596" sldId="261"/>
-        </pc:sldMkLst>
-        <pc:spChg chg="mod">
-          <ac:chgData name="Toby Donaldson" userId="2e6e5431-bb17-4c41-9985-d39c50d83c73" providerId="ADAL" clId="{7F9681A8-EEE2-56F4-9B39-ECCBEE0471AC}" dt="2025-12-08T22:52:38.629" v="1296" actId="20577"/>
-          <ac:spMkLst>
-            <pc:docMk/>
-            <pc:sldMk cId="3817561596" sldId="261"/>
-            <ac:spMk id="3" creationId="{5B7000D7-3453-5BD4-0A71-EBA2BD423FC9}"/>
-          </ac:spMkLst>
-        </pc:spChg>
-      </pc:sldChg>
-      <pc:sldChg chg="modSp mod">
-        <pc:chgData name="Toby Donaldson" userId="2e6e5431-bb17-4c41-9985-d39c50d83c73" providerId="ADAL" clId="{7F9681A8-EEE2-56F4-9B39-ECCBEE0471AC}" dt="2025-12-08T21:52:09.511" v="766" actId="1076"/>
-        <pc:sldMkLst>
-          <pc:docMk/>
-          <pc:sldMk cId="4281630409" sldId="262"/>
-        </pc:sldMkLst>
-        <pc:spChg chg="mod">
-          <ac:chgData name="Toby Donaldson" userId="2e6e5431-bb17-4c41-9985-d39c50d83c73" providerId="ADAL" clId="{7F9681A8-EEE2-56F4-9B39-ECCBEE0471AC}" dt="2025-12-08T21:52:09.511" v="766" actId="1076"/>
-          <ac:spMkLst>
-            <pc:docMk/>
-            <pc:sldMk cId="4281630409" sldId="262"/>
-            <ac:spMk id="4" creationId="{B0FB5CCC-97E9-CCC8-53AA-6EBA19E865D1}"/>
-          </ac:spMkLst>
-        </pc:spChg>
-      </pc:sldChg>
-      <pc:sldChg chg="modSp mod">
-        <pc:chgData name="Toby Donaldson" userId="2e6e5431-bb17-4c41-9985-d39c50d83c73" providerId="ADAL" clId="{7F9681A8-EEE2-56F4-9B39-ECCBEE0471AC}" dt="2025-12-08T21:52:15.583" v="768" actId="20577"/>
-        <pc:sldMkLst>
-          <pc:docMk/>
-          <pc:sldMk cId="1617268802" sldId="263"/>
-        </pc:sldMkLst>
-        <pc:spChg chg="mod">
-          <ac:chgData name="Toby Donaldson" userId="2e6e5431-bb17-4c41-9985-d39c50d83c73" providerId="ADAL" clId="{7F9681A8-EEE2-56F4-9B39-ECCBEE0471AC}" dt="2025-12-08T21:48:23.832" v="618" actId="14100"/>
-          <ac:spMkLst>
-            <pc:docMk/>
-            <pc:sldMk cId="1617268802" sldId="263"/>
-            <ac:spMk id="3" creationId="{50798CC9-C622-B878-F83F-05F196ABC0AF}"/>
-          </ac:spMkLst>
-        </pc:spChg>
-        <pc:spChg chg="mod">
-          <ac:chgData name="Toby Donaldson" userId="2e6e5431-bb17-4c41-9985-d39c50d83c73" providerId="ADAL" clId="{7F9681A8-EEE2-56F4-9B39-ECCBEE0471AC}" dt="2025-12-08T21:52:15.583" v="768" actId="20577"/>
-          <ac:spMkLst>
-            <pc:docMk/>
-            <pc:sldMk cId="1617268802" sldId="263"/>
-            <ac:spMk id="4" creationId="{B0FB5CCC-97E9-CCC8-53AA-6EBA19E865D1}"/>
-          </ac:spMkLst>
-        </pc:spChg>
-      </pc:sldChg>
-      <pc:sldChg chg="modSp mod">
-        <pc:chgData name="Toby Donaldson" userId="2e6e5431-bb17-4c41-9985-d39c50d83c73" providerId="ADAL" clId="{7F9681A8-EEE2-56F4-9B39-ECCBEE0471AC}" dt="2025-12-08T21:53:20.462" v="882" actId="1076"/>
-        <pc:sldMkLst>
-          <pc:docMk/>
-          <pc:sldMk cId="3937816594" sldId="264"/>
-        </pc:sldMkLst>
-        <pc:spChg chg="mod">
-          <ac:chgData name="Toby Donaldson" userId="2e6e5431-bb17-4c41-9985-d39c50d83c73" providerId="ADAL" clId="{7F9681A8-EEE2-56F4-9B39-ECCBEE0471AC}" dt="2025-12-08T21:53:20.462" v="882" actId="1076"/>
-          <ac:spMkLst>
-            <pc:docMk/>
-            <pc:sldMk cId="3937816594" sldId="264"/>
-            <ac:spMk id="4" creationId="{B0FB5CCC-97E9-CCC8-53AA-6EBA19E865D1}"/>
-          </ac:spMkLst>
-        </pc:spChg>
-      </pc:sldChg>
-      <pc:sldChg chg="modSp mod">
-        <pc:chgData name="Toby Donaldson" userId="2e6e5431-bb17-4c41-9985-d39c50d83c73" providerId="ADAL" clId="{7F9681A8-EEE2-56F4-9B39-ECCBEE0471AC}" dt="2025-12-08T21:55:11.880" v="998" actId="1076"/>
-        <pc:sldMkLst>
-          <pc:docMk/>
-          <pc:sldMk cId="3853224143" sldId="265"/>
-        </pc:sldMkLst>
-        <pc:spChg chg="mod">
-          <ac:chgData name="Toby Donaldson" userId="2e6e5431-bb17-4c41-9985-d39c50d83c73" providerId="ADAL" clId="{7F9681A8-EEE2-56F4-9B39-ECCBEE0471AC}" dt="2025-12-08T21:55:11.880" v="998" actId="1076"/>
-          <ac:spMkLst>
-            <pc:docMk/>
-            <pc:sldMk cId="3853224143" sldId="265"/>
-            <ac:spMk id="4" creationId="{B0FB5CCC-97E9-CCC8-53AA-6EBA19E865D1}"/>
-          </ac:spMkLst>
-        </pc:spChg>
-      </pc:sldChg>
-      <pc:sldChg chg="modSp mod">
-        <pc:chgData name="Toby Donaldson" userId="2e6e5431-bb17-4c41-9985-d39c50d83c73" providerId="ADAL" clId="{7F9681A8-EEE2-56F4-9B39-ECCBEE0471AC}" dt="2025-12-08T22:29:32.287" v="1122" actId="20577"/>
-        <pc:sldMkLst>
-          <pc:docMk/>
-          <pc:sldMk cId="2910585830" sldId="266"/>
-        </pc:sldMkLst>
-        <pc:spChg chg="mod">
-          <ac:chgData name="Toby Donaldson" userId="2e6e5431-bb17-4c41-9985-d39c50d83c73" providerId="ADAL" clId="{7F9681A8-EEE2-56F4-9B39-ECCBEE0471AC}" dt="2025-12-08T22:28:12.933" v="1045" actId="1076"/>
-          <ac:spMkLst>
-            <pc:docMk/>
-            <pc:sldMk cId="2910585830" sldId="266"/>
-            <ac:spMk id="3" creationId="{50798CC9-C622-B878-F83F-05F196ABC0AF}"/>
-          </ac:spMkLst>
-        </pc:spChg>
-        <pc:spChg chg="mod">
-          <ac:chgData name="Toby Donaldson" userId="2e6e5431-bb17-4c41-9985-d39c50d83c73" providerId="ADAL" clId="{7F9681A8-EEE2-56F4-9B39-ECCBEE0471AC}" dt="2025-12-08T22:29:32.287" v="1122" actId="20577"/>
-          <ac:spMkLst>
-            <pc:docMk/>
-            <pc:sldMk cId="2910585830" sldId="266"/>
-            <ac:spMk id="4" creationId="{B0FB5CCC-97E9-CCC8-53AA-6EBA19E865D1}"/>
-          </ac:spMkLst>
-        </pc:spChg>
-      </pc:sldChg>
-      <pc:sldChg chg="modSp mod">
-        <pc:chgData name="Toby Donaldson" userId="2e6e5431-bb17-4c41-9985-d39c50d83c73" providerId="ADAL" clId="{7F9681A8-EEE2-56F4-9B39-ECCBEE0471AC}" dt="2025-12-08T22:31:03.537" v="1152" actId="20577"/>
-        <pc:sldMkLst>
-          <pc:docMk/>
-          <pc:sldMk cId="598370551" sldId="267"/>
-        </pc:sldMkLst>
-        <pc:spChg chg="mod">
-          <ac:chgData name="Toby Donaldson" userId="2e6e5431-bb17-4c41-9985-d39c50d83c73" providerId="ADAL" clId="{7F9681A8-EEE2-56F4-9B39-ECCBEE0471AC}" dt="2025-12-08T22:31:03.537" v="1152" actId="20577"/>
-          <ac:spMkLst>
-            <pc:docMk/>
-            <pc:sldMk cId="598370551" sldId="267"/>
-            <ac:spMk id="4" creationId="{B0FB5CCC-97E9-CCC8-53AA-6EBA19E865D1}"/>
-          </ac:spMkLst>
-        </pc:spChg>
-      </pc:sldChg>
-      <pc:sldChg chg="modSp mod">
-        <pc:chgData name="Toby Donaldson" userId="2e6e5431-bb17-4c41-9985-d39c50d83c73" providerId="ADAL" clId="{7F9681A8-EEE2-56F4-9B39-ECCBEE0471AC}" dt="2025-12-08T22:32:32.994" v="1262" actId="20577"/>
-        <pc:sldMkLst>
-          <pc:docMk/>
-          <pc:sldMk cId="299047572" sldId="268"/>
-        </pc:sldMkLst>
-        <pc:spChg chg="mod">
-          <ac:chgData name="Toby Donaldson" userId="2e6e5431-bb17-4c41-9985-d39c50d83c73" providerId="ADAL" clId="{7F9681A8-EEE2-56F4-9B39-ECCBEE0471AC}" dt="2025-12-08T22:32:32.994" v="1262" actId="20577"/>
-          <ac:spMkLst>
-            <pc:docMk/>
-            <pc:sldMk cId="299047572" sldId="268"/>
-            <ac:spMk id="4" creationId="{B0FB5CCC-97E9-CCC8-53AA-6EBA19E865D1}"/>
-          </ac:spMkLst>
-        </pc:spChg>
-      </pc:sldChg>
-      <pc:sldChg chg="modSp mod">
-        <pc:chgData name="Toby Donaldson" userId="2e6e5431-bb17-4c41-9985-d39c50d83c73" providerId="ADAL" clId="{7F9681A8-EEE2-56F4-9B39-ECCBEE0471AC}" dt="2025-12-08T21:45:20.053" v="479" actId="207"/>
-        <pc:sldMkLst>
-          <pc:docMk/>
-          <pc:sldMk cId="3348444406" sldId="269"/>
-        </pc:sldMkLst>
-        <pc:spChg chg="mod">
-          <ac:chgData name="Toby Donaldson" userId="2e6e5431-bb17-4c41-9985-d39c50d83c73" providerId="ADAL" clId="{7F9681A8-EEE2-56F4-9B39-ECCBEE0471AC}" dt="2025-12-08T21:45:20.053" v="479" actId="207"/>
-          <ac:spMkLst>
-            <pc:docMk/>
-            <pc:sldMk cId="3348444406" sldId="269"/>
-            <ac:spMk id="3" creationId="{98A8E8F5-CA50-08D5-90EF-A6B808F7483C}"/>
-          </ac:spMkLst>
-        </pc:spChg>
-      </pc:sldChg>
-      <pc:sldChg chg="addSp delSp modSp mod">
-        <pc:chgData name="Toby Donaldson" userId="2e6e5431-bb17-4c41-9985-d39c50d83c73" providerId="ADAL" clId="{7F9681A8-EEE2-56F4-9B39-ECCBEE0471AC}" dt="2025-12-08T22:34:20.082" v="1272" actId="1076"/>
-        <pc:sldMkLst>
-          <pc:docMk/>
-          <pc:sldMk cId="2283882614" sldId="270"/>
-        </pc:sldMkLst>
-        <pc:spChg chg="add mod">
-          <ac:chgData name="Toby Donaldson" userId="2e6e5431-bb17-4c41-9985-d39c50d83c73" providerId="ADAL" clId="{7F9681A8-EEE2-56F4-9B39-ECCBEE0471AC}" dt="2025-12-08T22:33:53.845" v="1263"/>
-          <ac:spMkLst>
-            <pc:docMk/>
-            <pc:sldMk cId="2283882614" sldId="270"/>
-            <ac:spMk id="3" creationId="{CBA3B810-C195-19CC-006F-D59CC4BD60BA}"/>
-          </ac:spMkLst>
-        </pc:spChg>
-        <pc:spChg chg="add del mod">
-          <ac:chgData name="Toby Donaldson" userId="2e6e5431-bb17-4c41-9985-d39c50d83c73" providerId="ADAL" clId="{7F9681A8-EEE2-56F4-9B39-ECCBEE0471AC}" dt="2025-12-08T22:34:05.855" v="1266" actId="21"/>
-          <ac:spMkLst>
-            <pc:docMk/>
-            <pc:sldMk cId="2283882614" sldId="270"/>
-            <ac:spMk id="8" creationId="{F66D2C98-C49B-DAF9-7B26-DCFB2503BFF5}"/>
-          </ac:spMkLst>
-        </pc:spChg>
-        <pc:picChg chg="add mod">
-          <ac:chgData name="Toby Donaldson" userId="2e6e5431-bb17-4c41-9985-d39c50d83c73" providerId="ADAL" clId="{7F9681A8-EEE2-56F4-9B39-ECCBEE0471AC}" dt="2025-12-08T22:34:20.082" v="1272" actId="1076"/>
-          <ac:picMkLst>
-            <pc:docMk/>
-            <pc:sldMk cId="2283882614" sldId="270"/>
-            <ac:picMk id="5" creationId="{9C840B38-44F3-A48D-AB9E-4DA413524991}"/>
-          </ac:picMkLst>
-        </pc:picChg>
-        <pc:picChg chg="del">
-          <ac:chgData name="Toby Donaldson" userId="2e6e5431-bb17-4c41-9985-d39c50d83c73" providerId="ADAL" clId="{7F9681A8-EEE2-56F4-9B39-ECCBEE0471AC}" dt="2025-12-08T22:34:02.788" v="1265" actId="21"/>
-          <ac:picMkLst>
-            <pc:docMk/>
-            <pc:sldMk cId="2283882614" sldId="270"/>
-            <ac:picMk id="6" creationId="{4FFD85E7-E2D5-0AAF-AF46-2616E3EA921A}"/>
-          </ac:picMkLst>
-        </pc:picChg>
-      </pc:sldChg>
-      <pc:sldChg chg="modSp add mod">
-        <pc:chgData name="Toby Donaldson" userId="2e6e5431-bb17-4c41-9985-d39c50d83c73" providerId="ADAL" clId="{7F9681A8-EEE2-56F4-9B39-ECCBEE0471AC}" dt="2025-12-08T22:50:20.237" v="1276" actId="20577"/>
-        <pc:sldMkLst>
-          <pc:docMk/>
-          <pc:sldMk cId="63370177" sldId="271"/>
-        </pc:sldMkLst>
-        <pc:spChg chg="mod">
-          <ac:chgData name="Toby Donaldson" userId="2e6e5431-bb17-4c41-9985-d39c50d83c73" providerId="ADAL" clId="{7F9681A8-EEE2-56F4-9B39-ECCBEE0471AC}" dt="2025-12-08T22:50:20.237" v="1276" actId="20577"/>
-          <ac:spMkLst>
-            <pc:docMk/>
-            <pc:sldMk cId="63370177" sldId="271"/>
-            <ac:spMk id="4" creationId="{ED0B9EDC-F6B3-EAF2-75AF-CEACDB15C3C2}"/>
           </ac:spMkLst>
         </pc:spChg>
       </pc:sldChg>
@@ -579,7 +305,7 @@
           <a:p>
             <a:fld id="{E2CDF564-AA16-4F8A-8361-C9076F43B828}" type="datetimeFigureOut">
               <a:rPr lang="en-CA" smtClean="0"/>
-              <a:t>2025-12-08</a:t>
+              <a:t>2026-01-08</a:t>
             </a:fld>
             <a:endParaRPr lang="en-CA"/>
           </a:p>
@@ -779,7 +505,7 @@
           <a:p>
             <a:fld id="{E2CDF564-AA16-4F8A-8361-C9076F43B828}" type="datetimeFigureOut">
               <a:rPr lang="en-CA" smtClean="0"/>
-              <a:t>2025-12-08</a:t>
+              <a:t>2026-01-08</a:t>
             </a:fld>
             <a:endParaRPr lang="en-CA"/>
           </a:p>
@@ -989,7 +715,7 @@
           <a:p>
             <a:fld id="{E2CDF564-AA16-4F8A-8361-C9076F43B828}" type="datetimeFigureOut">
               <a:rPr lang="en-CA" smtClean="0"/>
-              <a:t>2025-12-08</a:t>
+              <a:t>2026-01-08</a:t>
             </a:fld>
             <a:endParaRPr lang="en-CA"/>
           </a:p>
@@ -1189,7 +915,7 @@
           <a:p>
             <a:fld id="{E2CDF564-AA16-4F8A-8361-C9076F43B828}" type="datetimeFigureOut">
               <a:rPr lang="en-CA" smtClean="0"/>
-              <a:t>2025-12-08</a:t>
+              <a:t>2026-01-08</a:t>
             </a:fld>
             <a:endParaRPr lang="en-CA"/>
           </a:p>
@@ -1465,7 +1191,7 @@
           <a:p>
             <a:fld id="{E2CDF564-AA16-4F8A-8361-C9076F43B828}" type="datetimeFigureOut">
               <a:rPr lang="en-CA" smtClean="0"/>
-              <a:t>2025-12-08</a:t>
+              <a:t>2026-01-08</a:t>
             </a:fld>
             <a:endParaRPr lang="en-CA"/>
           </a:p>
@@ -1733,7 +1459,7 @@
           <a:p>
             <a:fld id="{E2CDF564-AA16-4F8A-8361-C9076F43B828}" type="datetimeFigureOut">
               <a:rPr lang="en-CA" smtClean="0"/>
-              <a:t>2025-12-08</a:t>
+              <a:t>2026-01-08</a:t>
             </a:fld>
             <a:endParaRPr lang="en-CA"/>
           </a:p>
@@ -2148,7 +1874,7 @@
           <a:p>
             <a:fld id="{E2CDF564-AA16-4F8A-8361-C9076F43B828}" type="datetimeFigureOut">
               <a:rPr lang="en-CA" smtClean="0"/>
-              <a:t>2025-12-08</a:t>
+              <a:t>2026-01-08</a:t>
             </a:fld>
             <a:endParaRPr lang="en-CA"/>
           </a:p>
@@ -2290,7 +2016,7 @@
           <a:p>
             <a:fld id="{E2CDF564-AA16-4F8A-8361-C9076F43B828}" type="datetimeFigureOut">
               <a:rPr lang="en-CA" smtClean="0"/>
-              <a:t>2025-12-08</a:t>
+              <a:t>2026-01-08</a:t>
             </a:fld>
             <a:endParaRPr lang="en-CA"/>
           </a:p>
@@ -2403,7 +2129,7 @@
           <a:p>
             <a:fld id="{E2CDF564-AA16-4F8A-8361-C9076F43B828}" type="datetimeFigureOut">
               <a:rPr lang="en-CA" smtClean="0"/>
-              <a:t>2025-12-08</a:t>
+              <a:t>2026-01-08</a:t>
             </a:fld>
             <a:endParaRPr lang="en-CA"/>
           </a:p>
@@ -2716,7 +2442,7 @@
           <a:p>
             <a:fld id="{E2CDF564-AA16-4F8A-8361-C9076F43B828}" type="datetimeFigureOut">
               <a:rPr lang="en-CA" smtClean="0"/>
-              <a:t>2025-12-08</a:t>
+              <a:t>2026-01-08</a:t>
             </a:fld>
             <a:endParaRPr lang="en-CA"/>
           </a:p>
@@ -3005,7 +2731,7 @@
           <a:p>
             <a:fld id="{E2CDF564-AA16-4F8A-8361-C9076F43B828}" type="datetimeFigureOut">
               <a:rPr lang="en-CA" smtClean="0"/>
-              <a:t>2025-12-08</a:t>
+              <a:t>2026-01-08</a:t>
             </a:fld>
             <a:endParaRPr lang="en-CA"/>
           </a:p>
@@ -3248,7 +2974,7 @@
           <a:p>
             <a:fld id="{E2CDF564-AA16-4F8A-8361-C9076F43B828}" type="datetimeFigureOut">
               <a:rPr lang="en-CA" smtClean="0"/>
-              <a:t>2025-12-08</a:t>
+              <a:t>2026-01-08</a:t>
             </a:fld>
             <a:endParaRPr lang="en-CA"/>
           </a:p>
@@ -5948,7 +5674,7 @@
           <a:p>
             <a:r>
               <a:rPr lang="en-CA" dirty="0"/>
-              <a:t>Unlike natural languages, formal languages require that you follow the rules strictly</a:t>
+              <a:t>Formal languages follow strict rule</a:t>
             </a:r>
           </a:p>
           <a:p>

</xml_diff>